<commit_message>
Update @03:16 on Apr27
</commit_message>
<xml_diff>
--- a/project_presentation/VoIP_final_presentation.pptx
+++ b/project_presentation/VoIP_final_presentation.pptx
@@ -4,6 +4,9 @@
   <p:sldMasterIdLst>
     <p:sldMasterId id="2147483660" r:id="rId1"/>
   </p:sldMasterIdLst>
+  <p:notesMasterIdLst>
+    <p:notesMasterId r:id="rId29"/>
+  </p:notesMasterIdLst>
   <p:sldIdLst>
     <p:sldId id="256" r:id="rId2"/>
     <p:sldId id="292" r:id="rId3"/>
@@ -19,14 +22,19 @@
     <p:sldId id="300" r:id="rId13"/>
     <p:sldId id="301" r:id="rId14"/>
     <p:sldId id="302" r:id="rId15"/>
-    <p:sldId id="303" r:id="rId16"/>
-    <p:sldId id="304" r:id="rId17"/>
-    <p:sldId id="305" r:id="rId18"/>
-    <p:sldId id="306" r:id="rId19"/>
-    <p:sldId id="307" r:id="rId20"/>
-    <p:sldId id="308" r:id="rId21"/>
-    <p:sldId id="291" r:id="rId22"/>
-    <p:sldId id="278" r:id="rId23"/>
+    <p:sldId id="314" r:id="rId16"/>
+    <p:sldId id="315" r:id="rId17"/>
+    <p:sldId id="316" r:id="rId18"/>
+    <p:sldId id="317" r:id="rId19"/>
+    <p:sldId id="318" r:id="rId20"/>
+    <p:sldId id="304" r:id="rId21"/>
+    <p:sldId id="305" r:id="rId22"/>
+    <p:sldId id="306" r:id="rId23"/>
+    <p:sldId id="307" r:id="rId24"/>
+    <p:sldId id="308" r:id="rId25"/>
+    <p:sldId id="291" r:id="rId26"/>
+    <p:sldId id="278" r:id="rId27"/>
+    <p:sldId id="303" r:id="rId28"/>
   </p:sldIdLst>
   <p:sldSz cx="12192000" cy="6858000"/>
   <p:notesSz cx="6858000" cy="9144000"/>
@@ -164,7 +172,11 @@
         <p14:section name="Experiment Results" id="{7F2C6EE9-8CEF-2342-923C-3C08B7F28DFF}">
           <p14:sldIdLst>
             <p14:sldId id="302"/>
-            <p14:sldId id="303"/>
+            <p14:sldId id="314"/>
+            <p14:sldId id="315"/>
+            <p14:sldId id="316"/>
+            <p14:sldId id="317"/>
+            <p14:sldId id="318"/>
             <p14:sldId id="304"/>
           </p14:sldIdLst>
         </p14:section>
@@ -190,6 +202,11 @@
             <p14:sldId id="278"/>
           </p14:sldIdLst>
         </p14:section>
+        <p14:section name="Extra Slides" id="{31C275E7-F4EE-A249-B45E-EF9B584DE014}">
+          <p14:sldIdLst>
+            <p14:sldId id="303"/>
+          </p14:sldIdLst>
+        </p14:section>
       </p14:sectionLst>
     </p:ext>
     <p:ext uri="{EFAFB233-063F-42B5-8137-9DF3F51BA10A}">
@@ -203,8 +220,10 @@
 <p1510:revInfo xmlns:a="http://schemas.openxmlformats.org/drawingml/2006/main" xmlns:r="http://schemas.openxmlformats.org/officeDocument/2006/relationships" xmlns:p1510="http://schemas.microsoft.com/office/powerpoint/2015/10/main">
   <p1510:revLst>
     <p1510:client id="{01608A76-BCC8-435D-A7FD-998D591FE69B}" v="1921" dt="2022-04-27T02:58:41.989"/>
+    <p1510:client id="{30B743A9-FCAB-B7E6-CCF6-432FA1F40417}" v="453" dt="2022-04-27T19:46:04.285"/>
     <p1510:client id="{CEF57F2F-C4BD-07E3-E520-EC11CBA76586}" v="3" dt="2022-04-27T11:24:33.905"/>
-    <p1510:client id="{CFF72AAC-1248-F64C-B090-8BDD8C7CADC1}" v="490" dt="2022-04-27T01:46:08.064"/>
+    <p1510:client id="{CFF72AAC-1248-F64C-B090-8BDD8C7CADC1}" v="604" dt="2022-04-27T20:14:08.163"/>
+    <p1510:client id="{DF6E75B9-1B48-4DA7-7F6A-2FFC95E13E83}" v="2274" dt="2022-04-27T19:13:58.205"/>
     <p1510:client id="{F3749FAE-333C-70EC-2BF1-6FEE8A68231B}" v="4" dt="2022-04-27T00:42:56.871"/>
   </p1510:revLst>
 </p1510:revInfo>
@@ -212,70 +231,6 @@
 
 <file path=ppt/changesInfos/changesInfo1.xml><?xml version="1.0" encoding="utf-8"?>
 <pc:chgInfo xmlns:a="http://schemas.openxmlformats.org/drawingml/2006/main" xmlns:r="http://schemas.openxmlformats.org/officeDocument/2006/relationships" xmlns:ac="http://schemas.microsoft.com/office/drawing/2013/main/command" xmlns:pc="http://schemas.microsoft.com/office/powerpoint/2013/main/command">
-  <pc:docChgLst>
-    <pc:chgData name="Xiaoming Guo" userId="S::xguo29@crimson.ua.edu::b79fe292-1467-4ee3-ad6b-8d245392dbad" providerId="AD" clId="Web-{F3749FAE-333C-70EC-2BF1-6FEE8A68231B}"/>
-    <pc:docChg chg="modSld">
-      <pc:chgData name="Xiaoming Guo" userId="S::xguo29@crimson.ua.edu::b79fe292-1467-4ee3-ad6b-8d245392dbad" providerId="AD" clId="Web-{F3749FAE-333C-70EC-2BF1-6FEE8A68231B}" dt="2022-04-27T00:42:56.121" v="2" actId="20577"/>
-      <pc:docMkLst>
-        <pc:docMk/>
-      </pc:docMkLst>
-      <pc:sldChg chg="modSp">
-        <pc:chgData name="Xiaoming Guo" userId="S::xguo29@crimson.ua.edu::b79fe292-1467-4ee3-ad6b-8d245392dbad" providerId="AD" clId="Web-{F3749FAE-333C-70EC-2BF1-6FEE8A68231B}" dt="2022-04-27T00:42:56.121" v="2" actId="20577"/>
-        <pc:sldMkLst>
-          <pc:docMk/>
-          <pc:sldMk cId="534560483" sldId="256"/>
-        </pc:sldMkLst>
-        <pc:spChg chg="mod">
-          <ac:chgData name="Xiaoming Guo" userId="S::xguo29@crimson.ua.edu::b79fe292-1467-4ee3-ad6b-8d245392dbad" providerId="AD" clId="Web-{F3749FAE-333C-70EC-2BF1-6FEE8A68231B}" dt="2022-04-27T00:42:56.121" v="2" actId="20577"/>
-          <ac:spMkLst>
-            <pc:docMk/>
-            <pc:sldMk cId="534560483" sldId="256"/>
-            <ac:spMk id="5" creationId="{B79C38FF-A327-8D08-16A8-1C65D88AD44D}"/>
-          </ac:spMkLst>
-        </pc:spChg>
-      </pc:sldChg>
-    </pc:docChg>
-  </pc:docChgLst>
-  <pc:docChgLst>
-    <pc:chgData name="Xiaoming Guo" userId="S::xguo29@crimson.ua.edu::b79fe292-1467-4ee3-ad6b-8d245392dbad" providerId="AD" clId="Web-{CEF57F2F-C4BD-07E3-E520-EC11CBA76586}"/>
-    <pc:docChg chg="modSld">
-      <pc:chgData name="Xiaoming Guo" userId="S::xguo29@crimson.ua.edu::b79fe292-1467-4ee3-ad6b-8d245392dbad" providerId="AD" clId="Web-{CEF57F2F-C4BD-07E3-E520-EC11CBA76586}" dt="2022-04-27T11:24:33.342" v="1"/>
-      <pc:docMkLst>
-        <pc:docMk/>
-      </pc:docMkLst>
-      <pc:sldChg chg="addSp delSp modSp">
-        <pc:chgData name="Xiaoming Guo" userId="S::xguo29@crimson.ua.edu::b79fe292-1467-4ee3-ad6b-8d245392dbad" providerId="AD" clId="Web-{CEF57F2F-C4BD-07E3-E520-EC11CBA76586}" dt="2022-04-27T11:24:33.342" v="1"/>
-        <pc:sldMkLst>
-          <pc:docMk/>
-          <pc:sldMk cId="1262543152" sldId="311"/>
-        </pc:sldMkLst>
-        <pc:spChg chg="add del mod">
-          <ac:chgData name="Xiaoming Guo" userId="S::xguo29@crimson.ua.edu::b79fe292-1467-4ee3-ad6b-8d245392dbad" providerId="AD" clId="Web-{CEF57F2F-C4BD-07E3-E520-EC11CBA76586}" dt="2022-04-27T11:24:33.342" v="1"/>
-          <ac:spMkLst>
-            <pc:docMk/>
-            <pc:sldMk cId="1262543152" sldId="311"/>
-            <ac:spMk id="7" creationId="{2A63C439-46F0-2812-EFB0-4A5A427CC42F}"/>
-          </ac:spMkLst>
-        </pc:spChg>
-        <pc:picChg chg="del">
-          <ac:chgData name="Xiaoming Guo" userId="S::xguo29@crimson.ua.edu::b79fe292-1467-4ee3-ad6b-8d245392dbad" providerId="AD" clId="Web-{CEF57F2F-C4BD-07E3-E520-EC11CBA76586}" dt="2022-04-27T11:24:21.920" v="0"/>
-          <ac:picMkLst>
-            <pc:docMk/>
-            <pc:sldMk cId="1262543152" sldId="311"/>
-            <ac:picMk id="5" creationId="{A584E264-52C3-6435-7776-2F78CEA2B69B}"/>
-          </ac:picMkLst>
-        </pc:picChg>
-        <pc:picChg chg="add mod ord">
-          <ac:chgData name="Xiaoming Guo" userId="S::xguo29@crimson.ua.edu::b79fe292-1467-4ee3-ad6b-8d245392dbad" providerId="AD" clId="Web-{CEF57F2F-C4BD-07E3-E520-EC11CBA76586}" dt="2022-04-27T11:24:33.342" v="1"/>
-          <ac:picMkLst>
-            <pc:docMk/>
-            <pc:sldMk cId="1262543152" sldId="311"/>
-            <ac:picMk id="8" creationId="{A290F904-6C8E-3F87-7847-99C74CCADB3E}"/>
-          </ac:picMkLst>
-        </pc:picChg>
-      </pc:sldChg>
-    </pc:docChg>
-  </pc:docChgLst>
   <pc:docChgLst>
     <pc:chgData name="David Coleman" userId="S::dmcoleman1@crimson.ua.edu::d1fc6c15-a6c5-4b7d-8f5b-0a30d6e748fc" providerId="AD" clId="Web-{01608A76-BCC8-435D-A7FD-998D591FE69B}"/>
     <pc:docChg chg="addSld delSld modSld modSection">
@@ -523,9 +478,250 @@
     </pc:docChg>
   </pc:docChgLst>
   <pc:docChgLst>
+    <pc:chgData name="Xiaoming Guo" userId="S::xguo29@crimson.ua.edu::b79fe292-1467-4ee3-ad6b-8d245392dbad" providerId="AD" clId="Web-{30B743A9-FCAB-B7E6-CCF6-432FA1F40417}"/>
+    <pc:docChg chg="modSld">
+      <pc:chgData name="Xiaoming Guo" userId="S::xguo29@crimson.ua.edu::b79fe292-1467-4ee3-ad6b-8d245392dbad" providerId="AD" clId="Web-{30B743A9-FCAB-B7E6-CCF6-432FA1F40417}" dt="2022-04-27T19:46:03.910" v="464" actId="20577"/>
+      <pc:docMkLst>
+        <pc:docMk/>
+      </pc:docMkLst>
+      <pc:sldChg chg="modSp modNotes">
+        <pc:chgData name="Xiaoming Guo" userId="S::xguo29@crimson.ua.edu::b79fe292-1467-4ee3-ad6b-8d245392dbad" providerId="AD" clId="Web-{30B743A9-FCAB-B7E6-CCF6-432FA1F40417}" dt="2022-04-27T19:25:41.382" v="415" actId="20577"/>
+        <pc:sldMkLst>
+          <pc:docMk/>
+          <pc:sldMk cId="1939056174" sldId="295"/>
+        </pc:sldMkLst>
+        <pc:spChg chg="mod">
+          <ac:chgData name="Xiaoming Guo" userId="S::xguo29@crimson.ua.edu::b79fe292-1467-4ee3-ad6b-8d245392dbad" providerId="AD" clId="Web-{30B743A9-FCAB-B7E6-CCF6-432FA1F40417}" dt="2022-04-27T19:25:41.382" v="415" actId="20577"/>
+          <ac:spMkLst>
+            <pc:docMk/>
+            <pc:sldMk cId="1939056174" sldId="295"/>
+            <ac:spMk id="3" creationId="{ED5E9A02-F0EA-D674-1A38-FB6415C3774B}"/>
+          </ac:spMkLst>
+        </pc:spChg>
+      </pc:sldChg>
+      <pc:sldChg chg="modSp modNotes">
+        <pc:chgData name="Xiaoming Guo" userId="S::xguo29@crimson.ua.edu::b79fe292-1467-4ee3-ad6b-8d245392dbad" providerId="AD" clId="Web-{30B743A9-FCAB-B7E6-CCF6-432FA1F40417}" dt="2022-04-27T19:41:05.310" v="450" actId="20577"/>
+        <pc:sldMkLst>
+          <pc:docMk/>
+          <pc:sldMk cId="1890008741" sldId="296"/>
+        </pc:sldMkLst>
+        <pc:spChg chg="mod">
+          <ac:chgData name="Xiaoming Guo" userId="S::xguo29@crimson.ua.edu::b79fe292-1467-4ee3-ad6b-8d245392dbad" providerId="AD" clId="Web-{30B743A9-FCAB-B7E6-CCF6-432FA1F40417}" dt="2022-04-27T19:41:05.310" v="450" actId="20577"/>
+          <ac:spMkLst>
+            <pc:docMk/>
+            <pc:sldMk cId="1890008741" sldId="296"/>
+            <ac:spMk id="3" creationId="{A848CA97-69D1-23E4-0908-969B5D5A28FC}"/>
+          </ac:spMkLst>
+        </pc:spChg>
+      </pc:sldChg>
+      <pc:sldChg chg="addSp modSp">
+        <pc:chgData name="Xiaoming Guo" userId="S::xguo29@crimson.ua.edu::b79fe292-1467-4ee3-ad6b-8d245392dbad" providerId="AD" clId="Web-{30B743A9-FCAB-B7E6-CCF6-432FA1F40417}" dt="2022-04-27T19:44:20.095" v="460" actId="1076"/>
+        <pc:sldMkLst>
+          <pc:docMk/>
+          <pc:sldMk cId="1387990069" sldId="310"/>
+        </pc:sldMkLst>
+        <pc:spChg chg="mod">
+          <ac:chgData name="Xiaoming Guo" userId="S::xguo29@crimson.ua.edu::b79fe292-1467-4ee3-ad6b-8d245392dbad" providerId="AD" clId="Web-{30B743A9-FCAB-B7E6-CCF6-432FA1F40417}" dt="2022-04-27T19:44:20.095" v="460" actId="1076"/>
+          <ac:spMkLst>
+            <pc:docMk/>
+            <pc:sldMk cId="1387990069" sldId="310"/>
+            <ac:spMk id="3" creationId="{A848CA97-69D1-23E4-0908-969B5D5A28FC}"/>
+          </ac:spMkLst>
+        </pc:spChg>
+        <pc:picChg chg="add mod">
+          <ac:chgData name="Xiaoming Guo" userId="S::xguo29@crimson.ua.edu::b79fe292-1467-4ee3-ad6b-8d245392dbad" providerId="AD" clId="Web-{30B743A9-FCAB-B7E6-CCF6-432FA1F40417}" dt="2022-04-27T19:43:46.673" v="457" actId="1076"/>
+          <ac:picMkLst>
+            <pc:docMk/>
+            <pc:sldMk cId="1387990069" sldId="310"/>
+            <ac:picMk id="4" creationId="{4973B74B-418E-2CB2-0311-A1FE311F35EB}"/>
+          </ac:picMkLst>
+        </pc:picChg>
+        <pc:picChg chg="add mod">
+          <ac:chgData name="Xiaoming Guo" userId="S::xguo29@crimson.ua.edu::b79fe292-1467-4ee3-ad6b-8d245392dbad" providerId="AD" clId="Web-{30B743A9-FCAB-B7E6-CCF6-432FA1F40417}" dt="2022-04-27T19:43:43.891" v="456" actId="1076"/>
+          <ac:picMkLst>
+            <pc:docMk/>
+            <pc:sldMk cId="1387990069" sldId="310"/>
+            <ac:picMk id="5" creationId="{3934A0A6-FA12-A670-3C2A-2D0476AE3537}"/>
+          </ac:picMkLst>
+        </pc:picChg>
+      </pc:sldChg>
+      <pc:sldChg chg="modSp">
+        <pc:chgData name="Xiaoming Guo" userId="S::xguo29@crimson.ua.edu::b79fe292-1467-4ee3-ad6b-8d245392dbad" providerId="AD" clId="Web-{30B743A9-FCAB-B7E6-CCF6-432FA1F40417}" dt="2022-04-27T19:46:03.910" v="464" actId="20577"/>
+        <pc:sldMkLst>
+          <pc:docMk/>
+          <pc:sldMk cId="3285169088" sldId="313"/>
+        </pc:sldMkLst>
+        <pc:spChg chg="mod">
+          <ac:chgData name="Xiaoming Guo" userId="S::xguo29@crimson.ua.edu::b79fe292-1467-4ee3-ad6b-8d245392dbad" providerId="AD" clId="Web-{30B743A9-FCAB-B7E6-CCF6-432FA1F40417}" dt="2022-04-27T19:46:03.910" v="464" actId="20577"/>
+          <ac:spMkLst>
+            <pc:docMk/>
+            <pc:sldMk cId="3285169088" sldId="313"/>
+            <ac:spMk id="3" creationId="{FCBA1FF2-4AC2-3039-CEF1-40D7C55EA20D}"/>
+          </ac:spMkLst>
+        </pc:spChg>
+      </pc:sldChg>
+    </pc:docChg>
+  </pc:docChgLst>
+  <pc:docChgLst>
+    <pc:chgData name="Xiaoming Guo" userId="S::xguo29@crimson.ua.edu::b79fe292-1467-4ee3-ad6b-8d245392dbad" providerId="AD" clId="Web-{F3749FAE-333C-70EC-2BF1-6FEE8A68231B}"/>
+    <pc:docChg chg="modSld">
+      <pc:chgData name="Xiaoming Guo" userId="S::xguo29@crimson.ua.edu::b79fe292-1467-4ee3-ad6b-8d245392dbad" providerId="AD" clId="Web-{F3749FAE-333C-70EC-2BF1-6FEE8A68231B}" dt="2022-04-27T00:42:56.121" v="2" actId="20577"/>
+      <pc:docMkLst>
+        <pc:docMk/>
+      </pc:docMkLst>
+      <pc:sldChg chg="modSp">
+        <pc:chgData name="Xiaoming Guo" userId="S::xguo29@crimson.ua.edu::b79fe292-1467-4ee3-ad6b-8d245392dbad" providerId="AD" clId="Web-{F3749FAE-333C-70EC-2BF1-6FEE8A68231B}" dt="2022-04-27T00:42:56.121" v="2" actId="20577"/>
+        <pc:sldMkLst>
+          <pc:docMk/>
+          <pc:sldMk cId="534560483" sldId="256"/>
+        </pc:sldMkLst>
+        <pc:spChg chg="mod">
+          <ac:chgData name="Xiaoming Guo" userId="S::xguo29@crimson.ua.edu::b79fe292-1467-4ee3-ad6b-8d245392dbad" providerId="AD" clId="Web-{F3749FAE-333C-70EC-2BF1-6FEE8A68231B}" dt="2022-04-27T00:42:56.121" v="2" actId="20577"/>
+          <ac:spMkLst>
+            <pc:docMk/>
+            <pc:sldMk cId="534560483" sldId="256"/>
+            <ac:spMk id="5" creationId="{B79C38FF-A327-8D08-16A8-1C65D88AD44D}"/>
+          </ac:spMkLst>
+        </pc:spChg>
+      </pc:sldChg>
+    </pc:docChg>
+  </pc:docChgLst>
+  <pc:docChgLst>
+    <pc:chgData name="Xiaoming Guo" userId="S::xguo29@crimson.ua.edu::b79fe292-1467-4ee3-ad6b-8d245392dbad" providerId="AD" clId="Web-{CEF57F2F-C4BD-07E3-E520-EC11CBA76586}"/>
+    <pc:docChg chg="modSld">
+      <pc:chgData name="Xiaoming Guo" userId="S::xguo29@crimson.ua.edu::b79fe292-1467-4ee3-ad6b-8d245392dbad" providerId="AD" clId="Web-{CEF57F2F-C4BD-07E3-E520-EC11CBA76586}" dt="2022-04-27T11:24:33.342" v="1"/>
+      <pc:docMkLst>
+        <pc:docMk/>
+      </pc:docMkLst>
+      <pc:sldChg chg="addSp delSp modSp">
+        <pc:chgData name="Xiaoming Guo" userId="S::xguo29@crimson.ua.edu::b79fe292-1467-4ee3-ad6b-8d245392dbad" providerId="AD" clId="Web-{CEF57F2F-C4BD-07E3-E520-EC11CBA76586}" dt="2022-04-27T11:24:33.342" v="1"/>
+        <pc:sldMkLst>
+          <pc:docMk/>
+          <pc:sldMk cId="1262543152" sldId="311"/>
+        </pc:sldMkLst>
+        <pc:spChg chg="add del mod">
+          <ac:chgData name="Xiaoming Guo" userId="S::xguo29@crimson.ua.edu::b79fe292-1467-4ee3-ad6b-8d245392dbad" providerId="AD" clId="Web-{CEF57F2F-C4BD-07E3-E520-EC11CBA76586}" dt="2022-04-27T11:24:33.342" v="1"/>
+          <ac:spMkLst>
+            <pc:docMk/>
+            <pc:sldMk cId="1262543152" sldId="311"/>
+            <ac:spMk id="7" creationId="{2A63C439-46F0-2812-EFB0-4A5A427CC42F}"/>
+          </ac:spMkLst>
+        </pc:spChg>
+        <pc:picChg chg="del">
+          <ac:chgData name="Xiaoming Guo" userId="S::xguo29@crimson.ua.edu::b79fe292-1467-4ee3-ad6b-8d245392dbad" providerId="AD" clId="Web-{CEF57F2F-C4BD-07E3-E520-EC11CBA76586}" dt="2022-04-27T11:24:21.920" v="0"/>
+          <ac:picMkLst>
+            <pc:docMk/>
+            <pc:sldMk cId="1262543152" sldId="311"/>
+            <ac:picMk id="5" creationId="{A584E264-52C3-6435-7776-2F78CEA2B69B}"/>
+          </ac:picMkLst>
+        </pc:picChg>
+        <pc:picChg chg="add mod ord">
+          <ac:chgData name="Xiaoming Guo" userId="S::xguo29@crimson.ua.edu::b79fe292-1467-4ee3-ad6b-8d245392dbad" providerId="AD" clId="Web-{CEF57F2F-C4BD-07E3-E520-EC11CBA76586}" dt="2022-04-27T11:24:33.342" v="1"/>
+          <ac:picMkLst>
+            <pc:docMk/>
+            <pc:sldMk cId="1262543152" sldId="311"/>
+            <ac:picMk id="8" creationId="{A290F904-6C8E-3F87-7847-99C74CCADB3E}"/>
+          </ac:picMkLst>
+        </pc:picChg>
+      </pc:sldChg>
+    </pc:docChg>
+  </pc:docChgLst>
+  <pc:docChgLst>
+    <pc:chgData name="David Coleman" userId="S::dmcoleman1@crimson.ua.edu::d1fc6c15-a6c5-4b7d-8f5b-0a30d6e748fc" providerId="AD" clId="Web-{DF6E75B9-1B48-4DA7-7F6A-2FFC95E13E83}"/>
+    <pc:docChg chg="modSld">
+      <pc:chgData name="David Coleman" userId="S::dmcoleman1@crimson.ua.edu::d1fc6c15-a6c5-4b7d-8f5b-0a30d6e748fc" providerId="AD" clId="Web-{DF6E75B9-1B48-4DA7-7F6A-2FFC95E13E83}" dt="2022-04-27T19:13:58.205" v="2275" actId="20577"/>
+      <pc:docMkLst>
+        <pc:docMk/>
+      </pc:docMkLst>
+      <pc:sldChg chg="modSp">
+        <pc:chgData name="David Coleman" userId="S::dmcoleman1@crimson.ua.edu::d1fc6c15-a6c5-4b7d-8f5b-0a30d6e748fc" providerId="AD" clId="Web-{DF6E75B9-1B48-4DA7-7F6A-2FFC95E13E83}" dt="2022-04-27T18:57:45.580" v="1028" actId="20577"/>
+        <pc:sldMkLst>
+          <pc:docMk/>
+          <pc:sldMk cId="3734144312" sldId="301"/>
+        </pc:sldMkLst>
+        <pc:spChg chg="mod">
+          <ac:chgData name="David Coleman" userId="S::dmcoleman1@crimson.ua.edu::d1fc6c15-a6c5-4b7d-8f5b-0a30d6e748fc" providerId="AD" clId="Web-{DF6E75B9-1B48-4DA7-7F6A-2FFC95E13E83}" dt="2022-04-27T18:57:45.580" v="1028" actId="20577"/>
+          <ac:spMkLst>
+            <pc:docMk/>
+            <pc:sldMk cId="3734144312" sldId="301"/>
+            <ac:spMk id="3" creationId="{F5E0EB9B-DF1B-D042-F8E7-65DEFDD915C2}"/>
+          </ac:spMkLst>
+        </pc:spChg>
+      </pc:sldChg>
+      <pc:sldChg chg="modSp">
+        <pc:chgData name="David Coleman" userId="S::dmcoleman1@crimson.ua.edu::d1fc6c15-a6c5-4b7d-8f5b-0a30d6e748fc" providerId="AD" clId="Web-{DF6E75B9-1B48-4DA7-7F6A-2FFC95E13E83}" dt="2022-04-27T19:13:58.205" v="2275" actId="20577"/>
+        <pc:sldMkLst>
+          <pc:docMk/>
+          <pc:sldMk cId="3352484359" sldId="303"/>
+        </pc:sldMkLst>
+        <pc:spChg chg="mod">
+          <ac:chgData name="David Coleman" userId="S::dmcoleman1@crimson.ua.edu::d1fc6c15-a6c5-4b7d-8f5b-0a30d6e748fc" providerId="AD" clId="Web-{DF6E75B9-1B48-4DA7-7F6A-2FFC95E13E83}" dt="2022-04-27T19:13:58.205" v="2275" actId="20577"/>
+          <ac:spMkLst>
+            <pc:docMk/>
+            <pc:sldMk cId="3352484359" sldId="303"/>
+            <ac:spMk id="3" creationId="{870B6238-C70F-9FCA-AA77-9B5A3EEB905D}"/>
+          </ac:spMkLst>
+        </pc:spChg>
+      </pc:sldChg>
+      <pc:sldChg chg="modSp">
+        <pc:chgData name="David Coleman" userId="S::dmcoleman1@crimson.ua.edu::d1fc6c15-a6c5-4b7d-8f5b-0a30d6e748fc" providerId="AD" clId="Web-{DF6E75B9-1B48-4DA7-7F6A-2FFC95E13E83}" dt="2022-04-27T19:03:21.825" v="1483" actId="20577"/>
+        <pc:sldMkLst>
+          <pc:docMk/>
+          <pc:sldMk cId="420941836" sldId="304"/>
+        </pc:sldMkLst>
+        <pc:spChg chg="mod">
+          <ac:chgData name="David Coleman" userId="S::dmcoleman1@crimson.ua.edu::d1fc6c15-a6c5-4b7d-8f5b-0a30d6e748fc" providerId="AD" clId="Web-{DF6E75B9-1B48-4DA7-7F6A-2FFC95E13E83}" dt="2022-04-27T19:03:21.825" v="1483" actId="20577"/>
+          <ac:spMkLst>
+            <pc:docMk/>
+            <pc:sldMk cId="420941836" sldId="304"/>
+            <ac:spMk id="3" creationId="{C7C56738-6454-8705-5EB0-12914EDDE568}"/>
+          </ac:spMkLst>
+        </pc:spChg>
+      </pc:sldChg>
+      <pc:sldChg chg="modSp">
+        <pc:chgData name="David Coleman" userId="S::dmcoleman1@crimson.ua.edu::d1fc6c15-a6c5-4b7d-8f5b-0a30d6e748fc" providerId="AD" clId="Web-{DF6E75B9-1B48-4DA7-7F6A-2FFC95E13E83}" dt="2022-04-27T19:08:23.257" v="1974" actId="20577"/>
+        <pc:sldMkLst>
+          <pc:docMk/>
+          <pc:sldMk cId="1008626328" sldId="306"/>
+        </pc:sldMkLst>
+        <pc:spChg chg="mod">
+          <ac:chgData name="David Coleman" userId="S::dmcoleman1@crimson.ua.edu::d1fc6c15-a6c5-4b7d-8f5b-0a30d6e748fc" providerId="AD" clId="Web-{DF6E75B9-1B48-4DA7-7F6A-2FFC95E13E83}" dt="2022-04-27T19:08:23.257" v="1974" actId="20577"/>
+          <ac:spMkLst>
+            <pc:docMk/>
+            <pc:sldMk cId="1008626328" sldId="306"/>
+            <ac:spMk id="3" creationId="{905F97D9-9A28-8A7C-7F23-7A8DF6EA0CBC}"/>
+          </ac:spMkLst>
+        </pc:spChg>
+      </pc:sldChg>
+      <pc:sldChg chg="modSp">
+        <pc:chgData name="David Coleman" userId="S::dmcoleman1@crimson.ua.edu::d1fc6c15-a6c5-4b7d-8f5b-0a30d6e748fc" providerId="AD" clId="Web-{DF6E75B9-1B48-4DA7-7F6A-2FFC95E13E83}" dt="2022-04-27T19:12:08.248" v="2255" actId="20577"/>
+        <pc:sldMkLst>
+          <pc:docMk/>
+          <pc:sldMk cId="2356316927" sldId="308"/>
+        </pc:sldMkLst>
+        <pc:spChg chg="mod">
+          <ac:chgData name="David Coleman" userId="S::dmcoleman1@crimson.ua.edu::d1fc6c15-a6c5-4b7d-8f5b-0a30d6e748fc" providerId="AD" clId="Web-{DF6E75B9-1B48-4DA7-7F6A-2FFC95E13E83}" dt="2022-04-27T19:08:28.351" v="1976" actId="20577"/>
+          <ac:spMkLst>
+            <pc:docMk/>
+            <pc:sldMk cId="2356316927" sldId="308"/>
+            <ac:spMk id="2" creationId="{22B76E28-D9C3-E214-AA53-6866178508CB}"/>
+          </ac:spMkLst>
+        </pc:spChg>
+        <pc:spChg chg="mod">
+          <ac:chgData name="David Coleman" userId="S::dmcoleman1@crimson.ua.edu::d1fc6c15-a6c5-4b7d-8f5b-0a30d6e748fc" providerId="AD" clId="Web-{DF6E75B9-1B48-4DA7-7F6A-2FFC95E13E83}" dt="2022-04-27T19:12:08.248" v="2255" actId="20577"/>
+          <ac:spMkLst>
+            <pc:docMk/>
+            <pc:sldMk cId="2356316927" sldId="308"/>
+            <ac:spMk id="3" creationId="{092BB39B-368F-8020-7E93-8A6E84587B26}"/>
+          </ac:spMkLst>
+        </pc:spChg>
+      </pc:sldChg>
+    </pc:docChg>
+  </pc:docChgLst>
+  <pc:docChgLst>
     <pc:chgData name="Trupesh Patel" userId="b76c5197-b424-428e-a787-d44a01bbf658" providerId="ADAL" clId="{CFF72AAC-1248-F64C-B090-8BDD8C7CADC1}"/>
-    <pc:docChg chg="undo custSel addSld delSld modSld addSection delSection modSection">
-      <pc:chgData name="Trupesh Patel" userId="b76c5197-b424-428e-a787-d44a01bbf658" providerId="ADAL" clId="{CFF72AAC-1248-F64C-B090-8BDD8C7CADC1}" dt="2022-04-27T01:46:08.063" v="491"/>
+    <pc:docChg chg="undo custSel addSld delSld modSld sldOrd addSection delSection modSection">
+      <pc:chgData name="Trupesh Patel" userId="b76c5197-b424-428e-a787-d44a01bbf658" providerId="ADAL" clId="{CFF72AAC-1248-F64C-B090-8BDD8C7CADC1}" dt="2022-04-27T20:14:42.615" v="610" actId="20578"/>
       <pc:docMkLst>
         <pc:docMk/>
       </pc:docMkLst>
@@ -773,8 +969,8 @@
           </ac:spMkLst>
         </pc:spChg>
       </pc:sldChg>
-      <pc:sldChg chg="modSp new mod">
-        <pc:chgData name="Trupesh Patel" userId="b76c5197-b424-428e-a787-d44a01bbf658" providerId="ADAL" clId="{CFF72AAC-1248-F64C-B090-8BDD8C7CADC1}" dt="2022-04-27T01:30:08.198" v="324" actId="20577"/>
+      <pc:sldChg chg="modSp new mod ord">
+        <pc:chgData name="Trupesh Patel" userId="b76c5197-b424-428e-a787-d44a01bbf658" providerId="ADAL" clId="{CFF72AAC-1248-F64C-B090-8BDD8C7CADC1}" dt="2022-04-27T20:14:42.615" v="610" actId="20578"/>
         <pc:sldMkLst>
           <pc:docMk/>
           <pc:sldMk cId="3352484359" sldId="303"/>
@@ -887,9 +1083,1956 @@
           </ac:spMkLst>
         </pc:spChg>
       </pc:sldChg>
+      <pc:sldChg chg="addSp">
+        <pc:chgData name="Trupesh Patel" userId="b76c5197-b424-428e-a787-d44a01bbf658" providerId="ADAL" clId="{CFF72AAC-1248-F64C-B090-8BDD8C7CADC1}" dt="2022-04-27T19:43:28.035" v="579" actId="14826"/>
+        <pc:sldMkLst>
+          <pc:docMk/>
+          <pc:sldMk cId="1387990069" sldId="310"/>
+        </pc:sldMkLst>
+        <pc:picChg chg="add">
+          <ac:chgData name="Trupesh Patel" userId="b76c5197-b424-428e-a787-d44a01bbf658" providerId="ADAL" clId="{CFF72AAC-1248-F64C-B090-8BDD8C7CADC1}" dt="2022-04-27T19:43:28.035" v="579" actId="14826"/>
+          <ac:picMkLst>
+            <pc:docMk/>
+            <pc:sldMk cId="1387990069" sldId="310"/>
+            <ac:picMk id="5" creationId="{3934A0A6-FA12-A670-3C2A-2D0476AE3537}"/>
+          </ac:picMkLst>
+        </pc:picChg>
+      </pc:sldChg>
+      <pc:sldChg chg="addSp delSp modSp new mod">
+        <pc:chgData name="Trupesh Patel" userId="b76c5197-b424-428e-a787-d44a01bbf658" providerId="ADAL" clId="{CFF72AAC-1248-F64C-B090-8BDD8C7CADC1}" dt="2022-04-27T20:13:11.904" v="606" actId="14826"/>
+        <pc:sldMkLst>
+          <pc:docMk/>
+          <pc:sldMk cId="2951159625" sldId="314"/>
+        </pc:sldMkLst>
+        <pc:spChg chg="mod">
+          <ac:chgData name="Trupesh Patel" userId="b76c5197-b424-428e-a787-d44a01bbf658" providerId="ADAL" clId="{CFF72AAC-1248-F64C-B090-8BDD8C7CADC1}" dt="2022-04-27T19:40:08.799" v="557" actId="27636"/>
+          <ac:spMkLst>
+            <pc:docMk/>
+            <pc:sldMk cId="2951159625" sldId="314"/>
+            <ac:spMk id="2" creationId="{E3E48C1C-9442-5C43-B10E-A3F109C38807}"/>
+          </ac:spMkLst>
+        </pc:spChg>
+        <pc:spChg chg="del mod">
+          <ac:chgData name="Trupesh Patel" userId="b76c5197-b424-428e-a787-d44a01bbf658" providerId="ADAL" clId="{CFF72AAC-1248-F64C-B090-8BDD8C7CADC1}" dt="2022-04-27T19:40:17.102" v="569" actId="478"/>
+          <ac:spMkLst>
+            <pc:docMk/>
+            <pc:sldMk cId="2951159625" sldId="314"/>
+            <ac:spMk id="3" creationId="{BAE4AA48-6F16-6B3F-F577-491848D7B3E5}"/>
+          </ac:spMkLst>
+        </pc:spChg>
+        <pc:picChg chg="add mod">
+          <ac:chgData name="Trupesh Patel" userId="b76c5197-b424-428e-a787-d44a01bbf658" providerId="ADAL" clId="{CFF72AAC-1248-F64C-B090-8BDD8C7CADC1}" dt="2022-04-27T20:13:11.904" v="606" actId="14826"/>
+          <ac:picMkLst>
+            <pc:docMk/>
+            <pc:sldMk cId="2951159625" sldId="314"/>
+            <ac:picMk id="5" creationId="{84E8E6BA-1A18-927C-F048-9B02655BB801}"/>
+          </ac:picMkLst>
+        </pc:picChg>
+        <pc:picChg chg="add mod">
+          <ac:chgData name="Trupesh Patel" userId="b76c5197-b424-428e-a787-d44a01bbf658" providerId="ADAL" clId="{CFF72AAC-1248-F64C-B090-8BDD8C7CADC1}" dt="2022-04-27T19:40:56.149" v="575" actId="14100"/>
+          <ac:picMkLst>
+            <pc:docMk/>
+            <pc:sldMk cId="2951159625" sldId="314"/>
+            <ac:picMk id="7" creationId="{90755959-BAC6-237D-34C7-A6519B68398F}"/>
+          </ac:picMkLst>
+        </pc:picChg>
+      </pc:sldChg>
+      <pc:sldChg chg="modSp add del mod">
+        <pc:chgData name="Trupesh Patel" userId="b76c5197-b424-428e-a787-d44a01bbf658" providerId="ADAL" clId="{CFF72AAC-1248-F64C-B090-8BDD8C7CADC1}" dt="2022-04-27T20:13:22.022" v="607" actId="14826"/>
+        <pc:sldMkLst>
+          <pc:docMk/>
+          <pc:sldMk cId="1107569565" sldId="315"/>
+        </pc:sldMkLst>
+        <pc:spChg chg="mod">
+          <ac:chgData name="Trupesh Patel" userId="b76c5197-b424-428e-a787-d44a01bbf658" providerId="ADAL" clId="{CFF72AAC-1248-F64C-B090-8BDD8C7CADC1}" dt="2022-04-27T19:43:14.609" v="578" actId="20577"/>
+          <ac:spMkLst>
+            <pc:docMk/>
+            <pc:sldMk cId="1107569565" sldId="315"/>
+            <ac:spMk id="2" creationId="{E3E48C1C-9442-5C43-B10E-A3F109C38807}"/>
+          </ac:spMkLst>
+        </pc:spChg>
+        <pc:picChg chg="mod">
+          <ac:chgData name="Trupesh Patel" userId="b76c5197-b424-428e-a787-d44a01bbf658" providerId="ADAL" clId="{CFF72AAC-1248-F64C-B090-8BDD8C7CADC1}" dt="2022-04-27T20:13:22.022" v="607" actId="14826"/>
+          <ac:picMkLst>
+            <pc:docMk/>
+            <pc:sldMk cId="1107569565" sldId="315"/>
+            <ac:picMk id="5" creationId="{84E8E6BA-1A18-927C-F048-9B02655BB801}"/>
+          </ac:picMkLst>
+        </pc:picChg>
+        <pc:picChg chg="mod">
+          <ac:chgData name="Trupesh Patel" userId="b76c5197-b424-428e-a787-d44a01bbf658" providerId="ADAL" clId="{CFF72AAC-1248-F64C-B090-8BDD8C7CADC1}" dt="2022-04-27T19:43:44.487" v="580" actId="14826"/>
+          <ac:picMkLst>
+            <pc:docMk/>
+            <pc:sldMk cId="1107569565" sldId="315"/>
+            <ac:picMk id="7" creationId="{90755959-BAC6-237D-34C7-A6519B68398F}"/>
+          </ac:picMkLst>
+        </pc:picChg>
+      </pc:sldChg>
+      <pc:sldChg chg="modSp add mod">
+        <pc:chgData name="Trupesh Patel" userId="b76c5197-b424-428e-a787-d44a01bbf658" providerId="ADAL" clId="{CFF72AAC-1248-F64C-B090-8BDD8C7CADC1}" dt="2022-04-27T19:53:11.804" v="589" actId="14826"/>
+        <pc:sldMkLst>
+          <pc:docMk/>
+          <pc:sldMk cId="2571980282" sldId="316"/>
+        </pc:sldMkLst>
+        <pc:spChg chg="mod">
+          <ac:chgData name="Trupesh Patel" userId="b76c5197-b424-428e-a787-d44a01bbf658" providerId="ADAL" clId="{CFF72AAC-1248-F64C-B090-8BDD8C7CADC1}" dt="2022-04-27T19:44:04.857" v="585" actId="20577"/>
+          <ac:spMkLst>
+            <pc:docMk/>
+            <pc:sldMk cId="2571980282" sldId="316"/>
+            <ac:spMk id="2" creationId="{E3E48C1C-9442-5C43-B10E-A3F109C38807}"/>
+          </ac:spMkLst>
+        </pc:spChg>
+        <pc:picChg chg="mod">
+          <ac:chgData name="Trupesh Patel" userId="b76c5197-b424-428e-a787-d44a01bbf658" providerId="ADAL" clId="{CFF72AAC-1248-F64C-B090-8BDD8C7CADC1}" dt="2022-04-27T19:52:56.215" v="588" actId="1076"/>
+          <ac:picMkLst>
+            <pc:docMk/>
+            <pc:sldMk cId="2571980282" sldId="316"/>
+            <ac:picMk id="5" creationId="{84E8E6BA-1A18-927C-F048-9B02655BB801}"/>
+          </ac:picMkLst>
+        </pc:picChg>
+        <pc:picChg chg="mod">
+          <ac:chgData name="Trupesh Patel" userId="b76c5197-b424-428e-a787-d44a01bbf658" providerId="ADAL" clId="{CFF72AAC-1248-F64C-B090-8BDD8C7CADC1}" dt="2022-04-27T19:53:11.804" v="589" actId="14826"/>
+          <ac:picMkLst>
+            <pc:docMk/>
+            <pc:sldMk cId="2571980282" sldId="316"/>
+            <ac:picMk id="7" creationId="{90755959-BAC6-237D-34C7-A6519B68398F}"/>
+          </ac:picMkLst>
+        </pc:picChg>
+      </pc:sldChg>
+      <pc:sldChg chg="modSp add mod">
+        <pc:chgData name="Trupesh Patel" userId="b76c5197-b424-428e-a787-d44a01bbf658" providerId="ADAL" clId="{CFF72AAC-1248-F64C-B090-8BDD8C7CADC1}" dt="2022-04-27T19:59:59.142" v="596" actId="14826"/>
+        <pc:sldMkLst>
+          <pc:docMk/>
+          <pc:sldMk cId="480281074" sldId="317"/>
+        </pc:sldMkLst>
+        <pc:spChg chg="mod">
+          <ac:chgData name="Trupesh Patel" userId="b76c5197-b424-428e-a787-d44a01bbf658" providerId="ADAL" clId="{CFF72AAC-1248-F64C-B090-8BDD8C7CADC1}" dt="2022-04-27T19:53:33.351" v="592" actId="20577"/>
+          <ac:spMkLst>
+            <pc:docMk/>
+            <pc:sldMk cId="480281074" sldId="317"/>
+            <ac:spMk id="2" creationId="{E3E48C1C-9442-5C43-B10E-A3F109C38807}"/>
+          </ac:spMkLst>
+        </pc:spChg>
+        <pc:picChg chg="mod">
+          <ac:chgData name="Trupesh Patel" userId="b76c5197-b424-428e-a787-d44a01bbf658" providerId="ADAL" clId="{CFF72AAC-1248-F64C-B090-8BDD8C7CADC1}" dt="2022-04-27T19:59:59.142" v="596" actId="14826"/>
+          <ac:picMkLst>
+            <pc:docMk/>
+            <pc:sldMk cId="480281074" sldId="317"/>
+            <ac:picMk id="5" creationId="{84E8E6BA-1A18-927C-F048-9B02655BB801}"/>
+          </ac:picMkLst>
+        </pc:picChg>
+        <pc:picChg chg="mod">
+          <ac:chgData name="Trupesh Patel" userId="b76c5197-b424-428e-a787-d44a01bbf658" providerId="ADAL" clId="{CFF72AAC-1248-F64C-B090-8BDD8C7CADC1}" dt="2022-04-27T19:59:44.279" v="595" actId="1076"/>
+          <ac:picMkLst>
+            <pc:docMk/>
+            <pc:sldMk cId="480281074" sldId="317"/>
+            <ac:picMk id="7" creationId="{90755959-BAC6-237D-34C7-A6519B68398F}"/>
+          </ac:picMkLst>
+        </pc:picChg>
+      </pc:sldChg>
+      <pc:sldChg chg="modSp add mod">
+        <pc:chgData name="Trupesh Patel" userId="b76c5197-b424-428e-a787-d44a01bbf658" providerId="ADAL" clId="{CFF72AAC-1248-F64C-B090-8BDD8C7CADC1}" dt="2022-04-27T20:11:15.009" v="603" actId="1076"/>
+        <pc:sldMkLst>
+          <pc:docMk/>
+          <pc:sldMk cId="1341236930" sldId="318"/>
+        </pc:sldMkLst>
+        <pc:spChg chg="mod">
+          <ac:chgData name="Trupesh Patel" userId="b76c5197-b424-428e-a787-d44a01bbf658" providerId="ADAL" clId="{CFF72AAC-1248-F64C-B090-8BDD8C7CADC1}" dt="2022-04-27T20:10:40.222" v="599" actId="20577"/>
+          <ac:spMkLst>
+            <pc:docMk/>
+            <pc:sldMk cId="1341236930" sldId="318"/>
+            <ac:spMk id="2" creationId="{E3E48C1C-9442-5C43-B10E-A3F109C38807}"/>
+          </ac:spMkLst>
+        </pc:spChg>
+        <pc:picChg chg="mod">
+          <ac:chgData name="Trupesh Patel" userId="b76c5197-b424-428e-a787-d44a01bbf658" providerId="ADAL" clId="{CFF72AAC-1248-F64C-B090-8BDD8C7CADC1}" dt="2022-04-27T20:10:46.952" v="600" actId="14826"/>
+          <ac:picMkLst>
+            <pc:docMk/>
+            <pc:sldMk cId="1341236930" sldId="318"/>
+            <ac:picMk id="5" creationId="{84E8E6BA-1A18-927C-F048-9B02655BB801}"/>
+          </ac:picMkLst>
+        </pc:picChg>
+        <pc:picChg chg="mod">
+          <ac:chgData name="Trupesh Patel" userId="b76c5197-b424-428e-a787-d44a01bbf658" providerId="ADAL" clId="{CFF72AAC-1248-F64C-B090-8BDD8C7CADC1}" dt="2022-04-27T20:11:15.009" v="603" actId="1076"/>
+          <ac:picMkLst>
+            <pc:docMk/>
+            <pc:sldMk cId="1341236930" sldId="318"/>
+            <ac:picMk id="7" creationId="{90755959-BAC6-237D-34C7-A6519B68398F}"/>
+          </ac:picMkLst>
+        </pc:picChg>
+      </pc:sldChg>
     </pc:docChg>
   </pc:docChgLst>
 </pc:chgInfo>
+</file>
+
+<file path=ppt/notesMasters/notesMaster1.xml><?xml version="1.0" encoding="utf-8"?>
+<p:notesMaster xmlns:a="http://schemas.openxmlformats.org/drawingml/2006/main" xmlns:r="http://schemas.openxmlformats.org/officeDocument/2006/relationships" xmlns:p="http://schemas.openxmlformats.org/presentationml/2006/main">
+  <p:cSld>
+    <p:bg>
+      <p:bgRef idx="1001">
+        <a:schemeClr val="bg1"/>
+      </p:bgRef>
+    </p:bg>
+    <p:spTree>
+      <p:nvGrpSpPr>
+        <p:cNvPr id="1" name=""/>
+        <p:cNvGrpSpPr/>
+        <p:nvPr/>
+      </p:nvGrpSpPr>
+      <p:grpSpPr>
+        <a:xfrm>
+          <a:off x="0" y="0"/>
+          <a:ext cx="0" cy="0"/>
+          <a:chOff x="0" y="0"/>
+          <a:chExt cx="0" cy="0"/>
+        </a:xfrm>
+      </p:grpSpPr>
+      <p:sp>
+        <p:nvSpPr>
+          <p:cNvPr id="2" name="Header Placeholder 1"/>
+          <p:cNvSpPr>
+            <a:spLocks noGrp="1"/>
+          </p:cNvSpPr>
+          <p:nvPr>
+            <p:ph type="hdr" sz="quarter"/>
+          </p:nvPr>
+        </p:nvSpPr>
+        <p:spPr>
+          <a:xfrm>
+            <a:off x="0" y="0"/>
+            <a:ext cx="2971800" cy="458788"/>
+          </a:xfrm>
+          <a:prstGeom prst="rect">
+            <a:avLst/>
+          </a:prstGeom>
+        </p:spPr>
+        <p:txBody>
+          <a:bodyPr vert="horz" lIns="91440" tIns="45720" rIns="91440" bIns="45720" rtlCol="0"/>
+          <a:lstStyle>
+            <a:lvl1pPr algn="l">
+              <a:defRPr sz="1200"/>
+            </a:lvl1pPr>
+          </a:lstStyle>
+          <a:p>
+            <a:endParaRPr lang="en-US"/>
+          </a:p>
+        </p:txBody>
+      </p:sp>
+      <p:sp>
+        <p:nvSpPr>
+          <p:cNvPr id="3" name="Date Placeholder 2"/>
+          <p:cNvSpPr>
+            <a:spLocks noGrp="1"/>
+          </p:cNvSpPr>
+          <p:nvPr>
+            <p:ph type="dt" idx="1"/>
+          </p:nvPr>
+        </p:nvSpPr>
+        <p:spPr>
+          <a:xfrm>
+            <a:off x="3884613" y="0"/>
+            <a:ext cx="2971800" cy="458788"/>
+          </a:xfrm>
+          <a:prstGeom prst="rect">
+            <a:avLst/>
+          </a:prstGeom>
+        </p:spPr>
+        <p:txBody>
+          <a:bodyPr vert="horz" lIns="91440" tIns="45720" rIns="91440" bIns="45720" rtlCol="0"/>
+          <a:lstStyle>
+            <a:lvl1pPr algn="r">
+              <a:defRPr sz="1200"/>
+            </a:lvl1pPr>
+          </a:lstStyle>
+          <a:p>
+            <a:fld id="{8E8B6A06-BD3B-4D82-AB84-EE46617E1784}" type="datetimeFigureOut">
+              <a:t>4/27/22</a:t>
+            </a:fld>
+            <a:endParaRPr lang="en-US"/>
+          </a:p>
+        </p:txBody>
+      </p:sp>
+      <p:sp>
+        <p:nvSpPr>
+          <p:cNvPr id="4" name="Slide Image Placeholder 3"/>
+          <p:cNvSpPr>
+            <a:spLocks noGrp="1" noRot="1" noChangeAspect="1"/>
+          </p:cNvSpPr>
+          <p:nvPr>
+            <p:ph type="sldImg" idx="2"/>
+          </p:nvPr>
+        </p:nvSpPr>
+        <p:spPr>
+          <a:xfrm>
+            <a:off x="685800" y="1143000"/>
+            <a:ext cx="5486400" cy="3086100"/>
+          </a:xfrm>
+          <a:prstGeom prst="rect">
+            <a:avLst/>
+          </a:prstGeom>
+          <a:noFill/>
+          <a:ln w="12700">
+            <a:solidFill>
+              <a:prstClr val="black"/>
+            </a:solidFill>
+          </a:ln>
+        </p:spPr>
+        <p:txBody>
+          <a:bodyPr vert="horz" lIns="91440" tIns="45720" rIns="91440" bIns="45720" rtlCol="0" anchor="ctr"/>
+          <a:lstStyle/>
+          <a:p>
+            <a:endParaRPr lang="en-US"/>
+          </a:p>
+        </p:txBody>
+      </p:sp>
+      <p:sp>
+        <p:nvSpPr>
+          <p:cNvPr id="5" name="Notes Placeholder 4"/>
+          <p:cNvSpPr>
+            <a:spLocks noGrp="1"/>
+          </p:cNvSpPr>
+          <p:nvPr>
+            <p:ph type="body" sz="quarter" idx="3"/>
+          </p:nvPr>
+        </p:nvSpPr>
+        <p:spPr>
+          <a:xfrm>
+            <a:off x="685800" y="4400550"/>
+            <a:ext cx="5486400" cy="3600450"/>
+          </a:xfrm>
+          <a:prstGeom prst="rect">
+            <a:avLst/>
+          </a:prstGeom>
+        </p:spPr>
+        <p:txBody>
+          <a:bodyPr vert="horz" lIns="91440" tIns="45720" rIns="91440" bIns="45720" rtlCol="0"/>
+          <a:lstStyle/>
+          <a:p>
+            <a:pPr lvl="0"/>
+            <a:r>
+              <a:rPr lang="en-US"/>
+              <a:t>Click to edit Master text styles</a:t>
+            </a:r>
+          </a:p>
+          <a:p>
+            <a:pPr lvl="1"/>
+            <a:r>
+              <a:rPr lang="en-US"/>
+              <a:t>Second level</a:t>
+            </a:r>
+          </a:p>
+          <a:p>
+            <a:pPr lvl="2"/>
+            <a:r>
+              <a:rPr lang="en-US"/>
+              <a:t>Third level</a:t>
+            </a:r>
+          </a:p>
+          <a:p>
+            <a:pPr lvl="3"/>
+            <a:r>
+              <a:rPr lang="en-US"/>
+              <a:t>Fourth level</a:t>
+            </a:r>
+          </a:p>
+          <a:p>
+            <a:pPr lvl="4"/>
+            <a:r>
+              <a:rPr lang="en-US"/>
+              <a:t>Fifth level</a:t>
+            </a:r>
+          </a:p>
+        </p:txBody>
+      </p:sp>
+      <p:sp>
+        <p:nvSpPr>
+          <p:cNvPr id="6" name="Footer Placeholder 5"/>
+          <p:cNvSpPr>
+            <a:spLocks noGrp="1"/>
+          </p:cNvSpPr>
+          <p:nvPr>
+            <p:ph type="ftr" sz="quarter" idx="4"/>
+          </p:nvPr>
+        </p:nvSpPr>
+        <p:spPr>
+          <a:xfrm>
+            <a:off x="0" y="8685213"/>
+            <a:ext cx="2971800" cy="458787"/>
+          </a:xfrm>
+          <a:prstGeom prst="rect">
+            <a:avLst/>
+          </a:prstGeom>
+        </p:spPr>
+        <p:txBody>
+          <a:bodyPr vert="horz" lIns="91440" tIns="45720" rIns="91440" bIns="45720" rtlCol="0" anchor="b"/>
+          <a:lstStyle>
+            <a:lvl1pPr algn="l">
+              <a:defRPr sz="1200"/>
+            </a:lvl1pPr>
+          </a:lstStyle>
+          <a:p>
+            <a:endParaRPr lang="en-US"/>
+          </a:p>
+        </p:txBody>
+      </p:sp>
+      <p:sp>
+        <p:nvSpPr>
+          <p:cNvPr id="7" name="Slide Number Placeholder 6"/>
+          <p:cNvSpPr>
+            <a:spLocks noGrp="1"/>
+          </p:cNvSpPr>
+          <p:nvPr>
+            <p:ph type="sldNum" sz="quarter" idx="5"/>
+          </p:nvPr>
+        </p:nvSpPr>
+        <p:spPr>
+          <a:xfrm>
+            <a:off x="3884613" y="8685213"/>
+            <a:ext cx="2971800" cy="458787"/>
+          </a:xfrm>
+          <a:prstGeom prst="rect">
+            <a:avLst/>
+          </a:prstGeom>
+        </p:spPr>
+        <p:txBody>
+          <a:bodyPr vert="horz" lIns="91440" tIns="45720" rIns="91440" bIns="45720" rtlCol="0" anchor="b"/>
+          <a:lstStyle>
+            <a:lvl1pPr algn="r">
+              <a:defRPr sz="1200"/>
+            </a:lvl1pPr>
+          </a:lstStyle>
+          <a:p>
+            <a:fld id="{3AD81792-D2DB-45FA-A2B8-332099C9B951}" type="slidenum">
+              <a:t>‹#›</a:t>
+            </a:fld>
+            <a:endParaRPr lang="en-US"/>
+          </a:p>
+        </p:txBody>
+      </p:sp>
+    </p:spTree>
+    <p:extLst>
+      <p:ext uri="{BB962C8B-B14F-4D97-AF65-F5344CB8AC3E}">
+        <p14:creationId xmlns:p14="http://schemas.microsoft.com/office/powerpoint/2010/main" val="4124718611"/>
+      </p:ext>
+    </p:extLst>
+  </p:cSld>
+  <p:clrMap bg1="lt1" tx1="dk1" bg2="lt2" tx2="dk2" accent1="accent1" accent2="accent2" accent3="accent3" accent4="accent4" accent5="accent5" accent6="accent6" hlink="hlink" folHlink="folHlink"/>
+  <p:notesStyle>
+    <a:lvl1pPr marL="0" algn="l" defTabSz="914400" rtl="0" eaLnBrk="1" latinLnBrk="0" hangingPunct="1">
+      <a:defRPr sz="1200" kern="1200">
+        <a:solidFill>
+          <a:schemeClr val="tx1"/>
+        </a:solidFill>
+        <a:latin typeface="+mn-lt"/>
+        <a:ea typeface="+mn-ea"/>
+        <a:cs typeface="+mn-cs"/>
+      </a:defRPr>
+    </a:lvl1pPr>
+    <a:lvl2pPr marL="457200" algn="l" defTabSz="914400" rtl="0" eaLnBrk="1" latinLnBrk="0" hangingPunct="1">
+      <a:defRPr sz="1200" kern="1200">
+        <a:solidFill>
+          <a:schemeClr val="tx1"/>
+        </a:solidFill>
+        <a:latin typeface="+mn-lt"/>
+        <a:ea typeface="+mn-ea"/>
+        <a:cs typeface="+mn-cs"/>
+      </a:defRPr>
+    </a:lvl2pPr>
+    <a:lvl3pPr marL="914400" algn="l" defTabSz="914400" rtl="0" eaLnBrk="1" latinLnBrk="0" hangingPunct="1">
+      <a:defRPr sz="1200" kern="1200">
+        <a:solidFill>
+          <a:schemeClr val="tx1"/>
+        </a:solidFill>
+        <a:latin typeface="+mn-lt"/>
+        <a:ea typeface="+mn-ea"/>
+        <a:cs typeface="+mn-cs"/>
+      </a:defRPr>
+    </a:lvl3pPr>
+    <a:lvl4pPr marL="1371600" algn="l" defTabSz="914400" rtl="0" eaLnBrk="1" latinLnBrk="0" hangingPunct="1">
+      <a:defRPr sz="1200" kern="1200">
+        <a:solidFill>
+          <a:schemeClr val="tx1"/>
+        </a:solidFill>
+        <a:latin typeface="+mn-lt"/>
+        <a:ea typeface="+mn-ea"/>
+        <a:cs typeface="+mn-cs"/>
+      </a:defRPr>
+    </a:lvl4pPr>
+    <a:lvl5pPr marL="1828800" algn="l" defTabSz="914400" rtl="0" eaLnBrk="1" latinLnBrk="0" hangingPunct="1">
+      <a:defRPr sz="1200" kern="1200">
+        <a:solidFill>
+          <a:schemeClr val="tx1"/>
+        </a:solidFill>
+        <a:latin typeface="+mn-lt"/>
+        <a:ea typeface="+mn-ea"/>
+        <a:cs typeface="+mn-cs"/>
+      </a:defRPr>
+    </a:lvl5pPr>
+    <a:lvl6pPr marL="2286000" algn="l" defTabSz="914400" rtl="0" eaLnBrk="1" latinLnBrk="0" hangingPunct="1">
+      <a:defRPr sz="1200" kern="1200">
+        <a:solidFill>
+          <a:schemeClr val="tx1"/>
+        </a:solidFill>
+        <a:latin typeface="+mn-lt"/>
+        <a:ea typeface="+mn-ea"/>
+        <a:cs typeface="+mn-cs"/>
+      </a:defRPr>
+    </a:lvl6pPr>
+    <a:lvl7pPr marL="2743200" algn="l" defTabSz="914400" rtl="0" eaLnBrk="1" latinLnBrk="0" hangingPunct="1">
+      <a:defRPr sz="1200" kern="1200">
+        <a:solidFill>
+          <a:schemeClr val="tx1"/>
+        </a:solidFill>
+        <a:latin typeface="+mn-lt"/>
+        <a:ea typeface="+mn-ea"/>
+        <a:cs typeface="+mn-cs"/>
+      </a:defRPr>
+    </a:lvl7pPr>
+    <a:lvl8pPr marL="3200400" algn="l" defTabSz="914400" rtl="0" eaLnBrk="1" latinLnBrk="0" hangingPunct="1">
+      <a:defRPr sz="1200" kern="1200">
+        <a:solidFill>
+          <a:schemeClr val="tx1"/>
+        </a:solidFill>
+        <a:latin typeface="+mn-lt"/>
+        <a:ea typeface="+mn-ea"/>
+        <a:cs typeface="+mn-cs"/>
+      </a:defRPr>
+    </a:lvl8pPr>
+    <a:lvl9pPr marL="3657600" algn="l" defTabSz="914400" rtl="0" eaLnBrk="1" latinLnBrk="0" hangingPunct="1">
+      <a:defRPr sz="1200" kern="1200">
+        <a:solidFill>
+          <a:schemeClr val="tx1"/>
+        </a:solidFill>
+        <a:latin typeface="+mn-lt"/>
+        <a:ea typeface="+mn-ea"/>
+        <a:cs typeface="+mn-cs"/>
+      </a:defRPr>
+    </a:lvl9pPr>
+  </p:notesStyle>
+</p:notesMaster>
+</file>
+
+<file path=ppt/notesSlides/notesSlide1.xml><?xml version="1.0" encoding="utf-8"?>
+<p:notes xmlns:a="http://schemas.openxmlformats.org/drawingml/2006/main" xmlns:r="http://schemas.openxmlformats.org/officeDocument/2006/relationships" xmlns:p="http://schemas.openxmlformats.org/presentationml/2006/main">
+  <p:cSld>
+    <p:spTree>
+      <p:nvGrpSpPr>
+        <p:cNvPr id="1" name=""/>
+        <p:cNvGrpSpPr/>
+        <p:nvPr/>
+      </p:nvGrpSpPr>
+      <p:grpSpPr>
+        <a:xfrm>
+          <a:off x="0" y="0"/>
+          <a:ext cx="0" cy="0"/>
+          <a:chOff x="0" y="0"/>
+          <a:chExt cx="0" cy="0"/>
+        </a:xfrm>
+      </p:grpSpPr>
+      <p:sp>
+        <p:nvSpPr>
+          <p:cNvPr id="2" name="Slide Image Placeholder 1"/>
+          <p:cNvSpPr>
+            <a:spLocks noGrp="1" noRot="1" noChangeAspect="1"/>
+          </p:cNvSpPr>
+          <p:nvPr>
+            <p:ph type="sldImg"/>
+          </p:nvPr>
+        </p:nvSpPr>
+        <p:spPr/>
+      </p:sp>
+      <p:sp>
+        <p:nvSpPr>
+          <p:cNvPr id="3" name="Notes Placeholder 2"/>
+          <p:cNvSpPr>
+            <a:spLocks noGrp="1"/>
+          </p:cNvSpPr>
+          <p:nvPr>
+            <p:ph type="body" idx="1"/>
+          </p:nvPr>
+        </p:nvSpPr>
+        <p:spPr/>
+        <p:txBody>
+          <a:bodyPr/>
+          <a:lstStyle/>
+          <a:p>
+            <a:pPr marL="285750" indent="-285750">
+              <a:lnSpc>
+                <a:spcPct val="90000"/>
+              </a:lnSpc>
+              <a:spcBef>
+                <a:spcPts val="1000"/>
+              </a:spcBef>
+              <a:buFont typeface="Arial"/>
+              <a:buChar char="•"/>
+            </a:pPr>
+            <a:r>
+              <a:rPr lang="en-US"/>
+              <a:t>Modern telephone services are split between using traditional telephone networks and IP networks, such as the Internet. Voice over IP (VoIP) uses IP networks to make telephone calls, but it requires a machine running IP-PBX software to connect devices together for calls. A Raspberry Pi, a cheap and energy efficient single board computer, can run IP-PBX software and control calls made over VoIP, but it is limited by its low memory and weak CPU. </a:t>
+            </a:r>
+          </a:p>
+          <a:p>
+            <a:pPr marL="285750" indent="-285750">
+              <a:lnSpc>
+                <a:spcPct val="90000"/>
+              </a:lnSpc>
+              <a:spcBef>
+                <a:spcPts val="1000"/>
+              </a:spcBef>
+              <a:buFont typeface="Arial"/>
+              <a:buChar char="•"/>
+            </a:pPr>
+            <a:r>
+              <a:rPr lang="en-US"/>
+              <a:t>An examination has been performed to see how well the Raspberry Pi fulfills its IP-PBX functions with a variety of stressors, with the goal of determining the suitability of Raspberry Pis for IP-PBX software.</a:t>
+            </a:r>
+            <a:endParaRPr lang="en-US">
+              <a:cs typeface="Calibri"/>
+            </a:endParaRPr>
+          </a:p>
+          <a:p>
+            <a:pPr marL="285750" indent="-285750">
+              <a:lnSpc>
+                <a:spcPct val="90000"/>
+              </a:lnSpc>
+              <a:spcBef>
+                <a:spcPts val="1000"/>
+              </a:spcBef>
+              <a:buFont typeface="Arial"/>
+              <a:buChar char="•"/>
+            </a:pPr>
+            <a:r>
+              <a:rPr lang="en-US"/>
+              <a:t>These tests were performed by running IP-PBX software on a Raspberry Pi, with calls made at different distances from the device and with the device working with different network difficulties.</a:t>
+            </a:r>
+          </a:p>
+        </p:txBody>
+      </p:sp>
+      <p:sp>
+        <p:nvSpPr>
+          <p:cNvPr id="4" name="Slide Number Placeholder 3"/>
+          <p:cNvSpPr>
+            <a:spLocks noGrp="1"/>
+          </p:cNvSpPr>
+          <p:nvPr>
+            <p:ph type="sldNum" sz="quarter" idx="5"/>
+          </p:nvPr>
+        </p:nvSpPr>
+        <p:spPr/>
+        <p:txBody>
+          <a:bodyPr/>
+          <a:lstStyle/>
+          <a:p>
+            <a:fld id="{3AD81792-D2DB-45FA-A2B8-332099C9B951}" type="slidenum">
+              <a:t>4</a:t>
+            </a:fld>
+            <a:endParaRPr lang="en-US"/>
+          </a:p>
+        </p:txBody>
+      </p:sp>
+    </p:spTree>
+    <p:extLst>
+      <p:ext uri="{BB962C8B-B14F-4D97-AF65-F5344CB8AC3E}">
+        <p14:creationId xmlns:p14="http://schemas.microsoft.com/office/powerpoint/2010/main" val="1348242852"/>
+      </p:ext>
+    </p:extLst>
+  </p:cSld>
+  <p:clrMapOvr>
+    <a:masterClrMapping/>
+  </p:clrMapOvr>
+</p:notes>
+</file>
+
+<file path=ppt/notesSlides/notesSlide2.xml><?xml version="1.0" encoding="utf-8"?>
+<p:notes xmlns:a="http://schemas.openxmlformats.org/drawingml/2006/main" xmlns:r="http://schemas.openxmlformats.org/officeDocument/2006/relationships" xmlns:p="http://schemas.openxmlformats.org/presentationml/2006/main">
+  <p:cSld>
+    <p:spTree>
+      <p:nvGrpSpPr>
+        <p:cNvPr id="1" name=""/>
+        <p:cNvGrpSpPr/>
+        <p:nvPr/>
+      </p:nvGrpSpPr>
+      <p:grpSpPr>
+        <a:xfrm>
+          <a:off x="0" y="0"/>
+          <a:ext cx="0" cy="0"/>
+          <a:chOff x="0" y="0"/>
+          <a:chExt cx="0" cy="0"/>
+        </a:xfrm>
+      </p:grpSpPr>
+      <p:sp>
+        <p:nvSpPr>
+          <p:cNvPr id="2" name="Slide Image Placeholder 1"/>
+          <p:cNvSpPr>
+            <a:spLocks noGrp="1" noRot="1" noChangeAspect="1"/>
+          </p:cNvSpPr>
+          <p:nvPr>
+            <p:ph type="sldImg"/>
+          </p:nvPr>
+        </p:nvSpPr>
+        <p:spPr/>
+      </p:sp>
+      <p:sp>
+        <p:nvSpPr>
+          <p:cNvPr id="3" name="Notes Placeholder 2"/>
+          <p:cNvSpPr>
+            <a:spLocks noGrp="1"/>
+          </p:cNvSpPr>
+          <p:nvPr>
+            <p:ph type="body" idx="1"/>
+          </p:nvPr>
+        </p:nvSpPr>
+        <p:spPr/>
+        <p:txBody>
+          <a:bodyPr/>
+          <a:lstStyle/>
+          <a:p>
+            <a:pPr marL="285750" indent="-285750">
+              <a:lnSpc>
+                <a:spcPct val="90000"/>
+              </a:lnSpc>
+              <a:spcBef>
+                <a:spcPts val="1000"/>
+              </a:spcBef>
+              <a:buFont typeface="Arial"/>
+              <a:buChar char="•"/>
+            </a:pPr>
+            <a:r>
+              <a:rPr lang="en-US"/>
+              <a:t>Private Branch Exchange (PBX) is a technology which allows telephones to call each other, forwarding audio and controlling call behavior. While other technologies can provide similar services, PBX technology is designed for calls within a private institution.</a:t>
+            </a:r>
+          </a:p>
+          <a:p>
+            <a:pPr marL="285750" indent="-285750">
+              <a:lnSpc>
+                <a:spcPct val="90000"/>
+              </a:lnSpc>
+              <a:spcBef>
+                <a:spcPts val="1000"/>
+              </a:spcBef>
+              <a:buFont typeface="Arial"/>
+              <a:buChar char="•"/>
+            </a:pPr>
+            <a:r>
+              <a:rPr lang="en-US"/>
+              <a:t>With the advent of the internet, Voice over IP (VoIP) was created, allowing for telephone services to be provided over IP networks instead of standard telephone networks. Today, IP networks are so cheap and widespread that it is more cost efficient to use them for telephony than standard phone networks.</a:t>
+            </a:r>
+            <a:endParaRPr lang="en-US">
+              <a:cs typeface="Calibri"/>
+            </a:endParaRPr>
+          </a:p>
+          <a:p>
+            <a:pPr marL="285750" indent="-285750">
+              <a:lnSpc>
+                <a:spcPct val="90000"/>
+              </a:lnSpc>
+              <a:spcBef>
+                <a:spcPts val="1000"/>
+              </a:spcBef>
+              <a:buFont typeface="Arial"/>
+              <a:buChar char="•"/>
+            </a:pPr>
+            <a:r>
+              <a:rPr lang="en-US"/>
+              <a:t>Hosting communication within a limited area, while still maintaining access to the entities outside is a natural characteristics of IoT scenarios and the reason IP-based PBX paradigm is suitable for IoT. </a:t>
+            </a:r>
+          </a:p>
+        </p:txBody>
+      </p:sp>
+      <p:sp>
+        <p:nvSpPr>
+          <p:cNvPr id="4" name="Slide Number Placeholder 3"/>
+          <p:cNvSpPr>
+            <a:spLocks noGrp="1"/>
+          </p:cNvSpPr>
+          <p:nvPr>
+            <p:ph type="sldNum" sz="quarter" idx="5"/>
+          </p:nvPr>
+        </p:nvSpPr>
+        <p:spPr/>
+        <p:txBody>
+          <a:bodyPr/>
+          <a:lstStyle/>
+          <a:p>
+            <a:fld id="{3AD81792-D2DB-45FA-A2B8-332099C9B951}" type="slidenum">
+              <a:t>6</a:t>
+            </a:fld>
+            <a:endParaRPr lang="en-US"/>
+          </a:p>
+        </p:txBody>
+      </p:sp>
+    </p:spTree>
+    <p:extLst>
+      <p:ext uri="{BB962C8B-B14F-4D97-AF65-F5344CB8AC3E}">
+        <p14:creationId xmlns:p14="http://schemas.microsoft.com/office/powerpoint/2010/main" val="211534443"/>
+      </p:ext>
+    </p:extLst>
+  </p:cSld>
+  <p:clrMapOvr>
+    <a:masterClrMapping/>
+  </p:clrMapOvr>
+</p:notes>
+</file>
+
+<file path=ppt/notesSlides/notesSlide3.xml><?xml version="1.0" encoding="utf-8"?>
+<p:notes xmlns:a="http://schemas.openxmlformats.org/drawingml/2006/main" xmlns:r="http://schemas.openxmlformats.org/officeDocument/2006/relationships" xmlns:p="http://schemas.openxmlformats.org/presentationml/2006/main">
+  <p:cSld>
+    <p:spTree>
+      <p:nvGrpSpPr>
+        <p:cNvPr id="1" name=""/>
+        <p:cNvGrpSpPr/>
+        <p:nvPr/>
+      </p:nvGrpSpPr>
+      <p:grpSpPr>
+        <a:xfrm>
+          <a:off x="0" y="0"/>
+          <a:ext cx="0" cy="0"/>
+          <a:chOff x="0" y="0"/>
+          <a:chExt cx="0" cy="0"/>
+        </a:xfrm>
+      </p:grpSpPr>
+      <p:sp>
+        <p:nvSpPr>
+          <p:cNvPr id="2" name="Slide Image Placeholder 1"/>
+          <p:cNvSpPr>
+            <a:spLocks noGrp="1" noRot="1" noChangeAspect="1"/>
+          </p:cNvSpPr>
+          <p:nvPr>
+            <p:ph type="sldImg"/>
+          </p:nvPr>
+        </p:nvSpPr>
+        <p:spPr/>
+      </p:sp>
+      <p:sp>
+        <p:nvSpPr>
+          <p:cNvPr id="3" name="Notes Placeholder 2"/>
+          <p:cNvSpPr>
+            <a:spLocks noGrp="1"/>
+          </p:cNvSpPr>
+          <p:nvPr>
+            <p:ph type="body" idx="1"/>
+          </p:nvPr>
+        </p:nvSpPr>
+        <p:spPr/>
+        <p:txBody>
+          <a:bodyPr/>
+          <a:lstStyle/>
+          <a:p>
+            <a:r>
+              <a:rPr lang="en-US" dirty="0">
+                <a:cs typeface="Calibri"/>
+              </a:rPr>
+              <a:t>To test the Raspberry Pi, the machine ran an open source implementation of IP-PBX called Asterisk PBX. While Asterisk PBX was running, two phones were registered on the software using Zoiper, a VoIP implementation available on smartphones.</a:t>
+            </a:r>
+          </a:p>
+          <a:p>
+            <a:r>
+              <a:rPr lang="en-US" dirty="0">
+                <a:cs typeface="Calibri"/>
+              </a:rPr>
+              <a:t>There were two primary methods for testing the functionality of the Raspberry Pi running the IP-PBX software.</a:t>
+            </a:r>
+            <a:endParaRPr lang="en-US" dirty="0"/>
+          </a:p>
+          <a:p>
+            <a:pPr lvl="1"/>
+            <a:r>
+              <a:rPr lang="en-US" dirty="0">
+                <a:cs typeface="Calibri"/>
+              </a:rPr>
+              <a:t>Make calls at a variety of locations of different distance from the Raspberry Pi</a:t>
+            </a:r>
+          </a:p>
+          <a:p>
+            <a:pPr lvl="2"/>
+            <a:r>
+              <a:rPr lang="en-US" dirty="0">
+                <a:cs typeface="Calibri"/>
+              </a:rPr>
+              <a:t>In the same room</a:t>
+            </a:r>
+          </a:p>
+          <a:p>
+            <a:pPr lvl="2"/>
+            <a:r>
+              <a:rPr lang="en-US" dirty="0">
+                <a:cs typeface="Calibri"/>
+              </a:rPr>
+              <a:t>On the same floor</a:t>
+            </a:r>
+          </a:p>
+          <a:p>
+            <a:pPr lvl="2"/>
+            <a:r>
+              <a:rPr lang="en-US" dirty="0">
+                <a:cs typeface="Calibri"/>
+              </a:rPr>
+              <a:t>In the same building</a:t>
+            </a:r>
+          </a:p>
+          <a:p>
+            <a:pPr lvl="2"/>
+            <a:r>
+              <a:rPr lang="en-US" dirty="0">
+                <a:cs typeface="Calibri"/>
+              </a:rPr>
+              <a:t>Outside same building</a:t>
+            </a:r>
+          </a:p>
+          <a:p>
+            <a:pPr lvl="2"/>
+            <a:r>
+              <a:rPr lang="en-US" dirty="0">
+                <a:cs typeface="Calibri"/>
+              </a:rPr>
+              <a:t>In a different building</a:t>
+            </a:r>
+          </a:p>
+          <a:p>
+            <a:pPr lvl="1"/>
+            <a:r>
+              <a:rPr lang="en-US" dirty="0">
+                <a:cs typeface="Calibri"/>
+              </a:rPr>
+              <a:t>Make calls while the Raspberry Pi is emulating stressful network conditions using the </a:t>
+            </a:r>
+            <a:r>
+              <a:rPr lang="en-US" dirty="0" err="1">
+                <a:latin typeface="Linux"/>
+                <a:cs typeface="Calibri"/>
+              </a:rPr>
+              <a:t>tc</a:t>
+            </a:r>
+            <a:r>
+              <a:rPr lang="en-US" dirty="0">
+                <a:latin typeface="Linux"/>
+                <a:cs typeface="Calibri"/>
+              </a:rPr>
+              <a:t> […] </a:t>
+            </a:r>
+            <a:r>
+              <a:rPr lang="en-US" dirty="0" err="1">
+                <a:latin typeface="Linux"/>
+                <a:cs typeface="Calibri"/>
+              </a:rPr>
+              <a:t>netem</a:t>
+            </a:r>
+            <a:r>
+              <a:rPr lang="en-US" dirty="0">
+                <a:latin typeface="Linux"/>
+                <a:cs typeface="Calibri"/>
+              </a:rPr>
+              <a:t> set of commands.</a:t>
+            </a:r>
+          </a:p>
+          <a:p>
+            <a:pPr lvl="2"/>
+            <a:r>
+              <a:rPr lang="en-US" dirty="0">
+                <a:latin typeface="Linux"/>
+                <a:cs typeface="Calibri"/>
+              </a:rPr>
+              <a:t>Add a delay to outgoing packets.</a:t>
+            </a:r>
+          </a:p>
+          <a:p>
+            <a:pPr lvl="2"/>
+            <a:r>
+              <a:rPr lang="en-US" dirty="0">
+                <a:latin typeface="Linux"/>
+                <a:cs typeface="Calibri"/>
+              </a:rPr>
+              <a:t>Add jitter to outgoing packets.</a:t>
+            </a:r>
+          </a:p>
+          <a:p>
+            <a:pPr lvl="2"/>
+            <a:r>
+              <a:rPr lang="en-US" dirty="0">
+                <a:latin typeface="Linux"/>
+                <a:cs typeface="Calibri"/>
+              </a:rPr>
+              <a:t>Add corruption to outgoing packets.</a:t>
+            </a:r>
+          </a:p>
+          <a:p>
+            <a:pPr lvl="2"/>
+            <a:r>
+              <a:rPr lang="en-US" dirty="0">
+                <a:latin typeface="Linux"/>
+                <a:cs typeface="Calibri"/>
+              </a:rPr>
+              <a:t>Add chance of loss to outgoing packets.</a:t>
+            </a:r>
+          </a:p>
+          <a:p>
+            <a:endParaRPr lang="en-US" dirty="0"/>
+          </a:p>
+        </p:txBody>
+      </p:sp>
+      <p:sp>
+        <p:nvSpPr>
+          <p:cNvPr id="4" name="Slide Number Placeholder 3"/>
+          <p:cNvSpPr>
+            <a:spLocks noGrp="1"/>
+          </p:cNvSpPr>
+          <p:nvPr>
+            <p:ph type="sldNum" sz="quarter" idx="5"/>
+          </p:nvPr>
+        </p:nvSpPr>
+        <p:spPr/>
+        <p:txBody>
+          <a:bodyPr/>
+          <a:lstStyle/>
+          <a:p>
+            <a:fld id="{3AD81792-D2DB-45FA-A2B8-332099C9B951}" type="slidenum">
+              <a:rPr lang="en-US" smtClean="0"/>
+              <a:t>15</a:t>
+            </a:fld>
+            <a:endParaRPr lang="en-US"/>
+          </a:p>
+        </p:txBody>
+      </p:sp>
+    </p:spTree>
+    <p:extLst>
+      <p:ext uri="{BB962C8B-B14F-4D97-AF65-F5344CB8AC3E}">
+        <p14:creationId xmlns:p14="http://schemas.microsoft.com/office/powerpoint/2010/main" val="951337474"/>
+      </p:ext>
+    </p:extLst>
+  </p:cSld>
+  <p:clrMapOvr>
+    <a:masterClrMapping/>
+  </p:clrMapOvr>
+</p:notes>
+</file>
+
+<file path=ppt/notesSlides/notesSlide4.xml><?xml version="1.0" encoding="utf-8"?>
+<p:notes xmlns:a="http://schemas.openxmlformats.org/drawingml/2006/main" xmlns:r="http://schemas.openxmlformats.org/officeDocument/2006/relationships" xmlns:p="http://schemas.openxmlformats.org/presentationml/2006/main">
+  <p:cSld>
+    <p:spTree>
+      <p:nvGrpSpPr>
+        <p:cNvPr id="1" name=""/>
+        <p:cNvGrpSpPr/>
+        <p:nvPr/>
+      </p:nvGrpSpPr>
+      <p:grpSpPr>
+        <a:xfrm>
+          <a:off x="0" y="0"/>
+          <a:ext cx="0" cy="0"/>
+          <a:chOff x="0" y="0"/>
+          <a:chExt cx="0" cy="0"/>
+        </a:xfrm>
+      </p:grpSpPr>
+      <p:sp>
+        <p:nvSpPr>
+          <p:cNvPr id="2" name="Slide Image Placeholder 1"/>
+          <p:cNvSpPr>
+            <a:spLocks noGrp="1" noRot="1" noChangeAspect="1"/>
+          </p:cNvSpPr>
+          <p:nvPr>
+            <p:ph type="sldImg"/>
+          </p:nvPr>
+        </p:nvSpPr>
+        <p:spPr/>
+      </p:sp>
+      <p:sp>
+        <p:nvSpPr>
+          <p:cNvPr id="3" name="Notes Placeholder 2"/>
+          <p:cNvSpPr>
+            <a:spLocks noGrp="1"/>
+          </p:cNvSpPr>
+          <p:nvPr>
+            <p:ph type="body" idx="1"/>
+          </p:nvPr>
+        </p:nvSpPr>
+        <p:spPr/>
+        <p:txBody>
+          <a:bodyPr/>
+          <a:lstStyle/>
+          <a:p>
+            <a:r>
+              <a:rPr lang="en-US" dirty="0">
+                <a:cs typeface="Calibri"/>
+              </a:rPr>
+              <a:t>To test the Raspberry Pi, the machine ran an open source implementation of IP-PBX called Asterisk PBX. While Asterisk PBX was running, two phones were registered on the software using Zoiper, a VoIP implementation available on smartphones.</a:t>
+            </a:r>
+          </a:p>
+          <a:p>
+            <a:r>
+              <a:rPr lang="en-US" dirty="0">
+                <a:cs typeface="Calibri"/>
+              </a:rPr>
+              <a:t>There were two primary methods for testing the functionality of the Raspberry Pi running the IP-PBX software.</a:t>
+            </a:r>
+            <a:endParaRPr lang="en-US" dirty="0"/>
+          </a:p>
+          <a:p>
+            <a:pPr lvl="1"/>
+            <a:r>
+              <a:rPr lang="en-US" dirty="0">
+                <a:cs typeface="Calibri"/>
+              </a:rPr>
+              <a:t>Make calls at a variety of locations of different distance from the Raspberry Pi</a:t>
+            </a:r>
+          </a:p>
+          <a:p>
+            <a:pPr lvl="2"/>
+            <a:r>
+              <a:rPr lang="en-US" dirty="0">
+                <a:cs typeface="Calibri"/>
+              </a:rPr>
+              <a:t>In the same room</a:t>
+            </a:r>
+          </a:p>
+          <a:p>
+            <a:pPr lvl="2"/>
+            <a:r>
+              <a:rPr lang="en-US" dirty="0">
+                <a:cs typeface="Calibri"/>
+              </a:rPr>
+              <a:t>On the same floor</a:t>
+            </a:r>
+          </a:p>
+          <a:p>
+            <a:pPr lvl="2"/>
+            <a:r>
+              <a:rPr lang="en-US" dirty="0">
+                <a:cs typeface="Calibri"/>
+              </a:rPr>
+              <a:t>In the same building</a:t>
+            </a:r>
+          </a:p>
+          <a:p>
+            <a:pPr lvl="2"/>
+            <a:r>
+              <a:rPr lang="en-US" dirty="0">
+                <a:cs typeface="Calibri"/>
+              </a:rPr>
+              <a:t>Outside same building</a:t>
+            </a:r>
+          </a:p>
+          <a:p>
+            <a:pPr lvl="2"/>
+            <a:r>
+              <a:rPr lang="en-US" dirty="0">
+                <a:cs typeface="Calibri"/>
+              </a:rPr>
+              <a:t>In a different building</a:t>
+            </a:r>
+          </a:p>
+          <a:p>
+            <a:pPr lvl="1"/>
+            <a:r>
+              <a:rPr lang="en-US" dirty="0">
+                <a:cs typeface="Calibri"/>
+              </a:rPr>
+              <a:t>Make calls while the Raspberry Pi is emulating stressful network conditions using the </a:t>
+            </a:r>
+            <a:r>
+              <a:rPr lang="en-US" dirty="0" err="1">
+                <a:latin typeface="Linux"/>
+                <a:cs typeface="Calibri"/>
+              </a:rPr>
+              <a:t>tc</a:t>
+            </a:r>
+            <a:r>
+              <a:rPr lang="en-US" dirty="0">
+                <a:latin typeface="Linux"/>
+                <a:cs typeface="Calibri"/>
+              </a:rPr>
+              <a:t> […] </a:t>
+            </a:r>
+            <a:r>
+              <a:rPr lang="en-US" dirty="0" err="1">
+                <a:latin typeface="Linux"/>
+                <a:cs typeface="Calibri"/>
+              </a:rPr>
+              <a:t>netem</a:t>
+            </a:r>
+            <a:r>
+              <a:rPr lang="en-US" dirty="0">
+                <a:latin typeface="Linux"/>
+                <a:cs typeface="Calibri"/>
+              </a:rPr>
+              <a:t> set of commands.</a:t>
+            </a:r>
+          </a:p>
+          <a:p>
+            <a:pPr lvl="2"/>
+            <a:r>
+              <a:rPr lang="en-US" dirty="0">
+                <a:latin typeface="Linux"/>
+                <a:cs typeface="Calibri"/>
+              </a:rPr>
+              <a:t>Add a delay to outgoing packets.</a:t>
+            </a:r>
+          </a:p>
+          <a:p>
+            <a:pPr lvl="2"/>
+            <a:r>
+              <a:rPr lang="en-US" dirty="0">
+                <a:latin typeface="Linux"/>
+                <a:cs typeface="Calibri"/>
+              </a:rPr>
+              <a:t>Add jitter to outgoing packets.</a:t>
+            </a:r>
+          </a:p>
+          <a:p>
+            <a:pPr lvl="2"/>
+            <a:r>
+              <a:rPr lang="en-US" dirty="0">
+                <a:latin typeface="Linux"/>
+                <a:cs typeface="Calibri"/>
+              </a:rPr>
+              <a:t>Add corruption to outgoing packets.</a:t>
+            </a:r>
+          </a:p>
+          <a:p>
+            <a:pPr lvl="2"/>
+            <a:r>
+              <a:rPr lang="en-US" dirty="0">
+                <a:latin typeface="Linux"/>
+                <a:cs typeface="Calibri"/>
+              </a:rPr>
+              <a:t>Add chance of loss to outgoing packets.</a:t>
+            </a:r>
+          </a:p>
+          <a:p>
+            <a:endParaRPr lang="en-US" dirty="0"/>
+          </a:p>
+        </p:txBody>
+      </p:sp>
+      <p:sp>
+        <p:nvSpPr>
+          <p:cNvPr id="4" name="Slide Number Placeholder 3"/>
+          <p:cNvSpPr>
+            <a:spLocks noGrp="1"/>
+          </p:cNvSpPr>
+          <p:nvPr>
+            <p:ph type="sldNum" sz="quarter" idx="5"/>
+          </p:nvPr>
+        </p:nvSpPr>
+        <p:spPr/>
+        <p:txBody>
+          <a:bodyPr/>
+          <a:lstStyle/>
+          <a:p>
+            <a:fld id="{3AD81792-D2DB-45FA-A2B8-332099C9B951}" type="slidenum">
+              <a:rPr lang="en-US" smtClean="0"/>
+              <a:t>16</a:t>
+            </a:fld>
+            <a:endParaRPr lang="en-US"/>
+          </a:p>
+        </p:txBody>
+      </p:sp>
+    </p:spTree>
+    <p:extLst>
+      <p:ext uri="{BB962C8B-B14F-4D97-AF65-F5344CB8AC3E}">
+        <p14:creationId xmlns:p14="http://schemas.microsoft.com/office/powerpoint/2010/main" val="3689864067"/>
+      </p:ext>
+    </p:extLst>
+  </p:cSld>
+  <p:clrMapOvr>
+    <a:masterClrMapping/>
+  </p:clrMapOvr>
+</p:notes>
+</file>
+
+<file path=ppt/notesSlides/notesSlide5.xml><?xml version="1.0" encoding="utf-8"?>
+<p:notes xmlns:a="http://schemas.openxmlformats.org/drawingml/2006/main" xmlns:r="http://schemas.openxmlformats.org/officeDocument/2006/relationships" xmlns:p="http://schemas.openxmlformats.org/presentationml/2006/main">
+  <p:cSld>
+    <p:spTree>
+      <p:nvGrpSpPr>
+        <p:cNvPr id="1" name=""/>
+        <p:cNvGrpSpPr/>
+        <p:nvPr/>
+      </p:nvGrpSpPr>
+      <p:grpSpPr>
+        <a:xfrm>
+          <a:off x="0" y="0"/>
+          <a:ext cx="0" cy="0"/>
+          <a:chOff x="0" y="0"/>
+          <a:chExt cx="0" cy="0"/>
+        </a:xfrm>
+      </p:grpSpPr>
+      <p:sp>
+        <p:nvSpPr>
+          <p:cNvPr id="2" name="Slide Image Placeholder 1"/>
+          <p:cNvSpPr>
+            <a:spLocks noGrp="1" noRot="1" noChangeAspect="1"/>
+          </p:cNvSpPr>
+          <p:nvPr>
+            <p:ph type="sldImg"/>
+          </p:nvPr>
+        </p:nvSpPr>
+        <p:spPr/>
+      </p:sp>
+      <p:sp>
+        <p:nvSpPr>
+          <p:cNvPr id="3" name="Notes Placeholder 2"/>
+          <p:cNvSpPr>
+            <a:spLocks noGrp="1"/>
+          </p:cNvSpPr>
+          <p:nvPr>
+            <p:ph type="body" idx="1"/>
+          </p:nvPr>
+        </p:nvSpPr>
+        <p:spPr/>
+        <p:txBody>
+          <a:bodyPr/>
+          <a:lstStyle/>
+          <a:p>
+            <a:r>
+              <a:rPr lang="en-US" dirty="0">
+                <a:cs typeface="Calibri"/>
+              </a:rPr>
+              <a:t>To test the Raspberry Pi, the machine ran an open source implementation of IP-PBX called Asterisk PBX. While Asterisk PBX was running, two phones were registered on the software using Zoiper, a VoIP implementation available on smartphones.</a:t>
+            </a:r>
+          </a:p>
+          <a:p>
+            <a:r>
+              <a:rPr lang="en-US" dirty="0">
+                <a:cs typeface="Calibri"/>
+              </a:rPr>
+              <a:t>There were two primary methods for testing the functionality of the Raspberry Pi running the IP-PBX software.</a:t>
+            </a:r>
+            <a:endParaRPr lang="en-US" dirty="0"/>
+          </a:p>
+          <a:p>
+            <a:pPr lvl="1"/>
+            <a:r>
+              <a:rPr lang="en-US" dirty="0">
+                <a:cs typeface="Calibri"/>
+              </a:rPr>
+              <a:t>Make calls at a variety of locations of different distance from the Raspberry Pi</a:t>
+            </a:r>
+          </a:p>
+          <a:p>
+            <a:pPr lvl="2"/>
+            <a:r>
+              <a:rPr lang="en-US" dirty="0">
+                <a:cs typeface="Calibri"/>
+              </a:rPr>
+              <a:t>In the same room</a:t>
+            </a:r>
+          </a:p>
+          <a:p>
+            <a:pPr lvl="2"/>
+            <a:r>
+              <a:rPr lang="en-US" dirty="0">
+                <a:cs typeface="Calibri"/>
+              </a:rPr>
+              <a:t>On the same floor</a:t>
+            </a:r>
+          </a:p>
+          <a:p>
+            <a:pPr lvl="2"/>
+            <a:r>
+              <a:rPr lang="en-US" dirty="0">
+                <a:cs typeface="Calibri"/>
+              </a:rPr>
+              <a:t>In the same building</a:t>
+            </a:r>
+          </a:p>
+          <a:p>
+            <a:pPr lvl="2"/>
+            <a:r>
+              <a:rPr lang="en-US" dirty="0">
+                <a:cs typeface="Calibri"/>
+              </a:rPr>
+              <a:t>Outside same building</a:t>
+            </a:r>
+          </a:p>
+          <a:p>
+            <a:pPr lvl="2"/>
+            <a:r>
+              <a:rPr lang="en-US" dirty="0">
+                <a:cs typeface="Calibri"/>
+              </a:rPr>
+              <a:t>In a different building</a:t>
+            </a:r>
+          </a:p>
+          <a:p>
+            <a:pPr lvl="1"/>
+            <a:r>
+              <a:rPr lang="en-US" dirty="0">
+                <a:cs typeface="Calibri"/>
+              </a:rPr>
+              <a:t>Make calls while the Raspberry Pi is emulating stressful network conditions using the </a:t>
+            </a:r>
+            <a:r>
+              <a:rPr lang="en-US" dirty="0" err="1">
+                <a:latin typeface="Linux"/>
+                <a:cs typeface="Calibri"/>
+              </a:rPr>
+              <a:t>tc</a:t>
+            </a:r>
+            <a:r>
+              <a:rPr lang="en-US" dirty="0">
+                <a:latin typeface="Linux"/>
+                <a:cs typeface="Calibri"/>
+              </a:rPr>
+              <a:t> […] </a:t>
+            </a:r>
+            <a:r>
+              <a:rPr lang="en-US" dirty="0" err="1">
+                <a:latin typeface="Linux"/>
+                <a:cs typeface="Calibri"/>
+              </a:rPr>
+              <a:t>netem</a:t>
+            </a:r>
+            <a:r>
+              <a:rPr lang="en-US" dirty="0">
+                <a:latin typeface="Linux"/>
+                <a:cs typeface="Calibri"/>
+              </a:rPr>
+              <a:t> set of commands.</a:t>
+            </a:r>
+          </a:p>
+          <a:p>
+            <a:pPr lvl="2"/>
+            <a:r>
+              <a:rPr lang="en-US" dirty="0">
+                <a:latin typeface="Linux"/>
+                <a:cs typeface="Calibri"/>
+              </a:rPr>
+              <a:t>Add a delay to outgoing packets.</a:t>
+            </a:r>
+          </a:p>
+          <a:p>
+            <a:pPr lvl="2"/>
+            <a:r>
+              <a:rPr lang="en-US" dirty="0">
+                <a:latin typeface="Linux"/>
+                <a:cs typeface="Calibri"/>
+              </a:rPr>
+              <a:t>Add jitter to outgoing packets.</a:t>
+            </a:r>
+          </a:p>
+          <a:p>
+            <a:pPr lvl="2"/>
+            <a:r>
+              <a:rPr lang="en-US" dirty="0">
+                <a:latin typeface="Linux"/>
+                <a:cs typeface="Calibri"/>
+              </a:rPr>
+              <a:t>Add corruption to outgoing packets.</a:t>
+            </a:r>
+          </a:p>
+          <a:p>
+            <a:pPr lvl="2"/>
+            <a:r>
+              <a:rPr lang="en-US" dirty="0">
+                <a:latin typeface="Linux"/>
+                <a:cs typeface="Calibri"/>
+              </a:rPr>
+              <a:t>Add chance of loss to outgoing packets.</a:t>
+            </a:r>
+          </a:p>
+          <a:p>
+            <a:endParaRPr lang="en-US" dirty="0"/>
+          </a:p>
+        </p:txBody>
+      </p:sp>
+      <p:sp>
+        <p:nvSpPr>
+          <p:cNvPr id="4" name="Slide Number Placeholder 3"/>
+          <p:cNvSpPr>
+            <a:spLocks noGrp="1"/>
+          </p:cNvSpPr>
+          <p:nvPr>
+            <p:ph type="sldNum" sz="quarter" idx="5"/>
+          </p:nvPr>
+        </p:nvSpPr>
+        <p:spPr/>
+        <p:txBody>
+          <a:bodyPr/>
+          <a:lstStyle/>
+          <a:p>
+            <a:fld id="{3AD81792-D2DB-45FA-A2B8-332099C9B951}" type="slidenum">
+              <a:rPr lang="en-US" smtClean="0"/>
+              <a:t>17</a:t>
+            </a:fld>
+            <a:endParaRPr lang="en-US"/>
+          </a:p>
+        </p:txBody>
+      </p:sp>
+    </p:spTree>
+    <p:extLst>
+      <p:ext uri="{BB962C8B-B14F-4D97-AF65-F5344CB8AC3E}">
+        <p14:creationId xmlns:p14="http://schemas.microsoft.com/office/powerpoint/2010/main" val="2671221801"/>
+      </p:ext>
+    </p:extLst>
+  </p:cSld>
+  <p:clrMapOvr>
+    <a:masterClrMapping/>
+  </p:clrMapOvr>
+</p:notes>
+</file>
+
+<file path=ppt/notesSlides/notesSlide6.xml><?xml version="1.0" encoding="utf-8"?>
+<p:notes xmlns:a="http://schemas.openxmlformats.org/drawingml/2006/main" xmlns:r="http://schemas.openxmlformats.org/officeDocument/2006/relationships" xmlns:p="http://schemas.openxmlformats.org/presentationml/2006/main">
+  <p:cSld>
+    <p:spTree>
+      <p:nvGrpSpPr>
+        <p:cNvPr id="1" name=""/>
+        <p:cNvGrpSpPr/>
+        <p:nvPr/>
+      </p:nvGrpSpPr>
+      <p:grpSpPr>
+        <a:xfrm>
+          <a:off x="0" y="0"/>
+          <a:ext cx="0" cy="0"/>
+          <a:chOff x="0" y="0"/>
+          <a:chExt cx="0" cy="0"/>
+        </a:xfrm>
+      </p:grpSpPr>
+      <p:sp>
+        <p:nvSpPr>
+          <p:cNvPr id="2" name="Slide Image Placeholder 1"/>
+          <p:cNvSpPr>
+            <a:spLocks noGrp="1" noRot="1" noChangeAspect="1"/>
+          </p:cNvSpPr>
+          <p:nvPr>
+            <p:ph type="sldImg"/>
+          </p:nvPr>
+        </p:nvSpPr>
+        <p:spPr/>
+      </p:sp>
+      <p:sp>
+        <p:nvSpPr>
+          <p:cNvPr id="3" name="Notes Placeholder 2"/>
+          <p:cNvSpPr>
+            <a:spLocks noGrp="1"/>
+          </p:cNvSpPr>
+          <p:nvPr>
+            <p:ph type="body" idx="1"/>
+          </p:nvPr>
+        </p:nvSpPr>
+        <p:spPr/>
+        <p:txBody>
+          <a:bodyPr/>
+          <a:lstStyle/>
+          <a:p>
+            <a:r>
+              <a:rPr lang="en-US" dirty="0">
+                <a:cs typeface="Calibri"/>
+              </a:rPr>
+              <a:t>To test the Raspberry Pi, the machine ran an open source implementation of IP-PBX called Asterisk PBX. While Asterisk PBX was running, two phones were registered on the software using Zoiper, a VoIP implementation available on smartphones.</a:t>
+            </a:r>
+          </a:p>
+          <a:p>
+            <a:r>
+              <a:rPr lang="en-US" dirty="0">
+                <a:cs typeface="Calibri"/>
+              </a:rPr>
+              <a:t>There were two primary methods for testing the functionality of the Raspberry Pi running the IP-PBX software.</a:t>
+            </a:r>
+            <a:endParaRPr lang="en-US" dirty="0"/>
+          </a:p>
+          <a:p>
+            <a:pPr lvl="1"/>
+            <a:r>
+              <a:rPr lang="en-US" dirty="0">
+                <a:cs typeface="Calibri"/>
+              </a:rPr>
+              <a:t>Make calls at a variety of locations of different distance from the Raspberry Pi</a:t>
+            </a:r>
+          </a:p>
+          <a:p>
+            <a:pPr lvl="2"/>
+            <a:r>
+              <a:rPr lang="en-US" dirty="0">
+                <a:cs typeface="Calibri"/>
+              </a:rPr>
+              <a:t>In the same room</a:t>
+            </a:r>
+          </a:p>
+          <a:p>
+            <a:pPr lvl="2"/>
+            <a:r>
+              <a:rPr lang="en-US" dirty="0">
+                <a:cs typeface="Calibri"/>
+              </a:rPr>
+              <a:t>On the same floor</a:t>
+            </a:r>
+          </a:p>
+          <a:p>
+            <a:pPr lvl="2"/>
+            <a:r>
+              <a:rPr lang="en-US" dirty="0">
+                <a:cs typeface="Calibri"/>
+              </a:rPr>
+              <a:t>In the same building</a:t>
+            </a:r>
+          </a:p>
+          <a:p>
+            <a:pPr lvl="2"/>
+            <a:r>
+              <a:rPr lang="en-US" dirty="0">
+                <a:cs typeface="Calibri"/>
+              </a:rPr>
+              <a:t>Outside same building</a:t>
+            </a:r>
+          </a:p>
+          <a:p>
+            <a:pPr lvl="2"/>
+            <a:r>
+              <a:rPr lang="en-US" dirty="0">
+                <a:cs typeface="Calibri"/>
+              </a:rPr>
+              <a:t>In a different building</a:t>
+            </a:r>
+          </a:p>
+          <a:p>
+            <a:pPr lvl="1"/>
+            <a:r>
+              <a:rPr lang="en-US" dirty="0">
+                <a:cs typeface="Calibri"/>
+              </a:rPr>
+              <a:t>Make calls while the Raspberry Pi is emulating stressful network conditions using the </a:t>
+            </a:r>
+            <a:r>
+              <a:rPr lang="en-US" dirty="0" err="1">
+                <a:latin typeface="Linux"/>
+                <a:cs typeface="Calibri"/>
+              </a:rPr>
+              <a:t>tc</a:t>
+            </a:r>
+            <a:r>
+              <a:rPr lang="en-US" dirty="0">
+                <a:latin typeface="Linux"/>
+                <a:cs typeface="Calibri"/>
+              </a:rPr>
+              <a:t> […] </a:t>
+            </a:r>
+            <a:r>
+              <a:rPr lang="en-US" dirty="0" err="1">
+                <a:latin typeface="Linux"/>
+                <a:cs typeface="Calibri"/>
+              </a:rPr>
+              <a:t>netem</a:t>
+            </a:r>
+            <a:r>
+              <a:rPr lang="en-US" dirty="0">
+                <a:latin typeface="Linux"/>
+                <a:cs typeface="Calibri"/>
+              </a:rPr>
+              <a:t> set of commands.</a:t>
+            </a:r>
+          </a:p>
+          <a:p>
+            <a:pPr lvl="2"/>
+            <a:r>
+              <a:rPr lang="en-US" dirty="0">
+                <a:latin typeface="Linux"/>
+                <a:cs typeface="Calibri"/>
+              </a:rPr>
+              <a:t>Add a delay to outgoing packets.</a:t>
+            </a:r>
+          </a:p>
+          <a:p>
+            <a:pPr lvl="2"/>
+            <a:r>
+              <a:rPr lang="en-US" dirty="0">
+                <a:latin typeface="Linux"/>
+                <a:cs typeface="Calibri"/>
+              </a:rPr>
+              <a:t>Add jitter to outgoing packets.</a:t>
+            </a:r>
+          </a:p>
+          <a:p>
+            <a:pPr lvl="2"/>
+            <a:r>
+              <a:rPr lang="en-US" dirty="0">
+                <a:latin typeface="Linux"/>
+                <a:cs typeface="Calibri"/>
+              </a:rPr>
+              <a:t>Add corruption to outgoing packets.</a:t>
+            </a:r>
+          </a:p>
+          <a:p>
+            <a:pPr lvl="2"/>
+            <a:r>
+              <a:rPr lang="en-US" dirty="0">
+                <a:latin typeface="Linux"/>
+                <a:cs typeface="Calibri"/>
+              </a:rPr>
+              <a:t>Add chance of loss to outgoing packets.</a:t>
+            </a:r>
+          </a:p>
+          <a:p>
+            <a:endParaRPr lang="en-US" dirty="0"/>
+          </a:p>
+        </p:txBody>
+      </p:sp>
+      <p:sp>
+        <p:nvSpPr>
+          <p:cNvPr id="4" name="Slide Number Placeholder 3"/>
+          <p:cNvSpPr>
+            <a:spLocks noGrp="1"/>
+          </p:cNvSpPr>
+          <p:nvPr>
+            <p:ph type="sldNum" sz="quarter" idx="5"/>
+          </p:nvPr>
+        </p:nvSpPr>
+        <p:spPr/>
+        <p:txBody>
+          <a:bodyPr/>
+          <a:lstStyle/>
+          <a:p>
+            <a:fld id="{3AD81792-D2DB-45FA-A2B8-332099C9B951}" type="slidenum">
+              <a:rPr lang="en-US" smtClean="0"/>
+              <a:t>18</a:t>
+            </a:fld>
+            <a:endParaRPr lang="en-US"/>
+          </a:p>
+        </p:txBody>
+      </p:sp>
+    </p:spTree>
+    <p:extLst>
+      <p:ext uri="{BB962C8B-B14F-4D97-AF65-F5344CB8AC3E}">
+        <p14:creationId xmlns:p14="http://schemas.microsoft.com/office/powerpoint/2010/main" val="3321108142"/>
+      </p:ext>
+    </p:extLst>
+  </p:cSld>
+  <p:clrMapOvr>
+    <a:masterClrMapping/>
+  </p:clrMapOvr>
+</p:notes>
+</file>
+
+<file path=ppt/notesSlides/notesSlide7.xml><?xml version="1.0" encoding="utf-8"?>
+<p:notes xmlns:a="http://schemas.openxmlformats.org/drawingml/2006/main" xmlns:r="http://schemas.openxmlformats.org/officeDocument/2006/relationships" xmlns:p="http://schemas.openxmlformats.org/presentationml/2006/main">
+  <p:cSld>
+    <p:spTree>
+      <p:nvGrpSpPr>
+        <p:cNvPr id="1" name=""/>
+        <p:cNvGrpSpPr/>
+        <p:nvPr/>
+      </p:nvGrpSpPr>
+      <p:grpSpPr>
+        <a:xfrm>
+          <a:off x="0" y="0"/>
+          <a:ext cx="0" cy="0"/>
+          <a:chOff x="0" y="0"/>
+          <a:chExt cx="0" cy="0"/>
+        </a:xfrm>
+      </p:grpSpPr>
+      <p:sp>
+        <p:nvSpPr>
+          <p:cNvPr id="2" name="Slide Image Placeholder 1"/>
+          <p:cNvSpPr>
+            <a:spLocks noGrp="1" noRot="1" noChangeAspect="1"/>
+          </p:cNvSpPr>
+          <p:nvPr>
+            <p:ph type="sldImg"/>
+          </p:nvPr>
+        </p:nvSpPr>
+        <p:spPr/>
+      </p:sp>
+      <p:sp>
+        <p:nvSpPr>
+          <p:cNvPr id="3" name="Notes Placeholder 2"/>
+          <p:cNvSpPr>
+            <a:spLocks noGrp="1"/>
+          </p:cNvSpPr>
+          <p:nvPr>
+            <p:ph type="body" idx="1"/>
+          </p:nvPr>
+        </p:nvSpPr>
+        <p:spPr/>
+        <p:txBody>
+          <a:bodyPr/>
+          <a:lstStyle/>
+          <a:p>
+            <a:r>
+              <a:rPr lang="en-US" dirty="0">
+                <a:cs typeface="Calibri"/>
+              </a:rPr>
+              <a:t>To test the Raspberry Pi, the machine ran an open source implementation of IP-PBX called Asterisk PBX. While Asterisk PBX was running, two phones were registered on the software using Zoiper, a VoIP implementation available on smartphones.</a:t>
+            </a:r>
+          </a:p>
+          <a:p>
+            <a:r>
+              <a:rPr lang="en-US" dirty="0">
+                <a:cs typeface="Calibri"/>
+              </a:rPr>
+              <a:t>There were two primary methods for testing the functionality of the Raspberry Pi running the IP-PBX software.</a:t>
+            </a:r>
+            <a:endParaRPr lang="en-US" dirty="0"/>
+          </a:p>
+          <a:p>
+            <a:pPr lvl="1"/>
+            <a:r>
+              <a:rPr lang="en-US" dirty="0">
+                <a:cs typeface="Calibri"/>
+              </a:rPr>
+              <a:t>Make calls at a variety of locations of different distance from the Raspberry Pi</a:t>
+            </a:r>
+          </a:p>
+          <a:p>
+            <a:pPr lvl="2"/>
+            <a:r>
+              <a:rPr lang="en-US" dirty="0">
+                <a:cs typeface="Calibri"/>
+              </a:rPr>
+              <a:t>In the same room</a:t>
+            </a:r>
+          </a:p>
+          <a:p>
+            <a:pPr lvl="2"/>
+            <a:r>
+              <a:rPr lang="en-US" dirty="0">
+                <a:cs typeface="Calibri"/>
+              </a:rPr>
+              <a:t>On the same floor</a:t>
+            </a:r>
+          </a:p>
+          <a:p>
+            <a:pPr lvl="2"/>
+            <a:r>
+              <a:rPr lang="en-US" dirty="0">
+                <a:cs typeface="Calibri"/>
+              </a:rPr>
+              <a:t>In the same building</a:t>
+            </a:r>
+          </a:p>
+          <a:p>
+            <a:pPr lvl="2"/>
+            <a:r>
+              <a:rPr lang="en-US" dirty="0">
+                <a:cs typeface="Calibri"/>
+              </a:rPr>
+              <a:t>Outside same building</a:t>
+            </a:r>
+          </a:p>
+          <a:p>
+            <a:pPr lvl="2"/>
+            <a:r>
+              <a:rPr lang="en-US" dirty="0">
+                <a:cs typeface="Calibri"/>
+              </a:rPr>
+              <a:t>In a different building</a:t>
+            </a:r>
+          </a:p>
+          <a:p>
+            <a:pPr lvl="1"/>
+            <a:r>
+              <a:rPr lang="en-US" dirty="0">
+                <a:cs typeface="Calibri"/>
+              </a:rPr>
+              <a:t>Make calls while the Raspberry Pi is emulating stressful network conditions using the </a:t>
+            </a:r>
+            <a:r>
+              <a:rPr lang="en-US" dirty="0" err="1">
+                <a:latin typeface="Linux"/>
+                <a:cs typeface="Calibri"/>
+              </a:rPr>
+              <a:t>tc</a:t>
+            </a:r>
+            <a:r>
+              <a:rPr lang="en-US" dirty="0">
+                <a:latin typeface="Linux"/>
+                <a:cs typeface="Calibri"/>
+              </a:rPr>
+              <a:t> […] </a:t>
+            </a:r>
+            <a:r>
+              <a:rPr lang="en-US" dirty="0" err="1">
+                <a:latin typeface="Linux"/>
+                <a:cs typeface="Calibri"/>
+              </a:rPr>
+              <a:t>netem</a:t>
+            </a:r>
+            <a:r>
+              <a:rPr lang="en-US" dirty="0">
+                <a:latin typeface="Linux"/>
+                <a:cs typeface="Calibri"/>
+              </a:rPr>
+              <a:t> set of commands.</a:t>
+            </a:r>
+          </a:p>
+          <a:p>
+            <a:pPr lvl="2"/>
+            <a:r>
+              <a:rPr lang="en-US" dirty="0">
+                <a:latin typeface="Linux"/>
+                <a:cs typeface="Calibri"/>
+              </a:rPr>
+              <a:t>Add a delay to outgoing packets.</a:t>
+            </a:r>
+          </a:p>
+          <a:p>
+            <a:pPr lvl="2"/>
+            <a:r>
+              <a:rPr lang="en-US" dirty="0">
+                <a:latin typeface="Linux"/>
+                <a:cs typeface="Calibri"/>
+              </a:rPr>
+              <a:t>Add jitter to outgoing packets.</a:t>
+            </a:r>
+          </a:p>
+          <a:p>
+            <a:pPr lvl="2"/>
+            <a:r>
+              <a:rPr lang="en-US" dirty="0">
+                <a:latin typeface="Linux"/>
+                <a:cs typeface="Calibri"/>
+              </a:rPr>
+              <a:t>Add corruption to outgoing packets.</a:t>
+            </a:r>
+          </a:p>
+          <a:p>
+            <a:pPr lvl="2"/>
+            <a:r>
+              <a:rPr lang="en-US" dirty="0">
+                <a:latin typeface="Linux"/>
+                <a:cs typeface="Calibri"/>
+              </a:rPr>
+              <a:t>Add chance of loss to outgoing packets.</a:t>
+            </a:r>
+          </a:p>
+          <a:p>
+            <a:endParaRPr lang="en-US" dirty="0"/>
+          </a:p>
+        </p:txBody>
+      </p:sp>
+      <p:sp>
+        <p:nvSpPr>
+          <p:cNvPr id="4" name="Slide Number Placeholder 3"/>
+          <p:cNvSpPr>
+            <a:spLocks noGrp="1"/>
+          </p:cNvSpPr>
+          <p:nvPr>
+            <p:ph type="sldNum" sz="quarter" idx="5"/>
+          </p:nvPr>
+        </p:nvSpPr>
+        <p:spPr/>
+        <p:txBody>
+          <a:bodyPr/>
+          <a:lstStyle/>
+          <a:p>
+            <a:fld id="{3AD81792-D2DB-45FA-A2B8-332099C9B951}" type="slidenum">
+              <a:rPr lang="en-US" smtClean="0"/>
+              <a:t>19</a:t>
+            </a:fld>
+            <a:endParaRPr lang="en-US"/>
+          </a:p>
+        </p:txBody>
+      </p:sp>
+    </p:spTree>
+    <p:extLst>
+      <p:ext uri="{BB962C8B-B14F-4D97-AF65-F5344CB8AC3E}">
+        <p14:creationId xmlns:p14="http://schemas.microsoft.com/office/powerpoint/2010/main" val="84531856"/>
+      </p:ext>
+    </p:extLst>
+  </p:cSld>
+  <p:clrMapOvr>
+    <a:masterClrMapping/>
+  </p:clrMapOvr>
+</p:notes>
 </file>
 
 <file path=ppt/slideLayouts/slideLayout1.xml><?xml version="1.0" encoding="utf-8"?>
@@ -1269,7 +3412,7 @@
           <a:p>
             <a:fld id="{DC023D42-92BB-BB42-8561-E5CD330E7717}" type="datetimeFigureOut">
               <a:rPr lang="en-US" smtClean="0"/>
-              <a:t>4/27/2022</a:t>
+              <a:t>4/27/22</a:t>
             </a:fld>
             <a:endParaRPr lang="en-US"/>
           </a:p>
@@ -1483,7 +3626,7 @@
           <a:p>
             <a:fld id="{DC023D42-92BB-BB42-8561-E5CD330E7717}" type="datetimeFigureOut">
               <a:rPr lang="en-US" smtClean="0"/>
-              <a:t>4/27/2022</a:t>
+              <a:t>4/27/22</a:t>
             </a:fld>
             <a:endParaRPr lang="en-US"/>
           </a:p>
@@ -1685,7 +3828,7 @@
           <a:p>
             <a:fld id="{DC023D42-92BB-BB42-8561-E5CD330E7717}" type="datetimeFigureOut">
               <a:rPr lang="en-US" smtClean="0"/>
-              <a:t>4/27/2022</a:t>
+              <a:t>4/27/22</a:t>
             </a:fld>
             <a:endParaRPr lang="en-US"/>
           </a:p>
@@ -1808,7 +3951,7 @@
           <a:p>
             <a:fld id="{DC023D42-92BB-BB42-8561-E5CD330E7717}" type="datetimeFigureOut">
               <a:rPr lang="en-US" smtClean="0"/>
-              <a:t>4/27/2022</a:t>
+              <a:t>4/27/22</a:t>
             </a:fld>
             <a:endParaRPr lang="en-US"/>
           </a:p>
@@ -2380,7 +4523,7 @@
           <a:p>
             <a:fld id="{DC023D42-92BB-BB42-8561-E5CD330E7717}" type="datetimeFigureOut">
               <a:rPr lang="en-US" smtClean="0"/>
-              <a:t>4/27/2022</a:t>
+              <a:t>4/27/22</a:t>
             </a:fld>
             <a:endParaRPr lang="en-US"/>
           </a:p>
@@ -3980,7 +6123,7 @@
         <p:spPr/>
         <p:txBody>
           <a:bodyPr vert="horz" lIns="91440" tIns="45720" rIns="91440" bIns="45720" rtlCol="0" anchor="t">
-            <a:normAutofit fontScale="92500"/>
+            <a:normAutofit fontScale="92500" lnSpcReduction="10000"/>
           </a:bodyPr>
           <a:lstStyle/>
           <a:p>
@@ -4008,7 +6151,7 @@
               <a:rPr lang="en-US">
                 <a:cs typeface="Calibri"/>
               </a:rPr>
-              <a:t>Much third party software is involved: Asterisk PBX for the PBX, Zoiper to make calls, Wireshark for packet capture, SIP.US for SIP </a:t>
+              <a:t>Much third-party software is involved: Asterisk PBX for the PBX, Zoiper to make calls, Wireshark for packet capture, SIP.US for SIP </a:t>
             </a:r>
             <a:r>
               <a:rPr lang="en-US" err="1">
@@ -4607,6 +6750,32 @@
               <a:t>Primary metrics to be analyzed are loss and jitter.</a:t>
             </a:r>
           </a:p>
+          <a:p>
+            <a:pPr lvl="1"/>
+            <a:r>
+              <a:rPr lang="en-US">
+                <a:cs typeface="Calibri"/>
+              </a:rPr>
+              <a:t>The implementation of IP-PBX used, Asterisk PBX, provides a command to view jitter and loss for packets involved in telephony.</a:t>
+            </a:r>
+          </a:p>
+          <a:p>
+            <a:pPr lvl="1"/>
+            <a:r>
+              <a:rPr lang="en-US">
+                <a:cs typeface="Calibri"/>
+              </a:rPr>
+              <a:t>Wireshark was also used to capture SIP and RTP/RTCP packets involved in telephony.</a:t>
+            </a:r>
+          </a:p>
+          <a:p>
+            <a:r>
+              <a:rPr lang="en-US">
+                <a:cs typeface="Calibri"/>
+              </a:rPr>
+              <a:t>Jitter and loss will be plotted in line graphs, examining the percentage jitter or loss over time. This will be used to visualize trends of the data when VoIP calls are made under different conditions.</a:t>
+            </a:r>
+          </a:p>
         </p:txBody>
       </p:sp>
     </p:spTree>
@@ -5069,7 +7238,598 @@
           <p:cNvPr id="2" name="Title 1">
             <a:extLst>
               <a:ext uri="{FF2B5EF4-FFF2-40B4-BE49-F238E27FC236}">
-                <a16:creationId xmlns:a16="http://schemas.microsoft.com/office/drawing/2014/main" id="{969187DD-DCAD-0313-0C3B-196E66A775B7}"/>
+                <a16:creationId xmlns:a16="http://schemas.microsoft.com/office/drawing/2014/main" id="{E3E48C1C-9442-5C43-B10E-A3F109C38807}"/>
+              </a:ext>
+            </a:extLst>
+          </p:cNvPr>
+          <p:cNvSpPr>
+            <a:spLocks noGrp="1"/>
+          </p:cNvSpPr>
+          <p:nvPr>
+            <p:ph type="title"/>
+          </p:nvPr>
+        </p:nvSpPr>
+        <p:spPr/>
+        <p:txBody>
+          <a:bodyPr>
+            <a:normAutofit/>
+          </a:bodyPr>
+          <a:lstStyle/>
+          <a:p>
+            <a:r>
+              <a:rPr lang="en-US" dirty="0"/>
+              <a:t>Experiments: Scenario 1</a:t>
+            </a:r>
+          </a:p>
+        </p:txBody>
+      </p:sp>
+      <p:pic>
+        <p:nvPicPr>
+          <p:cNvPr id="5" name="Picture 4">
+            <a:extLst>
+              <a:ext uri="{FF2B5EF4-FFF2-40B4-BE49-F238E27FC236}">
+                <a16:creationId xmlns:a16="http://schemas.microsoft.com/office/drawing/2014/main" id="{84E8E6BA-1A18-927C-F048-9B02655BB801}"/>
+              </a:ext>
+            </a:extLst>
+          </p:cNvPr>
+          <p:cNvPicPr>
+            <a:picLocks noChangeAspect="1"/>
+          </p:cNvPicPr>
+          <p:nvPr/>
+        </p:nvPicPr>
+        <p:blipFill>
+          <a:blip r:embed="rId3"/>
+          <a:srcRect/>
+          <a:stretch/>
+        </p:blipFill>
+        <p:spPr>
+          <a:xfrm>
+            <a:off x="763385" y="1895701"/>
+            <a:ext cx="5482660" cy="4093894"/>
+          </a:xfrm>
+          <a:prstGeom prst="rect">
+            <a:avLst/>
+          </a:prstGeom>
+        </p:spPr>
+      </p:pic>
+      <p:pic>
+        <p:nvPicPr>
+          <p:cNvPr id="7" name="Picture 6" descr="Chart, histogram&#10;&#10;Description automatically generated">
+            <a:extLst>
+              <a:ext uri="{FF2B5EF4-FFF2-40B4-BE49-F238E27FC236}">
+                <a16:creationId xmlns:a16="http://schemas.microsoft.com/office/drawing/2014/main" id="{90755959-BAC6-237D-34C7-A6519B68398F}"/>
+              </a:ext>
+            </a:extLst>
+          </p:cNvPr>
+          <p:cNvPicPr>
+            <a:picLocks noChangeAspect="1"/>
+          </p:cNvPicPr>
+          <p:nvPr/>
+        </p:nvPicPr>
+        <p:blipFill>
+          <a:blip r:embed="rId4"/>
+          <a:stretch>
+            <a:fillRect/>
+          </a:stretch>
+        </p:blipFill>
+        <p:spPr>
+          <a:xfrm>
+            <a:off x="7421313" y="1307891"/>
+            <a:ext cx="3850745" cy="5383802"/>
+          </a:xfrm>
+          <a:prstGeom prst="rect">
+            <a:avLst/>
+          </a:prstGeom>
+        </p:spPr>
+      </p:pic>
+    </p:spTree>
+    <p:extLst>
+      <p:ext uri="{BB962C8B-B14F-4D97-AF65-F5344CB8AC3E}">
+        <p14:creationId xmlns:p14="http://schemas.microsoft.com/office/powerpoint/2010/main" val="2951159625"/>
+      </p:ext>
+    </p:extLst>
+  </p:cSld>
+  <p:clrMapOvr>
+    <a:masterClrMapping/>
+  </p:clrMapOvr>
+</p:sld>
+</file>
+
+<file path=ppt/slides/slide16.xml><?xml version="1.0" encoding="utf-8"?>
+<p:sld xmlns:a="http://schemas.openxmlformats.org/drawingml/2006/main" xmlns:r="http://schemas.openxmlformats.org/officeDocument/2006/relationships" xmlns:p="http://schemas.openxmlformats.org/presentationml/2006/main">
+  <p:cSld>
+    <p:spTree>
+      <p:nvGrpSpPr>
+        <p:cNvPr id="1" name=""/>
+        <p:cNvGrpSpPr/>
+        <p:nvPr/>
+      </p:nvGrpSpPr>
+      <p:grpSpPr>
+        <a:xfrm>
+          <a:off x="0" y="0"/>
+          <a:ext cx="0" cy="0"/>
+          <a:chOff x="0" y="0"/>
+          <a:chExt cx="0" cy="0"/>
+        </a:xfrm>
+      </p:grpSpPr>
+      <p:sp>
+        <p:nvSpPr>
+          <p:cNvPr id="2" name="Title 1">
+            <a:extLst>
+              <a:ext uri="{FF2B5EF4-FFF2-40B4-BE49-F238E27FC236}">
+                <a16:creationId xmlns:a16="http://schemas.microsoft.com/office/drawing/2014/main" id="{E3E48C1C-9442-5C43-B10E-A3F109C38807}"/>
+              </a:ext>
+            </a:extLst>
+          </p:cNvPr>
+          <p:cNvSpPr>
+            <a:spLocks noGrp="1"/>
+          </p:cNvSpPr>
+          <p:nvPr>
+            <p:ph type="title"/>
+          </p:nvPr>
+        </p:nvSpPr>
+        <p:spPr/>
+        <p:txBody>
+          <a:bodyPr>
+            <a:normAutofit/>
+          </a:bodyPr>
+          <a:lstStyle/>
+          <a:p>
+            <a:r>
+              <a:rPr lang="en-US" dirty="0"/>
+              <a:t>Experiments: Scenario 2</a:t>
+            </a:r>
+          </a:p>
+        </p:txBody>
+      </p:sp>
+      <p:pic>
+        <p:nvPicPr>
+          <p:cNvPr id="5" name="Picture 4">
+            <a:extLst>
+              <a:ext uri="{FF2B5EF4-FFF2-40B4-BE49-F238E27FC236}">
+                <a16:creationId xmlns:a16="http://schemas.microsoft.com/office/drawing/2014/main" id="{84E8E6BA-1A18-927C-F048-9B02655BB801}"/>
+              </a:ext>
+            </a:extLst>
+          </p:cNvPr>
+          <p:cNvPicPr>
+            <a:picLocks noChangeAspect="1"/>
+          </p:cNvPicPr>
+          <p:nvPr/>
+        </p:nvPicPr>
+        <p:blipFill>
+          <a:blip r:embed="rId3"/>
+          <a:srcRect/>
+          <a:stretch/>
+        </p:blipFill>
+        <p:spPr>
+          <a:xfrm>
+            <a:off x="763385" y="1928610"/>
+            <a:ext cx="5482660" cy="4028076"/>
+          </a:xfrm>
+          <a:prstGeom prst="rect">
+            <a:avLst/>
+          </a:prstGeom>
+        </p:spPr>
+      </p:pic>
+      <p:pic>
+        <p:nvPicPr>
+          <p:cNvPr id="7" name="Picture 6">
+            <a:extLst>
+              <a:ext uri="{FF2B5EF4-FFF2-40B4-BE49-F238E27FC236}">
+                <a16:creationId xmlns:a16="http://schemas.microsoft.com/office/drawing/2014/main" id="{90755959-BAC6-237D-34C7-A6519B68398F}"/>
+              </a:ext>
+            </a:extLst>
+          </p:cNvPr>
+          <p:cNvPicPr>
+            <a:picLocks noChangeAspect="1"/>
+          </p:cNvPicPr>
+          <p:nvPr/>
+        </p:nvPicPr>
+        <p:blipFill>
+          <a:blip r:embed="rId4"/>
+          <a:srcRect/>
+          <a:stretch/>
+        </p:blipFill>
+        <p:spPr>
+          <a:xfrm>
+            <a:off x="7421313" y="1307892"/>
+            <a:ext cx="3850745" cy="5383800"/>
+          </a:xfrm>
+          <a:prstGeom prst="rect">
+            <a:avLst/>
+          </a:prstGeom>
+        </p:spPr>
+      </p:pic>
+    </p:spTree>
+    <p:extLst>
+      <p:ext uri="{BB962C8B-B14F-4D97-AF65-F5344CB8AC3E}">
+        <p14:creationId xmlns:p14="http://schemas.microsoft.com/office/powerpoint/2010/main" val="1107569565"/>
+      </p:ext>
+    </p:extLst>
+  </p:cSld>
+  <p:clrMapOvr>
+    <a:masterClrMapping/>
+  </p:clrMapOvr>
+</p:sld>
+</file>
+
+<file path=ppt/slides/slide17.xml><?xml version="1.0" encoding="utf-8"?>
+<p:sld xmlns:a="http://schemas.openxmlformats.org/drawingml/2006/main" xmlns:r="http://schemas.openxmlformats.org/officeDocument/2006/relationships" xmlns:p="http://schemas.openxmlformats.org/presentationml/2006/main">
+  <p:cSld>
+    <p:spTree>
+      <p:nvGrpSpPr>
+        <p:cNvPr id="1" name=""/>
+        <p:cNvGrpSpPr/>
+        <p:nvPr/>
+      </p:nvGrpSpPr>
+      <p:grpSpPr>
+        <a:xfrm>
+          <a:off x="0" y="0"/>
+          <a:ext cx="0" cy="0"/>
+          <a:chOff x="0" y="0"/>
+          <a:chExt cx="0" cy="0"/>
+        </a:xfrm>
+      </p:grpSpPr>
+      <p:sp>
+        <p:nvSpPr>
+          <p:cNvPr id="2" name="Title 1">
+            <a:extLst>
+              <a:ext uri="{FF2B5EF4-FFF2-40B4-BE49-F238E27FC236}">
+                <a16:creationId xmlns:a16="http://schemas.microsoft.com/office/drawing/2014/main" id="{E3E48C1C-9442-5C43-B10E-A3F109C38807}"/>
+              </a:ext>
+            </a:extLst>
+          </p:cNvPr>
+          <p:cNvSpPr>
+            <a:spLocks noGrp="1"/>
+          </p:cNvSpPr>
+          <p:nvPr>
+            <p:ph type="title"/>
+          </p:nvPr>
+        </p:nvSpPr>
+        <p:spPr/>
+        <p:txBody>
+          <a:bodyPr>
+            <a:normAutofit/>
+          </a:bodyPr>
+          <a:lstStyle/>
+          <a:p>
+            <a:r>
+              <a:rPr lang="en-US" dirty="0"/>
+              <a:t>Experiments: Scenario 3</a:t>
+            </a:r>
+          </a:p>
+        </p:txBody>
+      </p:sp>
+      <p:pic>
+        <p:nvPicPr>
+          <p:cNvPr id="5" name="Picture 4">
+            <a:extLst>
+              <a:ext uri="{FF2B5EF4-FFF2-40B4-BE49-F238E27FC236}">
+                <a16:creationId xmlns:a16="http://schemas.microsoft.com/office/drawing/2014/main" id="{84E8E6BA-1A18-927C-F048-9B02655BB801}"/>
+              </a:ext>
+            </a:extLst>
+          </p:cNvPr>
+          <p:cNvPicPr>
+            <a:picLocks noChangeAspect="1"/>
+          </p:cNvPicPr>
+          <p:nvPr/>
+        </p:nvPicPr>
+        <p:blipFill>
+          <a:blip r:embed="rId3"/>
+          <a:srcRect/>
+          <a:stretch/>
+        </p:blipFill>
+        <p:spPr>
+          <a:xfrm>
+            <a:off x="838200" y="1853196"/>
+            <a:ext cx="5828070" cy="4302508"/>
+          </a:xfrm>
+          <a:prstGeom prst="rect">
+            <a:avLst/>
+          </a:prstGeom>
+        </p:spPr>
+      </p:pic>
+      <p:pic>
+        <p:nvPicPr>
+          <p:cNvPr id="7" name="Picture 6">
+            <a:extLst>
+              <a:ext uri="{FF2B5EF4-FFF2-40B4-BE49-F238E27FC236}">
+                <a16:creationId xmlns:a16="http://schemas.microsoft.com/office/drawing/2014/main" id="{90755959-BAC6-237D-34C7-A6519B68398F}"/>
+              </a:ext>
+            </a:extLst>
+          </p:cNvPr>
+          <p:cNvPicPr>
+            <a:picLocks noChangeAspect="1"/>
+          </p:cNvPicPr>
+          <p:nvPr/>
+        </p:nvPicPr>
+        <p:blipFill>
+          <a:blip r:embed="rId4"/>
+          <a:srcRect/>
+          <a:stretch/>
+        </p:blipFill>
+        <p:spPr>
+          <a:xfrm>
+            <a:off x="7421313" y="1307892"/>
+            <a:ext cx="3850744" cy="5383800"/>
+          </a:xfrm>
+          <a:prstGeom prst="rect">
+            <a:avLst/>
+          </a:prstGeom>
+        </p:spPr>
+      </p:pic>
+    </p:spTree>
+    <p:extLst>
+      <p:ext uri="{BB962C8B-B14F-4D97-AF65-F5344CB8AC3E}">
+        <p14:creationId xmlns:p14="http://schemas.microsoft.com/office/powerpoint/2010/main" val="2571980282"/>
+      </p:ext>
+    </p:extLst>
+  </p:cSld>
+  <p:clrMapOvr>
+    <a:masterClrMapping/>
+  </p:clrMapOvr>
+</p:sld>
+</file>
+
+<file path=ppt/slides/slide18.xml><?xml version="1.0" encoding="utf-8"?>
+<p:sld xmlns:a="http://schemas.openxmlformats.org/drawingml/2006/main" xmlns:r="http://schemas.openxmlformats.org/officeDocument/2006/relationships" xmlns:p="http://schemas.openxmlformats.org/presentationml/2006/main">
+  <p:cSld>
+    <p:spTree>
+      <p:nvGrpSpPr>
+        <p:cNvPr id="1" name=""/>
+        <p:cNvGrpSpPr/>
+        <p:nvPr/>
+      </p:nvGrpSpPr>
+      <p:grpSpPr>
+        <a:xfrm>
+          <a:off x="0" y="0"/>
+          <a:ext cx="0" cy="0"/>
+          <a:chOff x="0" y="0"/>
+          <a:chExt cx="0" cy="0"/>
+        </a:xfrm>
+      </p:grpSpPr>
+      <p:sp>
+        <p:nvSpPr>
+          <p:cNvPr id="2" name="Title 1">
+            <a:extLst>
+              <a:ext uri="{FF2B5EF4-FFF2-40B4-BE49-F238E27FC236}">
+                <a16:creationId xmlns:a16="http://schemas.microsoft.com/office/drawing/2014/main" id="{E3E48C1C-9442-5C43-B10E-A3F109C38807}"/>
+              </a:ext>
+            </a:extLst>
+          </p:cNvPr>
+          <p:cNvSpPr>
+            <a:spLocks noGrp="1"/>
+          </p:cNvSpPr>
+          <p:nvPr>
+            <p:ph type="title"/>
+          </p:nvPr>
+        </p:nvSpPr>
+        <p:spPr/>
+        <p:txBody>
+          <a:bodyPr>
+            <a:normAutofit/>
+          </a:bodyPr>
+          <a:lstStyle/>
+          <a:p>
+            <a:r>
+              <a:rPr lang="en-US" dirty="0"/>
+              <a:t>Experiments: Scenario 4</a:t>
+            </a:r>
+          </a:p>
+        </p:txBody>
+      </p:sp>
+      <p:pic>
+        <p:nvPicPr>
+          <p:cNvPr id="5" name="Picture 4">
+            <a:extLst>
+              <a:ext uri="{FF2B5EF4-FFF2-40B4-BE49-F238E27FC236}">
+                <a16:creationId xmlns:a16="http://schemas.microsoft.com/office/drawing/2014/main" id="{84E8E6BA-1A18-927C-F048-9B02655BB801}"/>
+              </a:ext>
+            </a:extLst>
+          </p:cNvPr>
+          <p:cNvPicPr>
+            <a:picLocks noChangeAspect="1"/>
+          </p:cNvPicPr>
+          <p:nvPr/>
+        </p:nvPicPr>
+        <p:blipFill>
+          <a:blip r:embed="rId3"/>
+          <a:srcRect/>
+          <a:stretch/>
+        </p:blipFill>
+        <p:spPr>
+          <a:xfrm>
+            <a:off x="887411" y="1853196"/>
+            <a:ext cx="5729647" cy="4302508"/>
+          </a:xfrm>
+          <a:prstGeom prst="rect">
+            <a:avLst/>
+          </a:prstGeom>
+        </p:spPr>
+      </p:pic>
+      <p:pic>
+        <p:nvPicPr>
+          <p:cNvPr id="7" name="Picture 6">
+            <a:extLst>
+              <a:ext uri="{FF2B5EF4-FFF2-40B4-BE49-F238E27FC236}">
+                <a16:creationId xmlns:a16="http://schemas.microsoft.com/office/drawing/2014/main" id="{90755959-BAC6-237D-34C7-A6519B68398F}"/>
+              </a:ext>
+            </a:extLst>
+          </p:cNvPr>
+          <p:cNvPicPr>
+            <a:picLocks noChangeAspect="1"/>
+          </p:cNvPicPr>
+          <p:nvPr/>
+        </p:nvPicPr>
+        <p:blipFill>
+          <a:blip r:embed="rId4"/>
+          <a:srcRect/>
+          <a:stretch/>
+        </p:blipFill>
+        <p:spPr>
+          <a:xfrm>
+            <a:off x="6919441" y="1594502"/>
+            <a:ext cx="4434359" cy="4302508"/>
+          </a:xfrm>
+          <a:prstGeom prst="rect">
+            <a:avLst/>
+          </a:prstGeom>
+        </p:spPr>
+      </p:pic>
+    </p:spTree>
+    <p:extLst>
+      <p:ext uri="{BB962C8B-B14F-4D97-AF65-F5344CB8AC3E}">
+        <p14:creationId xmlns:p14="http://schemas.microsoft.com/office/powerpoint/2010/main" val="480281074"/>
+      </p:ext>
+    </p:extLst>
+  </p:cSld>
+  <p:clrMapOvr>
+    <a:masterClrMapping/>
+  </p:clrMapOvr>
+</p:sld>
+</file>
+
+<file path=ppt/slides/slide19.xml><?xml version="1.0" encoding="utf-8"?>
+<p:sld xmlns:a="http://schemas.openxmlformats.org/drawingml/2006/main" xmlns:r="http://schemas.openxmlformats.org/officeDocument/2006/relationships" xmlns:p="http://schemas.openxmlformats.org/presentationml/2006/main">
+  <p:cSld>
+    <p:spTree>
+      <p:nvGrpSpPr>
+        <p:cNvPr id="1" name=""/>
+        <p:cNvGrpSpPr/>
+        <p:nvPr/>
+      </p:nvGrpSpPr>
+      <p:grpSpPr>
+        <a:xfrm>
+          <a:off x="0" y="0"/>
+          <a:ext cx="0" cy="0"/>
+          <a:chOff x="0" y="0"/>
+          <a:chExt cx="0" cy="0"/>
+        </a:xfrm>
+      </p:grpSpPr>
+      <p:sp>
+        <p:nvSpPr>
+          <p:cNvPr id="2" name="Title 1">
+            <a:extLst>
+              <a:ext uri="{FF2B5EF4-FFF2-40B4-BE49-F238E27FC236}">
+                <a16:creationId xmlns:a16="http://schemas.microsoft.com/office/drawing/2014/main" id="{E3E48C1C-9442-5C43-B10E-A3F109C38807}"/>
+              </a:ext>
+            </a:extLst>
+          </p:cNvPr>
+          <p:cNvSpPr>
+            <a:spLocks noGrp="1"/>
+          </p:cNvSpPr>
+          <p:nvPr>
+            <p:ph type="title"/>
+          </p:nvPr>
+        </p:nvSpPr>
+        <p:spPr/>
+        <p:txBody>
+          <a:bodyPr>
+            <a:normAutofit/>
+          </a:bodyPr>
+          <a:lstStyle/>
+          <a:p>
+            <a:r>
+              <a:rPr lang="en-US" dirty="0"/>
+              <a:t>Experiments: Scenario 5</a:t>
+            </a:r>
+          </a:p>
+        </p:txBody>
+      </p:sp>
+      <p:pic>
+        <p:nvPicPr>
+          <p:cNvPr id="5" name="Picture 4">
+            <a:extLst>
+              <a:ext uri="{FF2B5EF4-FFF2-40B4-BE49-F238E27FC236}">
+                <a16:creationId xmlns:a16="http://schemas.microsoft.com/office/drawing/2014/main" id="{84E8E6BA-1A18-927C-F048-9B02655BB801}"/>
+              </a:ext>
+            </a:extLst>
+          </p:cNvPr>
+          <p:cNvPicPr>
+            <a:picLocks noChangeAspect="1"/>
+          </p:cNvPicPr>
+          <p:nvPr/>
+        </p:nvPicPr>
+        <p:blipFill>
+          <a:blip r:embed="rId3"/>
+          <a:srcRect/>
+          <a:stretch/>
+        </p:blipFill>
+        <p:spPr>
+          <a:xfrm>
+            <a:off x="1500306" y="1853196"/>
+            <a:ext cx="4503856" cy="4302508"/>
+          </a:xfrm>
+          <a:prstGeom prst="rect">
+            <a:avLst/>
+          </a:prstGeom>
+        </p:spPr>
+      </p:pic>
+      <p:pic>
+        <p:nvPicPr>
+          <p:cNvPr id="7" name="Picture 6">
+            <a:extLst>
+              <a:ext uri="{FF2B5EF4-FFF2-40B4-BE49-F238E27FC236}">
+                <a16:creationId xmlns:a16="http://schemas.microsoft.com/office/drawing/2014/main" id="{90755959-BAC6-237D-34C7-A6519B68398F}"/>
+              </a:ext>
+            </a:extLst>
+          </p:cNvPr>
+          <p:cNvPicPr>
+            <a:picLocks noChangeAspect="1"/>
+          </p:cNvPicPr>
+          <p:nvPr/>
+        </p:nvPicPr>
+        <p:blipFill>
+          <a:blip r:embed="rId4"/>
+          <a:srcRect/>
+          <a:stretch/>
+        </p:blipFill>
+        <p:spPr>
+          <a:xfrm>
+            <a:off x="7530056" y="1331425"/>
+            <a:ext cx="3823744" cy="5346050"/>
+          </a:xfrm>
+          <a:prstGeom prst="rect">
+            <a:avLst/>
+          </a:prstGeom>
+        </p:spPr>
+      </p:pic>
+    </p:spTree>
+    <p:extLst>
+      <p:ext uri="{BB962C8B-B14F-4D97-AF65-F5344CB8AC3E}">
+        <p14:creationId xmlns:p14="http://schemas.microsoft.com/office/powerpoint/2010/main" val="1341236930"/>
+      </p:ext>
+    </p:extLst>
+  </p:cSld>
+  <p:clrMapOvr>
+    <a:masterClrMapping/>
+  </p:clrMapOvr>
+</p:sld>
+</file>
+
+<file path=ppt/slides/slide2.xml><?xml version="1.0" encoding="utf-8"?>
+<p:sld xmlns:a="http://schemas.openxmlformats.org/drawingml/2006/main" xmlns:r="http://schemas.openxmlformats.org/officeDocument/2006/relationships" xmlns:p="http://schemas.openxmlformats.org/presentationml/2006/main">
+  <p:cSld>
+    <p:spTree>
+      <p:nvGrpSpPr>
+        <p:cNvPr id="1" name=""/>
+        <p:cNvGrpSpPr/>
+        <p:nvPr/>
+      </p:nvGrpSpPr>
+      <p:grpSpPr>
+        <a:xfrm>
+          <a:off x="0" y="0"/>
+          <a:ext cx="0" cy="0"/>
+          <a:chOff x="0" y="0"/>
+          <a:chExt cx="0" cy="0"/>
+        </a:xfrm>
+      </p:grpSpPr>
+      <p:sp>
+        <p:nvSpPr>
+          <p:cNvPr id="2" name="Title 1">
+            <a:extLst>
+              <a:ext uri="{FF2B5EF4-FFF2-40B4-BE49-F238E27FC236}">
+                <a16:creationId xmlns:a16="http://schemas.microsoft.com/office/drawing/2014/main" id="{349AA337-7646-3D45-2193-74726DEFB031}"/>
               </a:ext>
             </a:extLst>
           </p:cNvPr>
@@ -5087,7 +7847,7 @@
           <a:p>
             <a:r>
               <a:rPr lang="en-US"/>
-              <a:t>Experiments</a:t>
+              <a:t>Content	</a:t>
             </a:r>
           </a:p>
         </p:txBody>
@@ -5097,7 +7857,7 @@
           <p:cNvPr id="3" name="Content Placeholder 2">
             <a:extLst>
               <a:ext uri="{FF2B5EF4-FFF2-40B4-BE49-F238E27FC236}">
-                <a16:creationId xmlns:a16="http://schemas.microsoft.com/office/drawing/2014/main" id="{870B6238-C70F-9FCA-AA77-9B5A3EEB905D}"/>
+                <a16:creationId xmlns:a16="http://schemas.microsoft.com/office/drawing/2014/main" id="{FCBD70E3-AB21-9EC2-5862-BBDC37028A32}"/>
               </a:ext>
             </a:extLst>
           </p:cNvPr>
@@ -5110,66 +7870,56 @@
         </p:nvSpPr>
         <p:spPr/>
         <p:txBody>
-          <a:bodyPr vert="horz" lIns="91440" tIns="45720" rIns="91440" bIns="45720" rtlCol="0" anchor="t">
-            <a:normAutofit/>
-          </a:bodyPr>
+          <a:bodyPr/>
           <a:lstStyle/>
           <a:p>
             <a:r>
-              <a:rPr lang="en-US">
-                <a:cs typeface="Calibri"/>
-              </a:rPr>
-              <a:t>There were two primary methods for testing the functionality of the Raspberry Pi.</a:t>
-            </a:r>
-          </a:p>
-          <a:p>
-            <a:pPr lvl="1"/>
-            <a:r>
-              <a:rPr lang="en-US">
-                <a:cs typeface="Calibri"/>
-              </a:rPr>
-              <a:t>Make calls at a variety of locations of different distance from the Raspberry Pi</a:t>
-            </a:r>
-          </a:p>
-          <a:p>
-            <a:pPr lvl="2"/>
-            <a:r>
-              <a:rPr lang="en-US">
-                <a:cs typeface="Calibri"/>
-              </a:rPr>
-              <a:t>In the same room</a:t>
-            </a:r>
-          </a:p>
-          <a:p>
-            <a:pPr lvl="2"/>
-            <a:r>
-              <a:rPr lang="en-US">
-                <a:cs typeface="Calibri"/>
-              </a:rPr>
-              <a:t>On the same floor</a:t>
-            </a:r>
-          </a:p>
-          <a:p>
-            <a:pPr lvl="2"/>
-            <a:r>
-              <a:rPr lang="en-US">
-                <a:cs typeface="Calibri"/>
-              </a:rPr>
-              <a:t>In the same building</a:t>
-            </a:r>
-          </a:p>
-          <a:p>
-            <a:pPr lvl="2"/>
-            <a:endParaRPr lang="en-US">
-              <a:cs typeface="Calibri"/>
-            </a:endParaRPr>
+              <a:rPr lang="en-US"/>
+              <a:t>Objective</a:t>
+            </a:r>
+          </a:p>
+          <a:p>
+            <a:r>
+              <a:rPr lang="en-US"/>
+              <a:t>Introduction &amp; Background</a:t>
+            </a:r>
+          </a:p>
+          <a:p>
+            <a:r>
+              <a:rPr lang="en-US"/>
+              <a:t>Obstacles</a:t>
+            </a:r>
+          </a:p>
+          <a:p>
+            <a:r>
+              <a:rPr lang="en-US"/>
+              <a:t>Analytical Method</a:t>
+            </a:r>
+          </a:p>
+          <a:p>
+            <a:r>
+              <a:rPr lang="en-US"/>
+              <a:t>Experiments</a:t>
+            </a:r>
+          </a:p>
+          <a:p>
+            <a:r>
+              <a:rPr lang="en-US"/>
+              <a:t>Future Directions</a:t>
+            </a:r>
+          </a:p>
+          <a:p>
+            <a:r>
+              <a:rPr lang="en-US"/>
+              <a:t>Conclusion</a:t>
+            </a:r>
           </a:p>
         </p:txBody>
       </p:sp>
     </p:spTree>
     <p:extLst>
       <p:ext uri="{BB962C8B-B14F-4D97-AF65-F5344CB8AC3E}">
-        <p14:creationId xmlns:p14="http://schemas.microsoft.com/office/powerpoint/2010/main" val="3352484359"/>
+        <p14:creationId xmlns:p14="http://schemas.microsoft.com/office/powerpoint/2010/main" val="1754954195"/>
       </p:ext>
     </p:extLst>
   </p:cSld>
@@ -5179,7 +7929,7 @@
 </p:sld>
 </file>
 
-<file path=ppt/slides/slide16.xml><?xml version="1.0" encoding="utf-8"?>
+<file path=ppt/slides/slide20.xml><?xml version="1.0" encoding="utf-8"?>
 <p:sld xmlns:a="http://schemas.openxmlformats.org/drawingml/2006/main" xmlns:r="http://schemas.openxmlformats.org/officeDocument/2006/relationships" xmlns:p="http://schemas.openxmlformats.org/presentationml/2006/main">
   <p:cSld>
     <p:spTree>
@@ -5242,10 +7992,33 @@
         </p:nvSpPr>
         <p:spPr/>
         <p:txBody>
-          <a:bodyPr/>
+          <a:bodyPr vert="horz" lIns="91440" tIns="45720" rIns="91440" bIns="45720" rtlCol="0" anchor="t">
+            <a:normAutofit/>
+          </a:bodyPr>
           <a:lstStyle/>
           <a:p>
-            <a:endParaRPr lang="en-US"/>
+            <a:r>
+              <a:rPr lang="en-US">
+                <a:cs typeface="Calibri"/>
+              </a:rPr>
+              <a:t>Currently, the experiment to make calls at different locations has been completed, and the results of which have been recorded.</a:t>
+            </a:r>
+          </a:p>
+          <a:p>
+            <a:r>
+              <a:rPr lang="en-US" dirty="0">
+                <a:cs typeface="Calibri"/>
+              </a:rPr>
+              <a:t>The experiment to test how well calls function while the Raspberry Pi is emulating different network conditions is to be completed soon.</a:t>
+            </a:r>
+          </a:p>
+          <a:p>
+            <a:r>
+              <a:rPr lang="en-US" dirty="0">
+                <a:cs typeface="Calibri"/>
+              </a:rPr>
+              <a:t>An analysis will be performed on data from both experiments, examining the loss and jitter under different conditions in the first experiment and the quality of telephony under the different conditions of the second experiment.</a:t>
+            </a:r>
           </a:p>
         </p:txBody>
       </p:sp>
@@ -5262,7 +8035,7 @@
 </p:sld>
 </file>
 
-<file path=ppt/slides/slide17.xml><?xml version="1.0" encoding="utf-8"?>
+<file path=ppt/slides/slide21.xml><?xml version="1.0" encoding="utf-8"?>
 <p:sld xmlns:a="http://schemas.openxmlformats.org/drawingml/2006/main" xmlns:r="http://schemas.openxmlformats.org/officeDocument/2006/relationships" xmlns:p="http://schemas.openxmlformats.org/presentationml/2006/main">
   <p:cSld>
     <p:spTree>
@@ -5693,7 +8466,7 @@
 </p:sld>
 </file>
 
-<file path=ppt/slides/slide18.xml><?xml version="1.0" encoding="utf-8"?>
+<file path=ppt/slides/slide22.xml><?xml version="1.0" encoding="utf-8"?>
 <p:sld xmlns:a="http://schemas.openxmlformats.org/drawingml/2006/main" xmlns:r="http://schemas.openxmlformats.org/officeDocument/2006/relationships" xmlns:p="http://schemas.openxmlformats.org/presentationml/2006/main">
   <p:cSld>
     <p:spTree>
@@ -5758,10 +8531,79 @@
         </p:nvSpPr>
         <p:spPr/>
         <p:txBody>
-          <a:bodyPr/>
+          <a:bodyPr vert="horz" lIns="91440" tIns="45720" rIns="91440" bIns="45720" rtlCol="0" anchor="t">
+            <a:normAutofit/>
+          </a:bodyPr>
           <a:lstStyle/>
           <a:p>
+            <a:r>
+              <a:rPr lang="en-US">
+                <a:cs typeface="Calibri"/>
+              </a:rPr>
+              <a:t>Add Interconnection between IP-PBX devices</a:t>
+            </a:r>
             <a:endParaRPr lang="en-US"/>
+          </a:p>
+          <a:p>
+            <a:pPr lvl="1"/>
+            <a:r>
+              <a:rPr lang="en-US">
+                <a:cs typeface="Calibri"/>
+              </a:rPr>
+              <a:t>Connect different Raspberry Pis running Asterisk PBX or some other implementation so that calls made to a phone registered on one can reach calls registered on the other</a:t>
+            </a:r>
+          </a:p>
+          <a:p>
+            <a:r>
+              <a:rPr lang="en-US">
+                <a:cs typeface="Calibri"/>
+              </a:rPr>
+              <a:t>Add Scalability</a:t>
+            </a:r>
+          </a:p>
+          <a:p>
+            <a:pPr lvl="1"/>
+            <a:r>
+              <a:rPr lang="en-US">
+                <a:cs typeface="Calibri"/>
+              </a:rPr>
+              <a:t>Make a group of Raspberry Pis, all of which run the same IP-PBX software, such that the workload of connecting phones and controlling calls is spread over them horizontally</a:t>
+            </a:r>
+          </a:p>
+          <a:p>
+            <a:r>
+              <a:rPr lang="en-US">
+                <a:cs typeface="Calibri"/>
+              </a:rPr>
+              <a:t>Test under More Conditions</a:t>
+            </a:r>
+          </a:p>
+          <a:p>
+            <a:pPr lvl="1"/>
+            <a:r>
+              <a:rPr lang="en-US">
+                <a:cs typeface="Calibri"/>
+              </a:rPr>
+              <a:t>How many callers can a Pi handle?</a:t>
+            </a:r>
+          </a:p>
+          <a:p>
+            <a:pPr lvl="1"/>
+            <a:r>
+              <a:rPr lang="en-US">
+                <a:cs typeface="Calibri"/>
+              </a:rPr>
+              <a:t>Effectiveness of Pi in different networks?</a:t>
+            </a:r>
+          </a:p>
+          <a:p>
+            <a:pPr lvl="1"/>
+            <a:r>
+              <a:rPr lang="en-US">
+                <a:cs typeface="Calibri"/>
+              </a:rPr>
+              <a:t>Making a call from an outside network?</a:t>
+            </a:r>
           </a:p>
         </p:txBody>
       </p:sp>
@@ -5778,7 +8620,7 @@
 </p:sld>
 </file>
 
-<file path=ppt/slides/slide19.xml><?xml version="1.0" encoding="utf-8"?>
+<file path=ppt/slides/slide23.xml><?xml version="1.0" encoding="utf-8"?>
 <p:sld xmlns:a="http://schemas.openxmlformats.org/drawingml/2006/main" xmlns:r="http://schemas.openxmlformats.org/officeDocument/2006/relationships" xmlns:p="http://schemas.openxmlformats.org/presentationml/2006/main">
   <p:cSld>
     <p:spTree>
@@ -6209,129 +9051,7 @@
 </p:sld>
 </file>
 
-<file path=ppt/slides/slide2.xml><?xml version="1.0" encoding="utf-8"?>
-<p:sld xmlns:a="http://schemas.openxmlformats.org/drawingml/2006/main" xmlns:r="http://schemas.openxmlformats.org/officeDocument/2006/relationships" xmlns:p="http://schemas.openxmlformats.org/presentationml/2006/main">
-  <p:cSld>
-    <p:spTree>
-      <p:nvGrpSpPr>
-        <p:cNvPr id="1" name=""/>
-        <p:cNvGrpSpPr/>
-        <p:nvPr/>
-      </p:nvGrpSpPr>
-      <p:grpSpPr>
-        <a:xfrm>
-          <a:off x="0" y="0"/>
-          <a:ext cx="0" cy="0"/>
-          <a:chOff x="0" y="0"/>
-          <a:chExt cx="0" cy="0"/>
-        </a:xfrm>
-      </p:grpSpPr>
-      <p:sp>
-        <p:nvSpPr>
-          <p:cNvPr id="2" name="Title 1">
-            <a:extLst>
-              <a:ext uri="{FF2B5EF4-FFF2-40B4-BE49-F238E27FC236}">
-                <a16:creationId xmlns:a16="http://schemas.microsoft.com/office/drawing/2014/main" id="{349AA337-7646-3D45-2193-74726DEFB031}"/>
-              </a:ext>
-            </a:extLst>
-          </p:cNvPr>
-          <p:cNvSpPr>
-            <a:spLocks noGrp="1"/>
-          </p:cNvSpPr>
-          <p:nvPr>
-            <p:ph type="title"/>
-          </p:nvPr>
-        </p:nvSpPr>
-        <p:spPr/>
-        <p:txBody>
-          <a:bodyPr/>
-          <a:lstStyle/>
-          <a:p>
-            <a:r>
-              <a:rPr lang="en-US"/>
-              <a:t>Content	</a:t>
-            </a:r>
-          </a:p>
-        </p:txBody>
-      </p:sp>
-      <p:sp>
-        <p:nvSpPr>
-          <p:cNvPr id="3" name="Content Placeholder 2">
-            <a:extLst>
-              <a:ext uri="{FF2B5EF4-FFF2-40B4-BE49-F238E27FC236}">
-                <a16:creationId xmlns:a16="http://schemas.microsoft.com/office/drawing/2014/main" id="{FCBD70E3-AB21-9EC2-5862-BBDC37028A32}"/>
-              </a:ext>
-            </a:extLst>
-          </p:cNvPr>
-          <p:cNvSpPr>
-            <a:spLocks noGrp="1"/>
-          </p:cNvSpPr>
-          <p:nvPr>
-            <p:ph idx="1"/>
-          </p:nvPr>
-        </p:nvSpPr>
-        <p:spPr/>
-        <p:txBody>
-          <a:bodyPr/>
-          <a:lstStyle/>
-          <a:p>
-            <a:r>
-              <a:rPr lang="en-US"/>
-              <a:t>Objective</a:t>
-            </a:r>
-          </a:p>
-          <a:p>
-            <a:r>
-              <a:rPr lang="en-US"/>
-              <a:t>Introduction &amp; Background</a:t>
-            </a:r>
-          </a:p>
-          <a:p>
-            <a:r>
-              <a:rPr lang="en-US"/>
-              <a:t>Obstacles</a:t>
-            </a:r>
-          </a:p>
-          <a:p>
-            <a:r>
-              <a:rPr lang="en-US"/>
-              <a:t>Analytical Method</a:t>
-            </a:r>
-          </a:p>
-          <a:p>
-            <a:r>
-              <a:rPr lang="en-US"/>
-              <a:t>Experiments</a:t>
-            </a:r>
-          </a:p>
-          <a:p>
-            <a:r>
-              <a:rPr lang="en-US"/>
-              <a:t>Future Directions</a:t>
-            </a:r>
-          </a:p>
-          <a:p>
-            <a:r>
-              <a:rPr lang="en-US"/>
-              <a:t>Conclusion</a:t>
-            </a:r>
-          </a:p>
-        </p:txBody>
-      </p:sp>
-    </p:spTree>
-    <p:extLst>
-      <p:ext uri="{BB962C8B-B14F-4D97-AF65-F5344CB8AC3E}">
-        <p14:creationId xmlns:p14="http://schemas.microsoft.com/office/powerpoint/2010/main" val="1754954195"/>
-      </p:ext>
-    </p:extLst>
-  </p:cSld>
-  <p:clrMapOvr>
-    <a:masterClrMapping/>
-  </p:clrMapOvr>
-</p:sld>
-</file>
-
-<file path=ppt/slides/slide20.xml><?xml version="1.0" encoding="utf-8"?>
+<file path=ppt/slides/slide24.xml><?xml version="1.0" encoding="utf-8"?>
 <p:sld xmlns:a="http://schemas.openxmlformats.org/drawingml/2006/main" xmlns:r="http://schemas.openxmlformats.org/officeDocument/2006/relationships" xmlns:p="http://schemas.openxmlformats.org/presentationml/2006/main">
   <p:cSld>
     <p:spTree>
@@ -6372,10 +9092,9 @@
           <a:lstStyle/>
           <a:p>
             <a:r>
-              <a:rPr lang="en-US" err="1"/>
-              <a:t>Conculsion</a:t>
-            </a:r>
-            <a:endParaRPr lang="en-US"/>
+              <a:rPr lang="en-US"/>
+              <a:t>Conclusion</a:t>
+            </a:r>
           </a:p>
         </p:txBody>
       </p:sp>
@@ -6397,10 +9116,59 @@
         </p:nvSpPr>
         <p:spPr/>
         <p:txBody>
-          <a:bodyPr/>
+          <a:bodyPr vert="horz" lIns="91440" tIns="45720" rIns="91440" bIns="45720" rtlCol="0" anchor="t">
+            <a:normAutofit/>
+          </a:bodyPr>
           <a:lstStyle/>
           <a:p>
-            <a:endParaRPr lang="en-US"/>
+            <a:r>
+              <a:rPr lang="en-US">
+                <a:cs typeface="Calibri"/>
+              </a:rPr>
+              <a:t>VoIP is a cheap alternative to traditional telephone services currently.</a:t>
+            </a:r>
+          </a:p>
+          <a:p>
+            <a:r>
+              <a:rPr lang="en-US">
+                <a:cs typeface="Calibri"/>
+              </a:rPr>
+              <a:t>Raspberry Pis are cheap in terms of cost and energy usage, while still being powerful enough to easily handle IP-PBX software.</a:t>
+            </a:r>
+          </a:p>
+          <a:p>
+            <a:r>
+              <a:rPr lang="en-US">
+                <a:cs typeface="Calibri"/>
+              </a:rPr>
+              <a:t>When making VoIP calls, distance from the machine running the IP-PBX can matter.</a:t>
+            </a:r>
+          </a:p>
+          <a:p>
+            <a:pPr lvl="1"/>
+            <a:r>
+              <a:rPr lang="en-US">
+                <a:cs typeface="Calibri"/>
+              </a:rPr>
+              <a:t>Can cause more jitter and loss.</a:t>
+            </a:r>
+          </a:p>
+          <a:p>
+            <a:pPr lvl="1"/>
+            <a:r>
+              <a:rPr lang="en-US">
+                <a:cs typeface="Calibri"/>
+              </a:rPr>
+              <a:t>Disconnections can happen.</a:t>
+            </a:r>
+          </a:p>
+          <a:p>
+            <a:r>
+              <a:rPr lang="en-US">
+                <a:cs typeface="Calibri"/>
+              </a:rPr>
+              <a:t>Still need to test the Raspberry Pi with network emulation.</a:t>
+            </a:r>
           </a:p>
         </p:txBody>
       </p:sp>
@@ -6417,7 +9185,7 @@
 </p:sld>
 </file>
 
-<file path=ppt/slides/slide21.xml><?xml version="1.0" encoding="utf-8"?>
+<file path=ppt/slides/slide25.xml><?xml version="1.0" encoding="utf-8"?>
 <p:sld xmlns:a="http://schemas.openxmlformats.org/drawingml/2006/main" xmlns:r="http://schemas.openxmlformats.org/officeDocument/2006/relationships" xmlns:p="http://schemas.openxmlformats.org/presentationml/2006/main">
   <p:cSld>
     <p:spTree>
@@ -6494,7 +9262,7 @@
 </p:sld>
 </file>
 
-<file path=ppt/slides/slide22.xml><?xml version="1.0" encoding="utf-8"?>
+<file path=ppt/slides/slide26.xml><?xml version="1.0" encoding="utf-8"?>
 <p:sld xmlns:a="http://schemas.openxmlformats.org/drawingml/2006/main" xmlns:r="http://schemas.openxmlformats.org/officeDocument/2006/relationships" xmlns:p="http://schemas.openxmlformats.org/presentationml/2006/main" showMasterSp="0">
   <p:cSld>
     <p:bg>
@@ -6592,7 +9360,7 @@
           <a:p>
             <a:fld id="{623C9B37-4DCD-A749-BC4A-BD74B376638A}" type="slidenum">
               <a:rPr lang="en-US" smtClean="0"/>
-              <a:t>22</a:t>
+              <a:t>26</a:t>
             </a:fld>
             <a:endParaRPr lang="en-US"/>
           </a:p>
@@ -6675,6 +9443,243 @@
     <p:extLst>
       <p:ext uri="{BB962C8B-B14F-4D97-AF65-F5344CB8AC3E}">
         <p14:creationId xmlns:p14="http://schemas.microsoft.com/office/powerpoint/2010/main" val="1471838133"/>
+      </p:ext>
+    </p:extLst>
+  </p:cSld>
+  <p:clrMapOvr>
+    <a:masterClrMapping/>
+  </p:clrMapOvr>
+</p:sld>
+</file>
+
+<file path=ppt/slides/slide27.xml><?xml version="1.0" encoding="utf-8"?>
+<p:sld xmlns:a="http://schemas.openxmlformats.org/drawingml/2006/main" xmlns:r="http://schemas.openxmlformats.org/officeDocument/2006/relationships" xmlns:p="http://schemas.openxmlformats.org/presentationml/2006/main">
+  <p:cSld>
+    <p:spTree>
+      <p:nvGrpSpPr>
+        <p:cNvPr id="1" name=""/>
+        <p:cNvGrpSpPr/>
+        <p:nvPr/>
+      </p:nvGrpSpPr>
+      <p:grpSpPr>
+        <a:xfrm>
+          <a:off x="0" y="0"/>
+          <a:ext cx="0" cy="0"/>
+          <a:chOff x="0" y="0"/>
+          <a:chExt cx="0" cy="0"/>
+        </a:xfrm>
+      </p:grpSpPr>
+      <p:sp>
+        <p:nvSpPr>
+          <p:cNvPr id="2" name="Title 1">
+            <a:extLst>
+              <a:ext uri="{FF2B5EF4-FFF2-40B4-BE49-F238E27FC236}">
+                <a16:creationId xmlns:a16="http://schemas.microsoft.com/office/drawing/2014/main" id="{969187DD-DCAD-0313-0C3B-196E66A775B7}"/>
+              </a:ext>
+            </a:extLst>
+          </p:cNvPr>
+          <p:cNvSpPr>
+            <a:spLocks noGrp="1"/>
+          </p:cNvSpPr>
+          <p:nvPr>
+            <p:ph type="title"/>
+          </p:nvPr>
+        </p:nvSpPr>
+        <p:spPr/>
+        <p:txBody>
+          <a:bodyPr/>
+          <a:lstStyle/>
+          <a:p>
+            <a:r>
+              <a:rPr lang="en-US" dirty="0"/>
+              <a:t>Experiments</a:t>
+            </a:r>
+          </a:p>
+        </p:txBody>
+      </p:sp>
+      <p:sp>
+        <p:nvSpPr>
+          <p:cNvPr id="3" name="Content Placeholder 2">
+            <a:extLst>
+              <a:ext uri="{FF2B5EF4-FFF2-40B4-BE49-F238E27FC236}">
+                <a16:creationId xmlns:a16="http://schemas.microsoft.com/office/drawing/2014/main" id="{870B6238-C70F-9FCA-AA77-9B5A3EEB905D}"/>
+              </a:ext>
+            </a:extLst>
+          </p:cNvPr>
+          <p:cNvSpPr>
+            <a:spLocks noGrp="1"/>
+          </p:cNvSpPr>
+          <p:nvPr>
+            <p:ph idx="1"/>
+          </p:nvPr>
+        </p:nvSpPr>
+        <p:spPr/>
+        <p:txBody>
+          <a:bodyPr vert="horz" lIns="91440" tIns="45720" rIns="91440" bIns="45720" rtlCol="0" anchor="t">
+            <a:normAutofit fontScale="85000" lnSpcReduction="20000"/>
+          </a:bodyPr>
+          <a:lstStyle/>
+          <a:p>
+            <a:r>
+              <a:rPr lang="en-US" dirty="0">
+                <a:cs typeface="Calibri"/>
+              </a:rPr>
+              <a:t>To test the Raspberry Pi, the machine ran an open source implementation of IP-PBX called Asterisk PBX. While Asterisk PBX was running, two phones were registered on the software using Zoiper, a VoIP implementation available on smartphones.</a:t>
+            </a:r>
+          </a:p>
+          <a:p>
+            <a:r>
+              <a:rPr lang="en-US" dirty="0">
+                <a:cs typeface="Calibri"/>
+              </a:rPr>
+              <a:t>There were two primary methods for testing the functionality of the Raspberry Pi running the IP-PBX software.</a:t>
+            </a:r>
+            <a:endParaRPr lang="en-US" dirty="0"/>
+          </a:p>
+          <a:p>
+            <a:pPr lvl="1"/>
+            <a:r>
+              <a:rPr lang="en-US" dirty="0">
+                <a:cs typeface="Calibri"/>
+              </a:rPr>
+              <a:t>Make calls at a variety of locations of different distance from the Raspberry Pi</a:t>
+            </a:r>
+          </a:p>
+          <a:p>
+            <a:pPr lvl="2"/>
+            <a:r>
+              <a:rPr lang="en-US" dirty="0">
+                <a:cs typeface="Calibri"/>
+              </a:rPr>
+              <a:t>In the same room</a:t>
+            </a:r>
+          </a:p>
+          <a:p>
+            <a:pPr lvl="2"/>
+            <a:r>
+              <a:rPr lang="en-US" dirty="0">
+                <a:cs typeface="Calibri"/>
+              </a:rPr>
+              <a:t>On the same floor</a:t>
+            </a:r>
+          </a:p>
+          <a:p>
+            <a:pPr lvl="2"/>
+            <a:r>
+              <a:rPr lang="en-US" dirty="0">
+                <a:cs typeface="Calibri"/>
+              </a:rPr>
+              <a:t>In the same building</a:t>
+            </a:r>
+          </a:p>
+          <a:p>
+            <a:pPr lvl="2"/>
+            <a:r>
+              <a:rPr lang="en-US" dirty="0">
+                <a:cs typeface="Calibri"/>
+              </a:rPr>
+              <a:t>Outside same building</a:t>
+            </a:r>
+          </a:p>
+          <a:p>
+            <a:pPr lvl="2"/>
+            <a:r>
+              <a:rPr lang="en-US" dirty="0">
+                <a:cs typeface="Calibri"/>
+              </a:rPr>
+              <a:t>In a different building</a:t>
+            </a:r>
+          </a:p>
+          <a:p>
+            <a:pPr lvl="1"/>
+            <a:r>
+              <a:rPr lang="en-US" dirty="0">
+                <a:cs typeface="Calibri"/>
+              </a:rPr>
+              <a:t>Make calls while the Raspberry Pi is emulating stressful network conditions using the </a:t>
+            </a:r>
+            <a:r>
+              <a:rPr lang="en-US" dirty="0" err="1">
+                <a:latin typeface="Linux"/>
+                <a:cs typeface="Calibri"/>
+              </a:rPr>
+              <a:t>tc</a:t>
+            </a:r>
+            <a:r>
+              <a:rPr lang="en-US" dirty="0">
+                <a:latin typeface="Linux"/>
+                <a:cs typeface="Calibri"/>
+              </a:rPr>
+              <a:t> […] </a:t>
+            </a:r>
+            <a:r>
+              <a:rPr lang="en-US" dirty="0" err="1">
+                <a:latin typeface="Linux"/>
+                <a:cs typeface="Calibri"/>
+              </a:rPr>
+              <a:t>netem</a:t>
+            </a:r>
+            <a:r>
+              <a:rPr lang="en-US" dirty="0">
+                <a:latin typeface="Linux"/>
+                <a:cs typeface="Calibri"/>
+              </a:rPr>
+              <a:t> set of commands.</a:t>
+            </a:r>
+          </a:p>
+          <a:p>
+            <a:pPr lvl="2"/>
+            <a:r>
+              <a:rPr lang="en-US" dirty="0">
+                <a:latin typeface="Linux"/>
+                <a:cs typeface="Calibri"/>
+              </a:rPr>
+              <a:t>Add a delay to outgoing packets.</a:t>
+            </a:r>
+          </a:p>
+          <a:p>
+            <a:pPr lvl="2"/>
+            <a:r>
+              <a:rPr lang="en-US" dirty="0">
+                <a:latin typeface="Linux"/>
+                <a:cs typeface="Calibri"/>
+              </a:rPr>
+              <a:t>Add jitter to outgoing packets.</a:t>
+            </a:r>
+          </a:p>
+          <a:p>
+            <a:pPr lvl="2"/>
+            <a:r>
+              <a:rPr lang="en-US" dirty="0">
+                <a:latin typeface="Linux"/>
+                <a:cs typeface="Calibri"/>
+              </a:rPr>
+              <a:t>Add corruption to outgoing packets.</a:t>
+            </a:r>
+          </a:p>
+          <a:p>
+            <a:pPr lvl="2"/>
+            <a:r>
+              <a:rPr lang="en-US" dirty="0">
+                <a:latin typeface="Linux"/>
+                <a:cs typeface="Calibri"/>
+              </a:rPr>
+              <a:t>Add chance of loss to outgoing packets.</a:t>
+            </a:r>
+          </a:p>
+          <a:p>
+            <a:pPr lvl="2"/>
+            <a:endParaRPr lang="en-US" dirty="0">
+              <a:latin typeface="Calibri" panose="020F0502020204030204"/>
+              <a:cs typeface="Calibri"/>
+            </a:endParaRPr>
+          </a:p>
+        </p:txBody>
+      </p:sp>
+    </p:spTree>
+    <p:extLst>
+      <p:ext uri="{BB962C8B-B14F-4D97-AF65-F5344CB8AC3E}">
+        <p14:creationId xmlns:p14="http://schemas.microsoft.com/office/powerpoint/2010/main" val="3352484359"/>
       </p:ext>
     </p:extLst>
   </p:cSld>
@@ -7173,31 +10178,154 @@
         <p:spPr/>
         <p:txBody>
           <a:bodyPr vert="horz" lIns="91440" tIns="45720" rIns="91440" bIns="45720" rtlCol="0" anchor="t">
-            <a:normAutofit lnSpcReduction="10000"/>
+            <a:normAutofit/>
           </a:bodyPr>
           <a:lstStyle/>
           <a:p>
             <a:r>
-              <a:rPr lang="en-US">
-                <a:cs typeface="Calibri"/>
-              </a:rPr>
-              <a:t>Modern telephone services are split between using traditional telephone networks and IP networks, such as the Internet. Voice over IP (VoIP) uses IP networks to make telephone calls, but it requires a machine running IP-PBX software to connect devices together for calls. A Raspberry Pi, a cheap and energy efficient single board computer, can run IP-PBX software and control calls made over VoIP, but it is limited by its low memory and weak CPU. </a:t>
-            </a:r>
-          </a:p>
-          <a:p>
-            <a:r>
-              <a:rPr lang="en-US">
-                <a:cs typeface="Calibri"/>
-              </a:rPr>
-              <a:t>An examination has been performed to see how well the Raspberry Pi fulfills its IP-PBX functions with a variety of stressors, with the goal of determining the suitability of Raspberry Pis for IP-PBX software.</a:t>
-            </a:r>
-          </a:p>
-          <a:p>
-            <a:r>
-              <a:rPr lang="en-US">
-                <a:cs typeface="Calibri"/>
-              </a:rPr>
-              <a:t>These tests were performed by running IP-PBX software on a Raspberry Pi, with calls made at different distances from the device and with the device working with different network difficulties.</a:t>
+              <a:rPr lang="en-US" sz="2400">
+                <a:cs typeface="Calibri"/>
+              </a:rPr>
+              <a:t>Determine optimal voice transmission paradigm in edge scenario</a:t>
+            </a:r>
+          </a:p>
+          <a:p>
+            <a:pPr lvl="1">
+              <a:buFont typeface="Courier New"/>
+              <a:buChar char="o"/>
+            </a:pPr>
+            <a:r>
+              <a:rPr lang="en-US" sz="2000">
+                <a:cs typeface="Calibri"/>
+              </a:rPr>
+              <a:t>Architecture: IP-based PBX</a:t>
+            </a:r>
+          </a:p>
+          <a:p>
+            <a:pPr lvl="1">
+              <a:buFont typeface="Courier New"/>
+              <a:buChar char="o"/>
+            </a:pPr>
+            <a:r>
+              <a:rPr lang="en-US" sz="2000">
+                <a:cs typeface="Calibri"/>
+              </a:rPr>
+              <a:t>Devices: Raspberry Pi, </a:t>
+            </a:r>
+            <a:r>
+              <a:rPr lang="en-US" sz="2000">
+                <a:ea typeface="+mn-lt"/>
+                <a:cs typeface="+mn-lt"/>
+              </a:rPr>
+              <a:t>a cheap and energy efficient single board computer, can run IP-PBX software and control calls made over VoIP, but it is limited by its low memory and weak CPU.</a:t>
+            </a:r>
+          </a:p>
+          <a:p>
+            <a:pPr lvl="1">
+              <a:buFont typeface="Courier New"/>
+              <a:buChar char="o"/>
+            </a:pPr>
+            <a:r>
+              <a:rPr lang="en-US" sz="2000">
+                <a:cs typeface="Calibri"/>
+              </a:rPr>
+              <a:t>Requirements:</a:t>
+            </a:r>
+          </a:p>
+          <a:p>
+            <a:pPr lvl="2">
+              <a:buFont typeface="Wingdings"/>
+              <a:buChar char="§"/>
+            </a:pPr>
+            <a:r>
+              <a:rPr lang="en-US" sz="1600">
+                <a:cs typeface="Calibri"/>
+              </a:rPr>
+              <a:t>Free and cheap communication within the local area, whiling maintaining egress access to remote entities.</a:t>
+            </a:r>
+          </a:p>
+          <a:p>
+            <a:pPr lvl="2">
+              <a:buFont typeface="Wingdings"/>
+              <a:buChar char="§"/>
+            </a:pPr>
+            <a:r>
+              <a:rPr lang="en-US" sz="1600">
+                <a:cs typeface="Calibri"/>
+              </a:rPr>
+              <a:t>Distributed implementation and centralized management.</a:t>
+            </a:r>
+          </a:p>
+          <a:p>
+            <a:r>
+              <a:rPr lang="en-US" sz="2400">
+                <a:cs typeface="Calibri"/>
+              </a:rPr>
+              <a:t>Implementation using IoT devices</a:t>
+            </a:r>
+          </a:p>
+          <a:p>
+            <a:pPr lvl="1">
+              <a:buFont typeface="Courier New"/>
+              <a:buChar char="o"/>
+            </a:pPr>
+            <a:r>
+              <a:rPr lang="en-US" sz="2000">
+                <a:cs typeface="Calibri"/>
+              </a:rPr>
+              <a:t>Fulfills the IP-PBX functions with </a:t>
+            </a:r>
+            <a:r>
+              <a:rPr lang="en-US" sz="2000">
+                <a:ea typeface="+mn-lt"/>
+                <a:cs typeface="+mn-lt"/>
+              </a:rPr>
+              <a:t>Raspberry Pi </a:t>
+            </a:r>
+          </a:p>
+          <a:p>
+            <a:pPr lvl="1">
+              <a:buFont typeface="Courier New"/>
+              <a:buChar char="o"/>
+            </a:pPr>
+            <a:r>
+              <a:rPr lang="en-US" sz="2000">
+                <a:cs typeface="Calibri"/>
+              </a:rPr>
+              <a:t>Verifies the suitability of Raspberry Pis for IP-PBX software </a:t>
+            </a:r>
+            <a:r>
+              <a:rPr lang="en-US" sz="2000">
+                <a:ea typeface="+mn-lt"/>
+                <a:cs typeface="+mn-lt"/>
+              </a:rPr>
+              <a:t>under a variety of stressors</a:t>
+            </a:r>
+            <a:r>
+              <a:rPr lang="en-US" sz="2000">
+                <a:cs typeface="Calibri"/>
+              </a:rPr>
+              <a:t>.</a:t>
+            </a:r>
+          </a:p>
+          <a:p>
+            <a:r>
+              <a:rPr lang="en-US" sz="2400">
+                <a:cs typeface="Calibri"/>
+              </a:rPr>
+              <a:t>Tests  </a:t>
+            </a:r>
+          </a:p>
+          <a:p>
+            <a:pPr lvl="1">
+              <a:buFont typeface="Courier New"/>
+              <a:buChar char="o"/>
+            </a:pPr>
+            <a:r>
+              <a:rPr lang="en-US" sz="2000">
+                <a:cs typeface="Calibri"/>
+              </a:rPr>
+              <a:t>Voice calls and transmission are made at different distances from the device and with the device working with different network difficulties.</a:t>
             </a:r>
           </a:p>
         </p:txBody>
@@ -7713,17 +10841,25 @@
                 <a:ea typeface="+mn-lt"/>
                 <a:cs typeface="+mn-lt"/>
               </a:rPr>
-              <a:t>Private Branch Exchange (PBX) is a technology which allows telephones to call each other, forwarding audio and controlling call behavior. While other technologies can provide similar services, PBX technology is designed for calls within a private institution.</a:t>
-            </a:r>
-          </a:p>
-          <a:p>
+              <a:t>Private Branch Exchange (PBX) </a:t>
+            </a:r>
+            <a:endParaRPr lang="en-US"/>
+          </a:p>
+          <a:p>
+            <a:pPr lvl="1">
+              <a:buFont typeface="Courier New"/>
+              <a:buChar char="o"/>
+            </a:pPr>
             <a:r>
               <a:rPr lang="en-US">
                 <a:ea typeface="+mn-lt"/>
                 <a:cs typeface="+mn-lt"/>
               </a:rPr>
-              <a:t>With the advent of the internet, Voice over IP (VoIP) was created, allowing for telephone services to be provided over IP networks instead of standard telephone networks. Today, IP networks are so cheap and widespread that it is more cost efficient to use them for telephony than standard phone networks.</a:t>
-            </a:r>
+              <a:t>a technology which allows telephones to call each other, forwarding audio and controlling call behavior. While other technologies can provide similar services, PBX technology is designed for calls within a private institution.</a:t>
+            </a:r>
+            <a:endParaRPr lang="en-US">
+              <a:cs typeface="Calibri"/>
+            </a:endParaRPr>
           </a:p>
           <a:p>
             <a:r>
@@ -7731,8 +10867,46 @@
                 <a:ea typeface="+mn-lt"/>
                 <a:cs typeface="+mn-lt"/>
               </a:rPr>
+              <a:t>Voice over IP (VoIP) </a:t>
+            </a:r>
+          </a:p>
+          <a:p>
+            <a:pPr lvl="1">
+              <a:buFont typeface="Courier New"/>
+              <a:buChar char="o"/>
+            </a:pPr>
+            <a:r>
+              <a:rPr lang="en-US">
+                <a:ea typeface="+mn-lt"/>
+                <a:cs typeface="+mn-lt"/>
+              </a:rPr>
+              <a:t>allowing for telephone services to be provided over IP networks instead of standard telephone networks. Today, IP networks are so cheap and widespread that it is more cost efficient to use them for telephony than standard phone networks.</a:t>
+            </a:r>
+          </a:p>
+          <a:p>
+            <a:r>
+              <a:rPr lang="en-US">
+                <a:ea typeface="+mn-lt"/>
+                <a:cs typeface="+mn-lt"/>
+              </a:rPr>
+              <a:t>Characteristics</a:t>
+            </a:r>
+          </a:p>
+          <a:p>
+            <a:pPr lvl="1">
+              <a:buFont typeface="Courier New"/>
+              <a:buChar char="o"/>
+            </a:pPr>
+            <a:r>
+              <a:rPr lang="en-US">
+                <a:ea typeface="+mn-lt"/>
+                <a:cs typeface="+mn-lt"/>
+              </a:rPr>
               <a:t>Hosting communication within a limited area, while still maintaining access to the entities outside is a natural characteristics of IoT scenarios and the reason IP-based PBX paradigm is suitable for IoT. </a:t>
             </a:r>
+            <a:endParaRPr lang="en-US">
+              <a:cs typeface="Calibri"/>
+            </a:endParaRPr>
           </a:p>
           <a:p>
             <a:pPr marL="0" indent="0">
@@ -8173,26 +11347,32 @@
             <p:ph idx="1"/>
           </p:nvPr>
         </p:nvSpPr>
-        <p:spPr/>
+        <p:spPr>
+          <a:xfrm>
+            <a:off x="838200" y="1638966"/>
+            <a:ext cx="7637929" cy="4878655"/>
+          </a:xfrm>
+        </p:spPr>
         <p:txBody>
           <a:bodyPr vert="horz" lIns="91440" tIns="45720" rIns="91440" bIns="45720" rtlCol="0" anchor="t">
             <a:normAutofit/>
           </a:bodyPr>
           <a:lstStyle/>
           <a:p>
-            <a:pPr lvl="1"/>
-            <a:r>
-              <a:rPr lang="en-US">
+            <a:r>
+              <a:rPr lang="en-US" sz="2400">
                 <a:ea typeface="+mn-lt"/>
                 <a:cs typeface="+mn-lt"/>
               </a:rPr>
               <a:t>RTP carries the media streams, while RTCP is used to monitor transmission statistics and quality of service</a:t>
             </a:r>
-          </a:p>
-          <a:p>
-            <a:pPr lvl="1"/>
-            <a:r>
-              <a:rPr lang="en-US">
+            <a:endParaRPr lang="en-US" sz="2400">
+              <a:cs typeface="Calibri"/>
+            </a:endParaRPr>
+          </a:p>
+          <a:p>
+            <a:r>
+              <a:rPr lang="en-US" sz="2400">
                 <a:ea typeface="+mn-lt"/>
                 <a:cs typeface="+mn-lt"/>
               </a:rPr>
@@ -8200,9 +11380,8 @@
             </a:r>
           </a:p>
           <a:p>
-            <a:pPr lvl="1"/>
-            <a:r>
-              <a:rPr lang="en-US">
+            <a:r>
+              <a:rPr lang="en-US" sz="2400">
                 <a:ea typeface="+mn-lt"/>
                 <a:cs typeface="+mn-lt"/>
               </a:rPr>
@@ -8210,9 +11389,8 @@
             </a:r>
           </a:p>
           <a:p>
-            <a:pPr lvl="1"/>
-            <a:r>
-              <a:rPr lang="en-US">
+            <a:r>
+              <a:rPr lang="en-US" sz="2400">
                 <a:ea typeface="+mn-lt"/>
                 <a:cs typeface="+mn-lt"/>
               </a:rPr>
@@ -8221,6 +11399,66 @@
           </a:p>
         </p:txBody>
       </p:sp>
+      <p:pic>
+        <p:nvPicPr>
+          <p:cNvPr id="4" name="Picture 4" descr="Table&#10;&#10;Description automatically generated">
+            <a:extLst>
+              <a:ext uri="{FF2B5EF4-FFF2-40B4-BE49-F238E27FC236}">
+                <a16:creationId xmlns:a16="http://schemas.microsoft.com/office/drawing/2014/main" id="{4973B74B-418E-2CB2-0311-A1FE311F35EB}"/>
+              </a:ext>
+            </a:extLst>
+          </p:cNvPr>
+          <p:cNvPicPr>
+            <a:picLocks noChangeAspect="1"/>
+          </p:cNvPicPr>
+          <p:nvPr/>
+        </p:nvPicPr>
+        <p:blipFill>
+          <a:blip r:embed="rId2"/>
+          <a:stretch>
+            <a:fillRect/>
+          </a:stretch>
+        </p:blipFill>
+        <p:spPr>
+          <a:xfrm>
+            <a:off x="8785412" y="1338730"/>
+            <a:ext cx="2743200" cy="2082800"/>
+          </a:xfrm>
+          <a:prstGeom prst="rect">
+            <a:avLst/>
+          </a:prstGeom>
+        </p:spPr>
+      </p:pic>
+      <p:pic>
+        <p:nvPicPr>
+          <p:cNvPr id="5" name="Picture 5" descr="Table&#10;&#10;Description automatically generated">
+            <a:extLst>
+              <a:ext uri="{FF2B5EF4-FFF2-40B4-BE49-F238E27FC236}">
+                <a16:creationId xmlns:a16="http://schemas.microsoft.com/office/drawing/2014/main" id="{3934A0A6-FA12-A670-3C2A-2D0476AE3537}"/>
+              </a:ext>
+            </a:extLst>
+          </p:cNvPr>
+          <p:cNvPicPr>
+            <a:picLocks noChangeAspect="1"/>
+          </p:cNvPicPr>
+          <p:nvPr/>
+        </p:nvPicPr>
+        <p:blipFill>
+          <a:blip r:embed="rId3"/>
+          <a:stretch>
+            <a:fillRect/>
+          </a:stretch>
+        </p:blipFill>
+        <p:spPr>
+          <a:xfrm>
+            <a:off x="8785412" y="3932321"/>
+            <a:ext cx="2743200" cy="2346158"/>
+          </a:xfrm>
+          <a:prstGeom prst="rect">
+            <a:avLst/>
+          </a:prstGeom>
+        </p:spPr>
+      </p:pic>
     </p:spTree>
     <p:extLst>
       <p:ext uri="{BB962C8B-B14F-4D97-AF65-F5344CB8AC3E}">
@@ -8493,4 +11731,299 @@
     </a:ext>
   </a:extLst>
 </a:theme>
+</file>
+
+<file path=ppt/theme/theme2.xml><?xml version="1.0" encoding="utf-8"?>
+<a:theme xmlns:a="http://schemas.openxmlformats.org/drawingml/2006/main" name="Office Theme">
+  <a:themeElements>
+    <a:clrScheme name="Office">
+      <a:dk1>
+        <a:sysClr val="windowText" lastClr="000000"/>
+      </a:dk1>
+      <a:lt1>
+        <a:sysClr val="window" lastClr="FFFFFF"/>
+      </a:lt1>
+      <a:dk2>
+        <a:srgbClr val="44546A"/>
+      </a:dk2>
+      <a:lt2>
+        <a:srgbClr val="E7E6E6"/>
+      </a:lt2>
+      <a:accent1>
+        <a:srgbClr val="4472C4"/>
+      </a:accent1>
+      <a:accent2>
+        <a:srgbClr val="ED7D31"/>
+      </a:accent2>
+      <a:accent3>
+        <a:srgbClr val="A5A5A5"/>
+      </a:accent3>
+      <a:accent4>
+        <a:srgbClr val="FFC000"/>
+      </a:accent4>
+      <a:accent5>
+        <a:srgbClr val="5B9BD5"/>
+      </a:accent5>
+      <a:accent6>
+        <a:srgbClr val="70AD47"/>
+      </a:accent6>
+      <a:hlink>
+        <a:srgbClr val="0563C1"/>
+      </a:hlink>
+      <a:folHlink>
+        <a:srgbClr val="954F72"/>
+      </a:folHlink>
+    </a:clrScheme>
+    <a:fontScheme name="Office">
+      <a:majorFont>
+        <a:latin typeface="Calibri Light" panose="020F0302020204030204"/>
+        <a:ea typeface=""/>
+        <a:cs typeface=""/>
+        <a:font script="Jpan" typeface="游ゴシック Light"/>
+        <a:font script="Hang" typeface="맑은 고딕"/>
+        <a:font script="Hans" typeface="等线 Light"/>
+        <a:font script="Hant" typeface="新細明體"/>
+        <a:font script="Arab" typeface="Times New Roman"/>
+        <a:font script="Hebr" typeface="Times New Roman"/>
+        <a:font script="Thai" typeface="Angsana New"/>
+        <a:font script="Ethi" typeface="Nyala"/>
+        <a:font script="Beng" typeface="Vrinda"/>
+        <a:font script="Gujr" typeface="Shruti"/>
+        <a:font script="Khmr" typeface="MoolBoran"/>
+        <a:font script="Knda" typeface="Tunga"/>
+        <a:font script="Guru" typeface="Raavi"/>
+        <a:font script="Cans" typeface="Euphemia"/>
+        <a:font script="Cher" typeface="Plantagenet Cherokee"/>
+        <a:font script="Yiii" typeface="Microsoft Yi Baiti"/>
+        <a:font script="Tibt" typeface="Microsoft Himalaya"/>
+        <a:font script="Thaa" typeface="MV Boli"/>
+        <a:font script="Deva" typeface="Mangal"/>
+        <a:font script="Telu" typeface="Gautami"/>
+        <a:font script="Taml" typeface="Latha"/>
+        <a:font script="Syrc" typeface="Estrangelo Edessa"/>
+        <a:font script="Orya" typeface="Kalinga"/>
+        <a:font script="Mlym" typeface="Kartika"/>
+        <a:font script="Laoo" typeface="DokChampa"/>
+        <a:font script="Sinh" typeface="Iskoola Pota"/>
+        <a:font script="Mong" typeface="Mongolian Baiti"/>
+        <a:font script="Viet" typeface="Times New Roman"/>
+        <a:font script="Uigh" typeface="Microsoft Uighur"/>
+        <a:font script="Geor" typeface="Sylfaen"/>
+        <a:font script="Armn" typeface="Arial"/>
+        <a:font script="Bugi" typeface="Leelawadee UI"/>
+        <a:font script="Bopo" typeface="Microsoft JhengHei"/>
+        <a:font script="Java" typeface="Javanese Text"/>
+        <a:font script="Lisu" typeface="Segoe UI"/>
+        <a:font script="Mymr" typeface="Myanmar Text"/>
+        <a:font script="Nkoo" typeface="Ebrima"/>
+        <a:font script="Olck" typeface="Nirmala UI"/>
+        <a:font script="Osma" typeface="Ebrima"/>
+        <a:font script="Phag" typeface="Phagspa"/>
+        <a:font script="Syrn" typeface="Estrangelo Edessa"/>
+        <a:font script="Syrj" typeface="Estrangelo Edessa"/>
+        <a:font script="Syre" typeface="Estrangelo Edessa"/>
+        <a:font script="Sora" typeface="Nirmala UI"/>
+        <a:font script="Tale" typeface="Microsoft Tai Le"/>
+        <a:font script="Talu" typeface="Microsoft New Tai Lue"/>
+        <a:font script="Tfng" typeface="Ebrima"/>
+      </a:majorFont>
+      <a:minorFont>
+        <a:latin typeface="Calibri" panose="020F0502020204030204"/>
+        <a:ea typeface=""/>
+        <a:cs typeface=""/>
+        <a:font script="Jpan" typeface="游ゴシック"/>
+        <a:font script="Hang" typeface="맑은 고딕"/>
+        <a:font script="Hans" typeface="等线"/>
+        <a:font script="Hant" typeface="新細明體"/>
+        <a:font script="Arab" typeface="Arial"/>
+        <a:font script="Hebr" typeface="Arial"/>
+        <a:font script="Thai" typeface="Cordia New"/>
+        <a:font script="Ethi" typeface="Nyala"/>
+        <a:font script="Beng" typeface="Vrinda"/>
+        <a:font script="Gujr" typeface="Shruti"/>
+        <a:font script="Khmr" typeface="DaunPenh"/>
+        <a:font script="Knda" typeface="Tunga"/>
+        <a:font script="Guru" typeface="Raavi"/>
+        <a:font script="Cans" typeface="Euphemia"/>
+        <a:font script="Cher" typeface="Plantagenet Cherokee"/>
+        <a:font script="Yiii" typeface="Microsoft Yi Baiti"/>
+        <a:font script="Tibt" typeface="Microsoft Himalaya"/>
+        <a:font script="Thaa" typeface="MV Boli"/>
+        <a:font script="Deva" typeface="Mangal"/>
+        <a:font script="Telu" typeface="Gautami"/>
+        <a:font script="Taml" typeface="Latha"/>
+        <a:font script="Syrc" typeface="Estrangelo Edessa"/>
+        <a:font script="Orya" typeface="Kalinga"/>
+        <a:font script="Mlym" typeface="Kartika"/>
+        <a:font script="Laoo" typeface="DokChampa"/>
+        <a:font script="Sinh" typeface="Iskoola Pota"/>
+        <a:font script="Mong" typeface="Mongolian Baiti"/>
+        <a:font script="Viet" typeface="Arial"/>
+        <a:font script="Uigh" typeface="Microsoft Uighur"/>
+        <a:font script="Geor" typeface="Sylfaen"/>
+        <a:font script="Armn" typeface="Arial"/>
+        <a:font script="Bugi" typeface="Leelawadee UI"/>
+        <a:font script="Bopo" typeface="Microsoft JhengHei"/>
+        <a:font script="Java" typeface="Javanese Text"/>
+        <a:font script="Lisu" typeface="Segoe UI"/>
+        <a:font script="Mymr" typeface="Myanmar Text"/>
+        <a:font script="Nkoo" typeface="Ebrima"/>
+        <a:font script="Olck" typeface="Nirmala UI"/>
+        <a:font script="Osma" typeface="Ebrima"/>
+        <a:font script="Phag" typeface="Phagspa"/>
+        <a:font script="Syrn" typeface="Estrangelo Edessa"/>
+        <a:font script="Syrj" typeface="Estrangelo Edessa"/>
+        <a:font script="Syre" typeface="Estrangelo Edessa"/>
+        <a:font script="Sora" typeface="Nirmala UI"/>
+        <a:font script="Tale" typeface="Microsoft Tai Le"/>
+        <a:font script="Talu" typeface="Microsoft New Tai Lue"/>
+        <a:font script="Tfng" typeface="Ebrima"/>
+      </a:minorFont>
+    </a:fontScheme>
+    <a:fmtScheme name="Office">
+      <a:fillStyleLst>
+        <a:solidFill>
+          <a:schemeClr val="phClr"/>
+        </a:solidFill>
+        <a:gradFill rotWithShape="1">
+          <a:gsLst>
+            <a:gs pos="0">
+              <a:schemeClr val="phClr">
+                <a:lumMod val="110000"/>
+                <a:satMod val="105000"/>
+                <a:tint val="67000"/>
+              </a:schemeClr>
+            </a:gs>
+            <a:gs pos="50000">
+              <a:schemeClr val="phClr">
+                <a:lumMod val="105000"/>
+                <a:satMod val="103000"/>
+                <a:tint val="73000"/>
+              </a:schemeClr>
+            </a:gs>
+            <a:gs pos="100000">
+              <a:schemeClr val="phClr">
+                <a:lumMod val="105000"/>
+                <a:satMod val="109000"/>
+                <a:tint val="81000"/>
+              </a:schemeClr>
+            </a:gs>
+          </a:gsLst>
+          <a:lin ang="5400000" scaled="0"/>
+        </a:gradFill>
+        <a:gradFill rotWithShape="1">
+          <a:gsLst>
+            <a:gs pos="0">
+              <a:schemeClr val="phClr">
+                <a:satMod val="103000"/>
+                <a:lumMod val="102000"/>
+                <a:tint val="94000"/>
+              </a:schemeClr>
+            </a:gs>
+            <a:gs pos="50000">
+              <a:schemeClr val="phClr">
+                <a:satMod val="110000"/>
+                <a:lumMod val="100000"/>
+                <a:shade val="100000"/>
+              </a:schemeClr>
+            </a:gs>
+            <a:gs pos="100000">
+              <a:schemeClr val="phClr">
+                <a:lumMod val="99000"/>
+                <a:satMod val="120000"/>
+                <a:shade val="78000"/>
+              </a:schemeClr>
+            </a:gs>
+          </a:gsLst>
+          <a:lin ang="5400000" scaled="0"/>
+        </a:gradFill>
+      </a:fillStyleLst>
+      <a:lnStyleLst>
+        <a:ln w="6350" cap="flat" cmpd="sng" algn="ctr">
+          <a:solidFill>
+            <a:schemeClr val="phClr"/>
+          </a:solidFill>
+          <a:prstDash val="solid"/>
+          <a:miter lim="800000"/>
+        </a:ln>
+        <a:ln w="12700" cap="flat" cmpd="sng" algn="ctr">
+          <a:solidFill>
+            <a:schemeClr val="phClr"/>
+          </a:solidFill>
+          <a:prstDash val="solid"/>
+          <a:miter lim="800000"/>
+        </a:ln>
+        <a:ln w="19050" cap="flat" cmpd="sng" algn="ctr">
+          <a:solidFill>
+            <a:schemeClr val="phClr"/>
+          </a:solidFill>
+          <a:prstDash val="solid"/>
+          <a:miter lim="800000"/>
+        </a:ln>
+      </a:lnStyleLst>
+      <a:effectStyleLst>
+        <a:effectStyle>
+          <a:effectLst/>
+        </a:effectStyle>
+        <a:effectStyle>
+          <a:effectLst/>
+        </a:effectStyle>
+        <a:effectStyle>
+          <a:effectLst>
+            <a:outerShdw blurRad="57150" dist="19050" dir="5400000" algn="ctr" rotWithShape="0">
+              <a:srgbClr val="000000">
+                <a:alpha val="63000"/>
+              </a:srgbClr>
+            </a:outerShdw>
+          </a:effectLst>
+        </a:effectStyle>
+      </a:effectStyleLst>
+      <a:bgFillStyleLst>
+        <a:solidFill>
+          <a:schemeClr val="phClr"/>
+        </a:solidFill>
+        <a:solidFill>
+          <a:schemeClr val="phClr">
+            <a:tint val="95000"/>
+            <a:satMod val="170000"/>
+          </a:schemeClr>
+        </a:solidFill>
+        <a:gradFill rotWithShape="1">
+          <a:gsLst>
+            <a:gs pos="0">
+              <a:schemeClr val="phClr">
+                <a:tint val="93000"/>
+                <a:satMod val="150000"/>
+                <a:shade val="98000"/>
+                <a:lumMod val="102000"/>
+              </a:schemeClr>
+            </a:gs>
+            <a:gs pos="50000">
+              <a:schemeClr val="phClr">
+                <a:tint val="98000"/>
+                <a:satMod val="130000"/>
+                <a:shade val="90000"/>
+                <a:lumMod val="103000"/>
+              </a:schemeClr>
+            </a:gs>
+            <a:gs pos="100000">
+              <a:schemeClr val="phClr">
+                <a:shade val="63000"/>
+                <a:satMod val="120000"/>
+              </a:schemeClr>
+            </a:gs>
+          </a:gsLst>
+          <a:lin ang="5400000" scaled="0"/>
+        </a:gradFill>
+      </a:bgFillStyleLst>
+    </a:fmtScheme>
+  </a:themeElements>
+  <a:objectDefaults/>
+  <a:extraClrSchemeLst/>
+  <a:extLst>
+    <a:ext uri="{05A4C25C-085E-4340-85A3-A5531E510DB2}">
+      <thm15:themeFamily xmlns:thm15="http://schemas.microsoft.com/office/thememl/2012/main" name="Office Theme" id="{62F939B6-93AF-4DB8-9C6B-D6C7DFDC589F}" vid="{4A3C46E8-61CC-4603-A589-7422A47A8E4A}"/>
+    </a:ext>
+  </a:extLst>
+</a:theme>
 </file>
</xml_diff>

<commit_message>
Update @03:42 on Apr27
</commit_message>
<xml_diff>
--- a/project_presentation/VoIP_final_presentation.pptx
+++ b/project_presentation/VoIP_final_presentation.pptx
@@ -5,7 +5,7 @@
     <p:sldMasterId id="2147483660" r:id="rId1"/>
   </p:sldMasterIdLst>
   <p:notesMasterIdLst>
-    <p:notesMasterId r:id="rId29"/>
+    <p:notesMasterId r:id="rId30"/>
   </p:notesMasterIdLst>
   <p:sldIdLst>
     <p:sldId id="256" r:id="rId2"/>
@@ -19,22 +19,23 @@
     <p:sldId id="310" r:id="rId10"/>
     <p:sldId id="299" r:id="rId11"/>
     <p:sldId id="313" r:id="rId12"/>
-    <p:sldId id="300" r:id="rId13"/>
-    <p:sldId id="301" r:id="rId14"/>
-    <p:sldId id="302" r:id="rId15"/>
-    <p:sldId id="314" r:id="rId16"/>
-    <p:sldId id="315" r:id="rId17"/>
-    <p:sldId id="316" r:id="rId18"/>
-    <p:sldId id="317" r:id="rId19"/>
-    <p:sldId id="318" r:id="rId20"/>
-    <p:sldId id="304" r:id="rId21"/>
-    <p:sldId id="305" r:id="rId22"/>
-    <p:sldId id="306" r:id="rId23"/>
-    <p:sldId id="307" r:id="rId24"/>
-    <p:sldId id="308" r:id="rId25"/>
-    <p:sldId id="291" r:id="rId26"/>
-    <p:sldId id="278" r:id="rId27"/>
-    <p:sldId id="303" r:id="rId28"/>
+    <p:sldId id="319" r:id="rId13"/>
+    <p:sldId id="300" r:id="rId14"/>
+    <p:sldId id="301" r:id="rId15"/>
+    <p:sldId id="302" r:id="rId16"/>
+    <p:sldId id="314" r:id="rId17"/>
+    <p:sldId id="315" r:id="rId18"/>
+    <p:sldId id="316" r:id="rId19"/>
+    <p:sldId id="317" r:id="rId20"/>
+    <p:sldId id="318" r:id="rId21"/>
+    <p:sldId id="304" r:id="rId22"/>
+    <p:sldId id="305" r:id="rId23"/>
+    <p:sldId id="306" r:id="rId24"/>
+    <p:sldId id="307" r:id="rId25"/>
+    <p:sldId id="308" r:id="rId26"/>
+    <p:sldId id="291" r:id="rId27"/>
+    <p:sldId id="278" r:id="rId28"/>
+    <p:sldId id="303" r:id="rId29"/>
   </p:sldIdLst>
   <p:sldSz cx="12192000" cy="6858000"/>
   <p:notesSz cx="6858000" cy="9144000"/>
@@ -161,6 +162,7 @@
           <p14:sldIdLst>
             <p14:sldId id="299"/>
             <p14:sldId id="313"/>
+            <p14:sldId id="319"/>
           </p14:sldIdLst>
         </p14:section>
         <p14:section name="Methods" id="{F7982453-A15C-4E42-B880-419123069252}">
@@ -222,7 +224,7 @@
     <p1510:client id="{01608A76-BCC8-435D-A7FD-998D591FE69B}" v="1921" dt="2022-04-27T02:58:41.989"/>
     <p1510:client id="{30B743A9-FCAB-B7E6-CCF6-432FA1F40417}" v="453" dt="2022-04-27T19:46:04.285"/>
     <p1510:client id="{CEF57F2F-C4BD-07E3-E520-EC11CBA76586}" v="3" dt="2022-04-27T11:24:33.905"/>
-    <p1510:client id="{CFF72AAC-1248-F64C-B090-8BDD8C7CADC1}" v="604" dt="2022-04-27T20:14:08.163"/>
+    <p1510:client id="{CFF72AAC-1248-F64C-B090-8BDD8C7CADC1}" v="608" dt="2022-04-27T20:39:42.913"/>
     <p1510:client id="{DF6E75B9-1B48-4DA7-7F6A-2FFC95E13E83}" v="2274" dt="2022-04-27T19:13:58.205"/>
     <p1510:client id="{F3749FAE-333C-70EC-2BF1-6FEE8A68231B}" v="4" dt="2022-04-27T00:42:56.871"/>
   </p1510:revLst>
@@ -721,7 +723,7 @@
   <pc:docChgLst>
     <pc:chgData name="Trupesh Patel" userId="b76c5197-b424-428e-a787-d44a01bbf658" providerId="ADAL" clId="{CFF72AAC-1248-F64C-B090-8BDD8C7CADC1}"/>
     <pc:docChg chg="undo custSel addSld delSld modSld sldOrd addSection delSection modSection">
-      <pc:chgData name="Trupesh Patel" userId="b76c5197-b424-428e-a787-d44a01bbf658" providerId="ADAL" clId="{CFF72AAC-1248-F64C-B090-8BDD8C7CADC1}" dt="2022-04-27T20:14:42.615" v="610" actId="20578"/>
+      <pc:chgData name="Trupesh Patel" userId="b76c5197-b424-428e-a787-d44a01bbf658" providerId="ADAL" clId="{CFF72AAC-1248-F64C-B090-8BDD8C7CADC1}" dt="2022-04-27T20:40:54.014" v="707" actId="1037"/>
       <pc:docMkLst>
         <pc:docMk/>
       </pc:docMkLst>
@@ -924,7 +926,7 @@
         </pc:spChg>
       </pc:sldChg>
       <pc:sldChg chg="modSp new mod">
-        <pc:chgData name="Trupesh Patel" userId="b76c5197-b424-428e-a787-d44a01bbf658" providerId="ADAL" clId="{CFF72AAC-1248-F64C-B090-8BDD8C7CADC1}" dt="2022-04-27T01:28:30.200" v="277" actId="27636"/>
+        <pc:chgData name="Trupesh Patel" userId="b76c5197-b424-428e-a787-d44a01bbf658" providerId="ADAL" clId="{CFF72AAC-1248-F64C-B090-8BDD8C7CADC1}" dt="2022-04-27T20:20:00.910" v="613" actId="20577"/>
         <pc:sldMkLst>
           <pc:docMk/>
           <pc:sldMk cId="3734144312" sldId="301"/>
@@ -935,6 +937,14 @@
             <pc:docMk/>
             <pc:sldMk cId="3734144312" sldId="301"/>
             <ac:spMk id="2" creationId="{3AF48D9F-204C-0D58-8D23-328DBBE9B883}"/>
+          </ac:spMkLst>
+        </pc:spChg>
+        <pc:spChg chg="mod">
+          <ac:chgData name="Trupesh Patel" userId="b76c5197-b424-428e-a787-d44a01bbf658" providerId="ADAL" clId="{CFF72AAC-1248-F64C-B090-8BDD8C7CADC1}" dt="2022-04-27T20:20:00.910" v="613" actId="20577"/>
+          <ac:spMkLst>
+            <pc:docMk/>
+            <pc:sldMk cId="3734144312" sldId="301"/>
+            <ac:spMk id="3" creationId="{F5E0EB9B-DF1B-D042-F8E7-65DEFDD915C2}"/>
           </ac:spMkLst>
         </pc:spChg>
       </pc:sldChg>
@@ -1083,18 +1093,57 @@
           </ac:spMkLst>
         </pc:spChg>
       </pc:sldChg>
-      <pc:sldChg chg="addSp">
-        <pc:chgData name="Trupesh Patel" userId="b76c5197-b424-428e-a787-d44a01bbf658" providerId="ADAL" clId="{CFF72AAC-1248-F64C-B090-8BDD8C7CADC1}" dt="2022-04-27T19:43:28.035" v="579" actId="14826"/>
+      <pc:sldChg chg="addSp modSp mod">
+        <pc:chgData name="Trupesh Patel" userId="b76c5197-b424-428e-a787-d44a01bbf658" providerId="ADAL" clId="{CFF72AAC-1248-F64C-B090-8BDD8C7CADC1}" dt="2022-04-27T20:40:54.014" v="707" actId="1037"/>
         <pc:sldMkLst>
           <pc:docMk/>
           <pc:sldMk cId="1387990069" sldId="310"/>
         </pc:sldMkLst>
-        <pc:picChg chg="add">
-          <ac:chgData name="Trupesh Patel" userId="b76c5197-b424-428e-a787-d44a01bbf658" providerId="ADAL" clId="{CFF72AAC-1248-F64C-B090-8BDD8C7CADC1}" dt="2022-04-27T19:43:28.035" v="579" actId="14826"/>
+        <pc:spChg chg="mod">
+          <ac:chgData name="Trupesh Patel" userId="b76c5197-b424-428e-a787-d44a01bbf658" providerId="ADAL" clId="{CFF72AAC-1248-F64C-B090-8BDD8C7CADC1}" dt="2022-04-27T20:40:39.328" v="688" actId="14100"/>
+          <ac:spMkLst>
+            <pc:docMk/>
+            <pc:sldMk cId="1387990069" sldId="310"/>
+            <ac:spMk id="3" creationId="{A848CA97-69D1-23E4-0908-969B5D5A28FC}"/>
+          </ac:spMkLst>
+        </pc:spChg>
+        <pc:picChg chg="mod">
+          <ac:chgData name="Trupesh Patel" userId="b76c5197-b424-428e-a787-d44a01bbf658" providerId="ADAL" clId="{CFF72AAC-1248-F64C-B090-8BDD8C7CADC1}" dt="2022-04-27T20:40:54.014" v="707" actId="1037"/>
+          <ac:picMkLst>
+            <pc:docMk/>
+            <pc:sldMk cId="1387990069" sldId="310"/>
+            <ac:picMk id="4" creationId="{4973B74B-418E-2CB2-0311-A1FE311F35EB}"/>
+          </ac:picMkLst>
+        </pc:picChg>
+        <pc:picChg chg="add mod">
+          <ac:chgData name="Trupesh Patel" userId="b76c5197-b424-428e-a787-d44a01bbf658" providerId="ADAL" clId="{CFF72AAC-1248-F64C-B090-8BDD8C7CADC1}" dt="2022-04-27T20:40:54.014" v="707" actId="1037"/>
           <ac:picMkLst>
             <pc:docMk/>
             <pc:sldMk cId="1387990069" sldId="310"/>
             <ac:picMk id="5" creationId="{3934A0A6-FA12-A670-3C2A-2D0476AE3537}"/>
+          </ac:picMkLst>
+        </pc:picChg>
+      </pc:sldChg>
+      <pc:sldChg chg="addSp modSp mod">
+        <pc:chgData name="Trupesh Patel" userId="b76c5197-b424-428e-a787-d44a01bbf658" providerId="ADAL" clId="{CFF72AAC-1248-F64C-B090-8BDD8C7CADC1}" dt="2022-04-27T20:37:29.308" v="667" actId="1038"/>
+        <pc:sldMkLst>
+          <pc:docMk/>
+          <pc:sldMk cId="3285169088" sldId="313"/>
+        </pc:sldMkLst>
+        <pc:picChg chg="mod modCrop">
+          <ac:chgData name="Trupesh Patel" userId="b76c5197-b424-428e-a787-d44a01bbf658" providerId="ADAL" clId="{CFF72AAC-1248-F64C-B090-8BDD8C7CADC1}" dt="2022-04-27T20:37:29.308" v="667" actId="1038"/>
+          <ac:picMkLst>
+            <pc:docMk/>
+            <pc:sldMk cId="3285169088" sldId="313"/>
+            <ac:picMk id="5" creationId="{1C77B8A8-71D3-3BBC-EF7A-5C5872F91A1D}"/>
+          </ac:picMkLst>
+        </pc:picChg>
+        <pc:picChg chg="add mod modCrop">
+          <ac:chgData name="Trupesh Patel" userId="b76c5197-b424-428e-a787-d44a01bbf658" providerId="ADAL" clId="{CFF72AAC-1248-F64C-B090-8BDD8C7CADC1}" dt="2022-04-27T20:37:29.308" v="667" actId="1038"/>
+          <ac:picMkLst>
+            <pc:docMk/>
+            <pc:sldMk cId="3285169088" sldId="313"/>
+            <ac:picMk id="6" creationId="{9CD9920C-24E7-1A4F-7F28-93CE1BCE31AC}"/>
           </ac:picMkLst>
         </pc:picChg>
       </pc:sldChg>
@@ -1261,6 +1310,53 @@
           </ac:picMkLst>
         </pc:picChg>
       </pc:sldChg>
+      <pc:sldChg chg="addSp delSp modSp add mod">
+        <pc:chgData name="Trupesh Patel" userId="b76c5197-b424-428e-a787-d44a01bbf658" providerId="ADAL" clId="{CFF72AAC-1248-F64C-B090-8BDD8C7CADC1}" dt="2022-04-27T20:40:18.599" v="687" actId="20577"/>
+        <pc:sldMkLst>
+          <pc:docMk/>
+          <pc:sldMk cId="3564021131" sldId="319"/>
+        </pc:sldMkLst>
+        <pc:spChg chg="mod">
+          <ac:chgData name="Trupesh Patel" userId="b76c5197-b424-428e-a787-d44a01bbf658" providerId="ADAL" clId="{CFF72AAC-1248-F64C-B090-8BDD8C7CADC1}" dt="2022-04-27T20:40:18.599" v="687" actId="20577"/>
+          <ac:spMkLst>
+            <pc:docMk/>
+            <pc:sldMk cId="3564021131" sldId="319"/>
+            <ac:spMk id="3" creationId="{FCBA1FF2-4AC2-3039-CEF1-40D7C55EA20D}"/>
+          </ac:spMkLst>
+        </pc:spChg>
+        <pc:spChg chg="add del mod">
+          <ac:chgData name="Trupesh Patel" userId="b76c5197-b424-428e-a787-d44a01bbf658" providerId="ADAL" clId="{CFF72AAC-1248-F64C-B090-8BDD8C7CADC1}" dt="2022-04-27T20:39:42.912" v="672" actId="931"/>
+          <ac:spMkLst>
+            <pc:docMk/>
+            <pc:sldMk cId="3564021131" sldId="319"/>
+            <ac:spMk id="7" creationId="{0A12B7B0-A9CA-C8C3-0466-0EFFB4465F78}"/>
+          </ac:spMkLst>
+        </pc:spChg>
+        <pc:picChg chg="del">
+          <ac:chgData name="Trupesh Patel" userId="b76c5197-b424-428e-a787-d44a01bbf658" providerId="ADAL" clId="{CFF72AAC-1248-F64C-B090-8BDD8C7CADC1}" dt="2022-04-27T20:38:03.648" v="671" actId="478"/>
+          <ac:picMkLst>
+            <pc:docMk/>
+            <pc:sldMk cId="3564021131" sldId="319"/>
+            <ac:picMk id="5" creationId="{1C77B8A8-71D3-3BBC-EF7A-5C5872F91A1D}"/>
+          </ac:picMkLst>
+        </pc:picChg>
+        <pc:picChg chg="del">
+          <ac:chgData name="Trupesh Patel" userId="b76c5197-b424-428e-a787-d44a01bbf658" providerId="ADAL" clId="{CFF72AAC-1248-F64C-B090-8BDD8C7CADC1}" dt="2022-04-27T20:38:03.648" v="671" actId="478"/>
+          <ac:picMkLst>
+            <pc:docMk/>
+            <pc:sldMk cId="3564021131" sldId="319"/>
+            <ac:picMk id="6" creationId="{9CD9920C-24E7-1A4F-7F28-93CE1BCE31AC}"/>
+          </ac:picMkLst>
+        </pc:picChg>
+        <pc:picChg chg="add mod">
+          <ac:chgData name="Trupesh Patel" userId="b76c5197-b424-428e-a787-d44a01bbf658" providerId="ADAL" clId="{CFF72AAC-1248-F64C-B090-8BDD8C7CADC1}" dt="2022-04-27T20:39:51.109" v="676" actId="1076"/>
+          <ac:picMkLst>
+            <pc:docMk/>
+            <pc:sldMk cId="3564021131" sldId="319"/>
+            <ac:picMk id="9" creationId="{7259821A-2AD9-2990-B73B-54FA4E65D381}"/>
+          </ac:picMkLst>
+        </pc:picChg>
+      </pc:sldChg>
     </pc:docChg>
   </pc:docChgLst>
 </pc:chgInfo>
@@ -1744,6 +1840,238 @@
 </p:notes>
 </file>
 
+<file path=ppt/notesSlides/notesSlide10.xml><?xml version="1.0" encoding="utf-8"?>
+<p:notes xmlns:a="http://schemas.openxmlformats.org/drawingml/2006/main" xmlns:r="http://schemas.openxmlformats.org/officeDocument/2006/relationships" xmlns:p="http://schemas.openxmlformats.org/presentationml/2006/main">
+  <p:cSld>
+    <p:spTree>
+      <p:nvGrpSpPr>
+        <p:cNvPr id="1" name=""/>
+        <p:cNvGrpSpPr/>
+        <p:nvPr/>
+      </p:nvGrpSpPr>
+      <p:grpSpPr>
+        <a:xfrm>
+          <a:off x="0" y="0"/>
+          <a:ext cx="0" cy="0"/>
+          <a:chOff x="0" y="0"/>
+          <a:chExt cx="0" cy="0"/>
+        </a:xfrm>
+      </p:grpSpPr>
+      <p:sp>
+        <p:nvSpPr>
+          <p:cNvPr id="2" name="Slide Image Placeholder 1"/>
+          <p:cNvSpPr>
+            <a:spLocks noGrp="1" noRot="1" noChangeAspect="1"/>
+          </p:cNvSpPr>
+          <p:nvPr>
+            <p:ph type="sldImg"/>
+          </p:nvPr>
+        </p:nvSpPr>
+        <p:spPr/>
+      </p:sp>
+      <p:sp>
+        <p:nvSpPr>
+          <p:cNvPr id="3" name="Notes Placeholder 2"/>
+          <p:cNvSpPr>
+            <a:spLocks noGrp="1"/>
+          </p:cNvSpPr>
+          <p:nvPr>
+            <p:ph type="body" idx="1"/>
+          </p:nvPr>
+        </p:nvSpPr>
+        <p:spPr/>
+        <p:txBody>
+          <a:bodyPr/>
+          <a:lstStyle/>
+          <a:p>
+            <a:r>
+              <a:rPr lang="en-US" dirty="0">
+                <a:cs typeface="Calibri"/>
+              </a:rPr>
+              <a:t>To test the Raspberry Pi, the machine ran an open source implementation of IP-PBX called Asterisk PBX. While Asterisk PBX was running, two phones were registered on the software using Zoiper, a VoIP implementation available on smartphones.</a:t>
+            </a:r>
+          </a:p>
+          <a:p>
+            <a:r>
+              <a:rPr lang="en-US" dirty="0">
+                <a:cs typeface="Calibri"/>
+              </a:rPr>
+              <a:t>There were two primary methods for testing the functionality of the Raspberry Pi running the IP-PBX software.</a:t>
+            </a:r>
+            <a:endParaRPr lang="en-US" dirty="0"/>
+          </a:p>
+          <a:p>
+            <a:pPr lvl="1"/>
+            <a:r>
+              <a:rPr lang="en-US" dirty="0">
+                <a:cs typeface="Calibri"/>
+              </a:rPr>
+              <a:t>Make calls at a variety of locations of different distance from the Raspberry Pi</a:t>
+            </a:r>
+          </a:p>
+          <a:p>
+            <a:pPr lvl="2"/>
+            <a:r>
+              <a:rPr lang="en-US" dirty="0">
+                <a:cs typeface="Calibri"/>
+              </a:rPr>
+              <a:t>In the same room</a:t>
+            </a:r>
+          </a:p>
+          <a:p>
+            <a:pPr lvl="2"/>
+            <a:r>
+              <a:rPr lang="en-US" dirty="0">
+                <a:cs typeface="Calibri"/>
+              </a:rPr>
+              <a:t>On the same floor</a:t>
+            </a:r>
+          </a:p>
+          <a:p>
+            <a:pPr lvl="2"/>
+            <a:r>
+              <a:rPr lang="en-US" dirty="0">
+                <a:cs typeface="Calibri"/>
+              </a:rPr>
+              <a:t>In the same building</a:t>
+            </a:r>
+          </a:p>
+          <a:p>
+            <a:pPr lvl="2"/>
+            <a:r>
+              <a:rPr lang="en-US" dirty="0">
+                <a:cs typeface="Calibri"/>
+              </a:rPr>
+              <a:t>Outside same building</a:t>
+            </a:r>
+          </a:p>
+          <a:p>
+            <a:pPr lvl="2"/>
+            <a:r>
+              <a:rPr lang="en-US" dirty="0">
+                <a:cs typeface="Calibri"/>
+              </a:rPr>
+              <a:t>In a different building</a:t>
+            </a:r>
+          </a:p>
+          <a:p>
+            <a:pPr lvl="1"/>
+            <a:r>
+              <a:rPr lang="en-US" dirty="0">
+                <a:cs typeface="Calibri"/>
+              </a:rPr>
+              <a:t>Make calls while the Raspberry Pi is emulating stressful network conditions using the </a:t>
+            </a:r>
+            <a:r>
+              <a:rPr lang="en-US" dirty="0" err="1">
+                <a:latin typeface="Linux"/>
+                <a:cs typeface="Calibri"/>
+              </a:rPr>
+              <a:t>tc</a:t>
+            </a:r>
+            <a:r>
+              <a:rPr lang="en-US" dirty="0">
+                <a:latin typeface="Linux"/>
+                <a:cs typeface="Calibri"/>
+              </a:rPr>
+              <a:t> […] </a:t>
+            </a:r>
+            <a:r>
+              <a:rPr lang="en-US" dirty="0" err="1">
+                <a:latin typeface="Linux"/>
+                <a:cs typeface="Calibri"/>
+              </a:rPr>
+              <a:t>netem</a:t>
+            </a:r>
+            <a:r>
+              <a:rPr lang="en-US" dirty="0">
+                <a:latin typeface="Linux"/>
+                <a:cs typeface="Calibri"/>
+              </a:rPr>
+              <a:t> set of commands.</a:t>
+            </a:r>
+          </a:p>
+          <a:p>
+            <a:pPr lvl="2"/>
+            <a:r>
+              <a:rPr lang="en-US" dirty="0">
+                <a:latin typeface="Linux"/>
+                <a:cs typeface="Calibri"/>
+              </a:rPr>
+              <a:t>Add a delay to outgoing packets.</a:t>
+            </a:r>
+          </a:p>
+          <a:p>
+            <a:pPr lvl="2"/>
+            <a:r>
+              <a:rPr lang="en-US" dirty="0">
+                <a:latin typeface="Linux"/>
+                <a:cs typeface="Calibri"/>
+              </a:rPr>
+              <a:t>Add jitter to outgoing packets.</a:t>
+            </a:r>
+          </a:p>
+          <a:p>
+            <a:pPr lvl="2"/>
+            <a:r>
+              <a:rPr lang="en-US" dirty="0">
+                <a:latin typeface="Linux"/>
+                <a:cs typeface="Calibri"/>
+              </a:rPr>
+              <a:t>Add corruption to outgoing packets.</a:t>
+            </a:r>
+          </a:p>
+          <a:p>
+            <a:pPr lvl="2"/>
+            <a:r>
+              <a:rPr lang="en-US" dirty="0">
+                <a:latin typeface="Linux"/>
+                <a:cs typeface="Calibri"/>
+              </a:rPr>
+              <a:t>Add chance of loss to outgoing packets.</a:t>
+            </a:r>
+          </a:p>
+          <a:p>
+            <a:endParaRPr lang="en-US" dirty="0"/>
+          </a:p>
+        </p:txBody>
+      </p:sp>
+      <p:sp>
+        <p:nvSpPr>
+          <p:cNvPr id="4" name="Slide Number Placeholder 3"/>
+          <p:cNvSpPr>
+            <a:spLocks noGrp="1"/>
+          </p:cNvSpPr>
+          <p:nvPr>
+            <p:ph type="sldNum" sz="quarter" idx="5"/>
+          </p:nvPr>
+        </p:nvSpPr>
+        <p:spPr/>
+        <p:txBody>
+          <a:bodyPr/>
+          <a:lstStyle/>
+          <a:p>
+            <a:fld id="{3AD81792-D2DB-45FA-A2B8-332099C9B951}" type="slidenum">
+              <a:rPr lang="en-US" smtClean="0"/>
+              <a:t>20</a:t>
+            </a:fld>
+            <a:endParaRPr lang="en-US"/>
+          </a:p>
+        </p:txBody>
+      </p:sp>
+    </p:spTree>
+    <p:extLst>
+      <p:ext uri="{BB962C8B-B14F-4D97-AF65-F5344CB8AC3E}">
+        <p14:creationId xmlns:p14="http://schemas.microsoft.com/office/powerpoint/2010/main" val="84531856"/>
+      </p:ext>
+    </p:extLst>
+  </p:cSld>
+  <p:clrMapOvr>
+    <a:masterClrMapping/>
+  </p:clrMapOvr>
+</p:notes>
+</file>
+
 <file path=ppt/notesSlides/notesSlide2.xml><?xml version="1.0" encoding="utf-8"?>
 <p:notes xmlns:a="http://schemas.openxmlformats.org/drawingml/2006/main" xmlns:r="http://schemas.openxmlformats.org/officeDocument/2006/relationships" xmlns:p="http://schemas.openxmlformats.org/presentationml/2006/main">
   <p:cSld>
@@ -1919,154 +2247,6 @@
           <a:bodyPr/>
           <a:lstStyle/>
           <a:p>
-            <a:r>
-              <a:rPr lang="en-US" dirty="0">
-                <a:cs typeface="Calibri"/>
-              </a:rPr>
-              <a:t>To test the Raspberry Pi, the machine ran an open source implementation of IP-PBX called Asterisk PBX. While Asterisk PBX was running, two phones were registered on the software using Zoiper, a VoIP implementation available on smartphones.</a:t>
-            </a:r>
-          </a:p>
-          <a:p>
-            <a:r>
-              <a:rPr lang="en-US" dirty="0">
-                <a:cs typeface="Calibri"/>
-              </a:rPr>
-              <a:t>There were two primary methods for testing the functionality of the Raspberry Pi running the IP-PBX software.</a:t>
-            </a:r>
-            <a:endParaRPr lang="en-US" dirty="0"/>
-          </a:p>
-          <a:p>
-            <a:pPr lvl="1"/>
-            <a:r>
-              <a:rPr lang="en-US" dirty="0">
-                <a:cs typeface="Calibri"/>
-              </a:rPr>
-              <a:t>Make calls at a variety of locations of different distance from the Raspberry Pi</a:t>
-            </a:r>
-          </a:p>
-          <a:p>
-            <a:pPr lvl="2"/>
-            <a:r>
-              <a:rPr lang="en-US" dirty="0">
-                <a:cs typeface="Calibri"/>
-              </a:rPr>
-              <a:t>In the same room</a:t>
-            </a:r>
-          </a:p>
-          <a:p>
-            <a:pPr lvl="2"/>
-            <a:r>
-              <a:rPr lang="en-US" dirty="0">
-                <a:cs typeface="Calibri"/>
-              </a:rPr>
-              <a:t>On the same floor</a:t>
-            </a:r>
-          </a:p>
-          <a:p>
-            <a:pPr lvl="2"/>
-            <a:r>
-              <a:rPr lang="en-US" dirty="0">
-                <a:cs typeface="Calibri"/>
-              </a:rPr>
-              <a:t>In the same building</a:t>
-            </a:r>
-          </a:p>
-          <a:p>
-            <a:pPr lvl="2"/>
-            <a:r>
-              <a:rPr lang="en-US" dirty="0">
-                <a:cs typeface="Calibri"/>
-              </a:rPr>
-              <a:t>Outside same building</a:t>
-            </a:r>
-          </a:p>
-          <a:p>
-            <a:pPr lvl="2"/>
-            <a:r>
-              <a:rPr lang="en-US" dirty="0">
-                <a:cs typeface="Calibri"/>
-              </a:rPr>
-              <a:t>In a different building</a:t>
-            </a:r>
-          </a:p>
-          <a:p>
-            <a:pPr lvl="1"/>
-            <a:r>
-              <a:rPr lang="en-US" dirty="0">
-                <a:cs typeface="Calibri"/>
-              </a:rPr>
-              <a:t>Make calls while the Raspberry Pi is emulating stressful network conditions using the </a:t>
-            </a:r>
-            <a:r>
-              <a:rPr lang="en-US" dirty="0" err="1">
-                <a:latin typeface="Linux"/>
-                <a:cs typeface="Calibri"/>
-              </a:rPr>
-              <a:t>tc</a:t>
-            </a:r>
-            <a:r>
-              <a:rPr lang="en-US" dirty="0">
-                <a:latin typeface="Linux"/>
-                <a:cs typeface="Calibri"/>
-              </a:rPr>
-              <a:t> […] </a:t>
-            </a:r>
-            <a:r>
-              <a:rPr lang="en-US" dirty="0" err="1">
-                <a:latin typeface="Linux"/>
-                <a:cs typeface="Calibri"/>
-              </a:rPr>
-              <a:t>netem</a:t>
-            </a:r>
-            <a:r>
-              <a:rPr lang="en-US" dirty="0">
-                <a:latin typeface="Linux"/>
-                <a:cs typeface="Calibri"/>
-              </a:rPr>
-              <a:t> set of commands.</a:t>
-            </a:r>
-          </a:p>
-          <a:p>
-            <a:pPr lvl="2"/>
-            <a:r>
-              <a:rPr lang="en-US" dirty="0">
-                <a:latin typeface="Linux"/>
-                <a:cs typeface="Calibri"/>
-              </a:rPr>
-              <a:t>Add a delay to outgoing packets.</a:t>
-            </a:r>
-          </a:p>
-          <a:p>
-            <a:pPr lvl="2"/>
-            <a:r>
-              <a:rPr lang="en-US" dirty="0">
-                <a:latin typeface="Linux"/>
-                <a:cs typeface="Calibri"/>
-              </a:rPr>
-              <a:t>Add jitter to outgoing packets.</a:t>
-            </a:r>
-          </a:p>
-          <a:p>
-            <a:pPr lvl="2"/>
-            <a:r>
-              <a:rPr lang="en-US" dirty="0">
-                <a:latin typeface="Linux"/>
-                <a:cs typeface="Calibri"/>
-              </a:rPr>
-              <a:t>Add corruption to outgoing packets.</a:t>
-            </a:r>
-          </a:p>
-          <a:p>
-            <a:pPr lvl="2"/>
-            <a:r>
-              <a:rPr lang="en-US" dirty="0">
-                <a:latin typeface="Linux"/>
-                <a:cs typeface="Calibri"/>
-              </a:rPr>
-              <a:t>Add chance of loss to outgoing packets.</a:t>
-            </a:r>
-          </a:p>
-          <a:p>
             <a:endParaRPr lang="en-US" dirty="0"/>
           </a:p>
         </p:txBody>
@@ -2088,7 +2268,7 @@
           <a:p>
             <a:fld id="{3AD81792-D2DB-45FA-A2B8-332099C9B951}" type="slidenum">
               <a:rPr lang="en-US" smtClean="0"/>
-              <a:t>15</a:t>
+              <a:t>11</a:t>
             </a:fld>
             <a:endParaRPr lang="en-US"/>
           </a:p>
@@ -2097,7 +2277,7 @@
     </p:spTree>
     <p:extLst>
       <p:ext uri="{BB962C8B-B14F-4D97-AF65-F5344CB8AC3E}">
-        <p14:creationId xmlns:p14="http://schemas.microsoft.com/office/powerpoint/2010/main" val="951337474"/>
+        <p14:creationId xmlns:p14="http://schemas.microsoft.com/office/powerpoint/2010/main" val="3794870990"/>
       </p:ext>
     </p:extLst>
   </p:cSld>
@@ -2151,154 +2331,6 @@
           <a:bodyPr/>
           <a:lstStyle/>
           <a:p>
-            <a:r>
-              <a:rPr lang="en-US" dirty="0">
-                <a:cs typeface="Calibri"/>
-              </a:rPr>
-              <a:t>To test the Raspberry Pi, the machine ran an open source implementation of IP-PBX called Asterisk PBX. While Asterisk PBX was running, two phones were registered on the software using Zoiper, a VoIP implementation available on smartphones.</a:t>
-            </a:r>
-          </a:p>
-          <a:p>
-            <a:r>
-              <a:rPr lang="en-US" dirty="0">
-                <a:cs typeface="Calibri"/>
-              </a:rPr>
-              <a:t>There were two primary methods for testing the functionality of the Raspberry Pi running the IP-PBX software.</a:t>
-            </a:r>
-            <a:endParaRPr lang="en-US" dirty="0"/>
-          </a:p>
-          <a:p>
-            <a:pPr lvl="1"/>
-            <a:r>
-              <a:rPr lang="en-US" dirty="0">
-                <a:cs typeface="Calibri"/>
-              </a:rPr>
-              <a:t>Make calls at a variety of locations of different distance from the Raspberry Pi</a:t>
-            </a:r>
-          </a:p>
-          <a:p>
-            <a:pPr lvl="2"/>
-            <a:r>
-              <a:rPr lang="en-US" dirty="0">
-                <a:cs typeface="Calibri"/>
-              </a:rPr>
-              <a:t>In the same room</a:t>
-            </a:r>
-          </a:p>
-          <a:p>
-            <a:pPr lvl="2"/>
-            <a:r>
-              <a:rPr lang="en-US" dirty="0">
-                <a:cs typeface="Calibri"/>
-              </a:rPr>
-              <a:t>On the same floor</a:t>
-            </a:r>
-          </a:p>
-          <a:p>
-            <a:pPr lvl="2"/>
-            <a:r>
-              <a:rPr lang="en-US" dirty="0">
-                <a:cs typeface="Calibri"/>
-              </a:rPr>
-              <a:t>In the same building</a:t>
-            </a:r>
-          </a:p>
-          <a:p>
-            <a:pPr lvl="2"/>
-            <a:r>
-              <a:rPr lang="en-US" dirty="0">
-                <a:cs typeface="Calibri"/>
-              </a:rPr>
-              <a:t>Outside same building</a:t>
-            </a:r>
-          </a:p>
-          <a:p>
-            <a:pPr lvl="2"/>
-            <a:r>
-              <a:rPr lang="en-US" dirty="0">
-                <a:cs typeface="Calibri"/>
-              </a:rPr>
-              <a:t>In a different building</a:t>
-            </a:r>
-          </a:p>
-          <a:p>
-            <a:pPr lvl="1"/>
-            <a:r>
-              <a:rPr lang="en-US" dirty="0">
-                <a:cs typeface="Calibri"/>
-              </a:rPr>
-              <a:t>Make calls while the Raspberry Pi is emulating stressful network conditions using the </a:t>
-            </a:r>
-            <a:r>
-              <a:rPr lang="en-US" dirty="0" err="1">
-                <a:latin typeface="Linux"/>
-                <a:cs typeface="Calibri"/>
-              </a:rPr>
-              <a:t>tc</a:t>
-            </a:r>
-            <a:r>
-              <a:rPr lang="en-US" dirty="0">
-                <a:latin typeface="Linux"/>
-                <a:cs typeface="Calibri"/>
-              </a:rPr>
-              <a:t> […] </a:t>
-            </a:r>
-            <a:r>
-              <a:rPr lang="en-US" dirty="0" err="1">
-                <a:latin typeface="Linux"/>
-                <a:cs typeface="Calibri"/>
-              </a:rPr>
-              <a:t>netem</a:t>
-            </a:r>
-            <a:r>
-              <a:rPr lang="en-US" dirty="0">
-                <a:latin typeface="Linux"/>
-                <a:cs typeface="Calibri"/>
-              </a:rPr>
-              <a:t> set of commands.</a:t>
-            </a:r>
-          </a:p>
-          <a:p>
-            <a:pPr lvl="2"/>
-            <a:r>
-              <a:rPr lang="en-US" dirty="0">
-                <a:latin typeface="Linux"/>
-                <a:cs typeface="Calibri"/>
-              </a:rPr>
-              <a:t>Add a delay to outgoing packets.</a:t>
-            </a:r>
-          </a:p>
-          <a:p>
-            <a:pPr lvl="2"/>
-            <a:r>
-              <a:rPr lang="en-US" dirty="0">
-                <a:latin typeface="Linux"/>
-                <a:cs typeface="Calibri"/>
-              </a:rPr>
-              <a:t>Add jitter to outgoing packets.</a:t>
-            </a:r>
-          </a:p>
-          <a:p>
-            <a:pPr lvl="2"/>
-            <a:r>
-              <a:rPr lang="en-US" dirty="0">
-                <a:latin typeface="Linux"/>
-                <a:cs typeface="Calibri"/>
-              </a:rPr>
-              <a:t>Add corruption to outgoing packets.</a:t>
-            </a:r>
-          </a:p>
-          <a:p>
-            <a:pPr lvl="2"/>
-            <a:r>
-              <a:rPr lang="en-US" dirty="0">
-                <a:latin typeface="Linux"/>
-                <a:cs typeface="Calibri"/>
-              </a:rPr>
-              <a:t>Add chance of loss to outgoing packets.</a:t>
-            </a:r>
-          </a:p>
-          <a:p>
             <a:endParaRPr lang="en-US" dirty="0"/>
           </a:p>
         </p:txBody>
@@ -2320,7 +2352,7 @@
           <a:p>
             <a:fld id="{3AD81792-D2DB-45FA-A2B8-332099C9B951}" type="slidenum">
               <a:rPr lang="en-US" smtClean="0"/>
-              <a:t>16</a:t>
+              <a:t>12</a:t>
             </a:fld>
             <a:endParaRPr lang="en-US"/>
           </a:p>
@@ -2329,7 +2361,7 @@
     </p:spTree>
     <p:extLst>
       <p:ext uri="{BB962C8B-B14F-4D97-AF65-F5344CB8AC3E}">
-        <p14:creationId xmlns:p14="http://schemas.microsoft.com/office/powerpoint/2010/main" val="3689864067"/>
+        <p14:creationId xmlns:p14="http://schemas.microsoft.com/office/powerpoint/2010/main" val="1108824322"/>
       </p:ext>
     </p:extLst>
   </p:cSld>
@@ -2387,17 +2419,41 @@
               <a:rPr lang="en-US" dirty="0">
                 <a:cs typeface="Calibri"/>
               </a:rPr>
-              <a:t>To test the Raspberry Pi, the machine ran an open source implementation of IP-PBX called Asterisk PBX. While Asterisk PBX was running, two phones were registered on the software using Zoiper, a VoIP implementation available on smartphones.</a:t>
-            </a:r>
-          </a:p>
-          <a:p>
+              <a:t>Primary metrics to be analyzed are loss and jitter.</a:t>
+            </a:r>
+          </a:p>
+          <a:p>
+            <a:pPr lvl="1"/>
             <a:r>
               <a:rPr lang="en-US" dirty="0">
                 <a:cs typeface="Calibri"/>
               </a:rPr>
-              <a:t>There were two primary methods for testing the functionality of the Raspberry Pi running the IP-PBX software.</a:t>
-            </a:r>
-            <a:endParaRPr lang="en-US" dirty="0"/>
+              <a:t>The implementation of IP-PBX used, Asterisk PBX, provides a command to view </a:t>
+            </a:r>
+            <a:r>
+              <a:rPr lang="en-US" b="1" dirty="0">
+                <a:cs typeface="Calibri"/>
+              </a:rPr>
+              <a:t>jitter</a:t>
+            </a:r>
+            <a:r>
+              <a:rPr lang="en-US" dirty="0">
+                <a:cs typeface="Calibri"/>
+              </a:rPr>
+              <a:t> and </a:t>
+            </a:r>
+            <a:r>
+              <a:rPr lang="en-US" b="1" dirty="0">
+                <a:cs typeface="Calibri"/>
+              </a:rPr>
+              <a:t>loss</a:t>
+            </a:r>
+            <a:r>
+              <a:rPr lang="en-US" dirty="0">
+                <a:cs typeface="Calibri"/>
+              </a:rPr>
+              <a:t> for packets involved in telephony.</a:t>
+            </a:r>
           </a:p>
           <a:p>
             <a:pPr lvl="1"/>
@@ -2405,129 +2461,15 @@
               <a:rPr lang="en-US" dirty="0">
                 <a:cs typeface="Calibri"/>
               </a:rPr>
-              <a:t>Make calls at a variety of locations of different distance from the Raspberry Pi</a:t>
-            </a:r>
-          </a:p>
-          <a:p>
-            <a:pPr lvl="2"/>
+              <a:t>Wireshark was also used to capture SIP and RTP/RTCP packets involved in telephony.</a:t>
+            </a:r>
+          </a:p>
+          <a:p>
             <a:r>
               <a:rPr lang="en-US" dirty="0">
                 <a:cs typeface="Calibri"/>
               </a:rPr>
-              <a:t>In the same room</a:t>
-            </a:r>
-          </a:p>
-          <a:p>
-            <a:pPr lvl="2"/>
-            <a:r>
-              <a:rPr lang="en-US" dirty="0">
-                <a:cs typeface="Calibri"/>
-              </a:rPr>
-              <a:t>On the same floor</a:t>
-            </a:r>
-          </a:p>
-          <a:p>
-            <a:pPr lvl="2"/>
-            <a:r>
-              <a:rPr lang="en-US" dirty="0">
-                <a:cs typeface="Calibri"/>
-              </a:rPr>
-              <a:t>In the same building</a:t>
-            </a:r>
-          </a:p>
-          <a:p>
-            <a:pPr lvl="2"/>
-            <a:r>
-              <a:rPr lang="en-US" dirty="0">
-                <a:cs typeface="Calibri"/>
-              </a:rPr>
-              <a:t>Outside same building</a:t>
-            </a:r>
-          </a:p>
-          <a:p>
-            <a:pPr lvl="2"/>
-            <a:r>
-              <a:rPr lang="en-US" dirty="0">
-                <a:cs typeface="Calibri"/>
-              </a:rPr>
-              <a:t>In a different building</a:t>
-            </a:r>
-          </a:p>
-          <a:p>
-            <a:pPr lvl="1"/>
-            <a:r>
-              <a:rPr lang="en-US" dirty="0">
-                <a:cs typeface="Calibri"/>
-              </a:rPr>
-              <a:t>Make calls while the Raspberry Pi is emulating stressful network conditions using the </a:t>
-            </a:r>
-            <a:r>
-              <a:rPr lang="en-US" dirty="0" err="1">
-                <a:latin typeface="Linux"/>
-                <a:cs typeface="Calibri"/>
-              </a:rPr>
-              <a:t>tc</a:t>
-            </a:r>
-            <a:r>
-              <a:rPr lang="en-US" dirty="0">
-                <a:latin typeface="Linux"/>
-                <a:cs typeface="Calibri"/>
-              </a:rPr>
-              <a:t> […] </a:t>
-            </a:r>
-            <a:r>
-              <a:rPr lang="en-US" dirty="0" err="1">
-                <a:latin typeface="Linux"/>
-                <a:cs typeface="Calibri"/>
-              </a:rPr>
-              <a:t>netem</a:t>
-            </a:r>
-            <a:r>
-              <a:rPr lang="en-US" dirty="0">
-                <a:latin typeface="Linux"/>
-                <a:cs typeface="Calibri"/>
-              </a:rPr>
-              <a:t> set of commands.</a:t>
-            </a:r>
-          </a:p>
-          <a:p>
-            <a:pPr lvl="2"/>
-            <a:r>
-              <a:rPr lang="en-US" dirty="0">
-                <a:latin typeface="Linux"/>
-                <a:cs typeface="Calibri"/>
-              </a:rPr>
-              <a:t>Add a delay to outgoing packets.</a:t>
-            </a:r>
-          </a:p>
-          <a:p>
-            <a:pPr lvl="2"/>
-            <a:r>
-              <a:rPr lang="en-US" dirty="0">
-                <a:latin typeface="Linux"/>
-                <a:cs typeface="Calibri"/>
-              </a:rPr>
-              <a:t>Add jitter to outgoing packets.</a:t>
-            </a:r>
-          </a:p>
-          <a:p>
-            <a:pPr lvl="2"/>
-            <a:r>
-              <a:rPr lang="en-US" dirty="0">
-                <a:latin typeface="Linux"/>
-                <a:cs typeface="Calibri"/>
-              </a:rPr>
-              <a:t>Add corruption to outgoing packets.</a:t>
-            </a:r>
-          </a:p>
-          <a:p>
-            <a:pPr lvl="2"/>
-            <a:r>
-              <a:rPr lang="en-US" dirty="0">
-                <a:latin typeface="Linux"/>
-                <a:cs typeface="Calibri"/>
-              </a:rPr>
-              <a:t>Add chance of loss to outgoing packets.</a:t>
+              <a:t>Jitter and loss will be plotted in line graphs, examining the percentage jitter or loss over time. This will be used to visualize trends of the data when VoIP calls are made under different conditions.</a:t>
             </a:r>
           </a:p>
           <a:p>
@@ -2552,7 +2494,7 @@
           <a:p>
             <a:fld id="{3AD81792-D2DB-45FA-A2B8-332099C9B951}" type="slidenum">
               <a:rPr lang="en-US" smtClean="0"/>
-              <a:t>17</a:t>
+              <a:t>14</a:t>
             </a:fld>
             <a:endParaRPr lang="en-US"/>
           </a:p>
@@ -2561,7 +2503,7 @@
     </p:spTree>
     <p:extLst>
       <p:ext uri="{BB962C8B-B14F-4D97-AF65-F5344CB8AC3E}">
-        <p14:creationId xmlns:p14="http://schemas.microsoft.com/office/powerpoint/2010/main" val="2671221801"/>
+        <p14:creationId xmlns:p14="http://schemas.microsoft.com/office/powerpoint/2010/main" val="4221498852"/>
       </p:ext>
     </p:extLst>
   </p:cSld>
@@ -2784,7 +2726,7 @@
           <a:p>
             <a:fld id="{3AD81792-D2DB-45FA-A2B8-332099C9B951}" type="slidenum">
               <a:rPr lang="en-US" smtClean="0"/>
-              <a:t>18</a:t>
+              <a:t>16</a:t>
             </a:fld>
             <a:endParaRPr lang="en-US"/>
           </a:p>
@@ -2793,7 +2735,7 @@
     </p:spTree>
     <p:extLst>
       <p:ext uri="{BB962C8B-B14F-4D97-AF65-F5344CB8AC3E}">
-        <p14:creationId xmlns:p14="http://schemas.microsoft.com/office/powerpoint/2010/main" val="3321108142"/>
+        <p14:creationId xmlns:p14="http://schemas.microsoft.com/office/powerpoint/2010/main" val="951337474"/>
       </p:ext>
     </p:extLst>
   </p:cSld>
@@ -3016,7 +2958,7 @@
           <a:p>
             <a:fld id="{3AD81792-D2DB-45FA-A2B8-332099C9B951}" type="slidenum">
               <a:rPr lang="en-US" smtClean="0"/>
-              <a:t>19</a:t>
+              <a:t>17</a:t>
             </a:fld>
             <a:endParaRPr lang="en-US"/>
           </a:p>
@@ -3025,7 +2967,471 @@
     </p:spTree>
     <p:extLst>
       <p:ext uri="{BB962C8B-B14F-4D97-AF65-F5344CB8AC3E}">
-        <p14:creationId xmlns:p14="http://schemas.microsoft.com/office/powerpoint/2010/main" val="84531856"/>
+        <p14:creationId xmlns:p14="http://schemas.microsoft.com/office/powerpoint/2010/main" val="3689864067"/>
+      </p:ext>
+    </p:extLst>
+  </p:cSld>
+  <p:clrMapOvr>
+    <a:masterClrMapping/>
+  </p:clrMapOvr>
+</p:notes>
+</file>
+
+<file path=ppt/notesSlides/notesSlide8.xml><?xml version="1.0" encoding="utf-8"?>
+<p:notes xmlns:a="http://schemas.openxmlformats.org/drawingml/2006/main" xmlns:r="http://schemas.openxmlformats.org/officeDocument/2006/relationships" xmlns:p="http://schemas.openxmlformats.org/presentationml/2006/main">
+  <p:cSld>
+    <p:spTree>
+      <p:nvGrpSpPr>
+        <p:cNvPr id="1" name=""/>
+        <p:cNvGrpSpPr/>
+        <p:nvPr/>
+      </p:nvGrpSpPr>
+      <p:grpSpPr>
+        <a:xfrm>
+          <a:off x="0" y="0"/>
+          <a:ext cx="0" cy="0"/>
+          <a:chOff x="0" y="0"/>
+          <a:chExt cx="0" cy="0"/>
+        </a:xfrm>
+      </p:grpSpPr>
+      <p:sp>
+        <p:nvSpPr>
+          <p:cNvPr id="2" name="Slide Image Placeholder 1"/>
+          <p:cNvSpPr>
+            <a:spLocks noGrp="1" noRot="1" noChangeAspect="1"/>
+          </p:cNvSpPr>
+          <p:nvPr>
+            <p:ph type="sldImg"/>
+          </p:nvPr>
+        </p:nvSpPr>
+        <p:spPr/>
+      </p:sp>
+      <p:sp>
+        <p:nvSpPr>
+          <p:cNvPr id="3" name="Notes Placeholder 2"/>
+          <p:cNvSpPr>
+            <a:spLocks noGrp="1"/>
+          </p:cNvSpPr>
+          <p:nvPr>
+            <p:ph type="body" idx="1"/>
+          </p:nvPr>
+        </p:nvSpPr>
+        <p:spPr/>
+        <p:txBody>
+          <a:bodyPr/>
+          <a:lstStyle/>
+          <a:p>
+            <a:r>
+              <a:rPr lang="en-US" dirty="0">
+                <a:cs typeface="Calibri"/>
+              </a:rPr>
+              <a:t>To test the Raspberry Pi, the machine ran an open source implementation of IP-PBX called Asterisk PBX. While Asterisk PBX was running, two phones were registered on the software using Zoiper, a VoIP implementation available on smartphones.</a:t>
+            </a:r>
+          </a:p>
+          <a:p>
+            <a:r>
+              <a:rPr lang="en-US" dirty="0">
+                <a:cs typeface="Calibri"/>
+              </a:rPr>
+              <a:t>There were two primary methods for testing the functionality of the Raspberry Pi running the IP-PBX software.</a:t>
+            </a:r>
+            <a:endParaRPr lang="en-US" dirty="0"/>
+          </a:p>
+          <a:p>
+            <a:pPr lvl="1"/>
+            <a:r>
+              <a:rPr lang="en-US" dirty="0">
+                <a:cs typeface="Calibri"/>
+              </a:rPr>
+              <a:t>Make calls at a variety of locations of different distance from the Raspberry Pi</a:t>
+            </a:r>
+          </a:p>
+          <a:p>
+            <a:pPr lvl="2"/>
+            <a:r>
+              <a:rPr lang="en-US" dirty="0">
+                <a:cs typeface="Calibri"/>
+              </a:rPr>
+              <a:t>In the same room</a:t>
+            </a:r>
+          </a:p>
+          <a:p>
+            <a:pPr lvl="2"/>
+            <a:r>
+              <a:rPr lang="en-US" dirty="0">
+                <a:cs typeface="Calibri"/>
+              </a:rPr>
+              <a:t>On the same floor</a:t>
+            </a:r>
+          </a:p>
+          <a:p>
+            <a:pPr lvl="2"/>
+            <a:r>
+              <a:rPr lang="en-US" dirty="0">
+                <a:cs typeface="Calibri"/>
+              </a:rPr>
+              <a:t>In the same building</a:t>
+            </a:r>
+          </a:p>
+          <a:p>
+            <a:pPr lvl="2"/>
+            <a:r>
+              <a:rPr lang="en-US" dirty="0">
+                <a:cs typeface="Calibri"/>
+              </a:rPr>
+              <a:t>Outside same building</a:t>
+            </a:r>
+          </a:p>
+          <a:p>
+            <a:pPr lvl="2"/>
+            <a:r>
+              <a:rPr lang="en-US" dirty="0">
+                <a:cs typeface="Calibri"/>
+              </a:rPr>
+              <a:t>In a different building</a:t>
+            </a:r>
+          </a:p>
+          <a:p>
+            <a:pPr lvl="1"/>
+            <a:r>
+              <a:rPr lang="en-US" dirty="0">
+                <a:cs typeface="Calibri"/>
+              </a:rPr>
+              <a:t>Make calls while the Raspberry Pi is emulating stressful network conditions using the </a:t>
+            </a:r>
+            <a:r>
+              <a:rPr lang="en-US" dirty="0" err="1">
+                <a:latin typeface="Linux"/>
+                <a:cs typeface="Calibri"/>
+              </a:rPr>
+              <a:t>tc</a:t>
+            </a:r>
+            <a:r>
+              <a:rPr lang="en-US" dirty="0">
+                <a:latin typeface="Linux"/>
+                <a:cs typeface="Calibri"/>
+              </a:rPr>
+              <a:t> […] </a:t>
+            </a:r>
+            <a:r>
+              <a:rPr lang="en-US" dirty="0" err="1">
+                <a:latin typeface="Linux"/>
+                <a:cs typeface="Calibri"/>
+              </a:rPr>
+              <a:t>netem</a:t>
+            </a:r>
+            <a:r>
+              <a:rPr lang="en-US" dirty="0">
+                <a:latin typeface="Linux"/>
+                <a:cs typeface="Calibri"/>
+              </a:rPr>
+              <a:t> set of commands.</a:t>
+            </a:r>
+          </a:p>
+          <a:p>
+            <a:pPr lvl="2"/>
+            <a:r>
+              <a:rPr lang="en-US" dirty="0">
+                <a:latin typeface="Linux"/>
+                <a:cs typeface="Calibri"/>
+              </a:rPr>
+              <a:t>Add a delay to outgoing packets.</a:t>
+            </a:r>
+          </a:p>
+          <a:p>
+            <a:pPr lvl="2"/>
+            <a:r>
+              <a:rPr lang="en-US" dirty="0">
+                <a:latin typeface="Linux"/>
+                <a:cs typeface="Calibri"/>
+              </a:rPr>
+              <a:t>Add jitter to outgoing packets.</a:t>
+            </a:r>
+          </a:p>
+          <a:p>
+            <a:pPr lvl="2"/>
+            <a:r>
+              <a:rPr lang="en-US" dirty="0">
+                <a:latin typeface="Linux"/>
+                <a:cs typeface="Calibri"/>
+              </a:rPr>
+              <a:t>Add corruption to outgoing packets.</a:t>
+            </a:r>
+          </a:p>
+          <a:p>
+            <a:pPr lvl="2"/>
+            <a:r>
+              <a:rPr lang="en-US" dirty="0">
+                <a:latin typeface="Linux"/>
+                <a:cs typeface="Calibri"/>
+              </a:rPr>
+              <a:t>Add chance of loss to outgoing packets.</a:t>
+            </a:r>
+          </a:p>
+          <a:p>
+            <a:endParaRPr lang="en-US" dirty="0"/>
+          </a:p>
+        </p:txBody>
+      </p:sp>
+      <p:sp>
+        <p:nvSpPr>
+          <p:cNvPr id="4" name="Slide Number Placeholder 3"/>
+          <p:cNvSpPr>
+            <a:spLocks noGrp="1"/>
+          </p:cNvSpPr>
+          <p:nvPr>
+            <p:ph type="sldNum" sz="quarter" idx="5"/>
+          </p:nvPr>
+        </p:nvSpPr>
+        <p:spPr/>
+        <p:txBody>
+          <a:bodyPr/>
+          <a:lstStyle/>
+          <a:p>
+            <a:fld id="{3AD81792-D2DB-45FA-A2B8-332099C9B951}" type="slidenum">
+              <a:rPr lang="en-US" smtClean="0"/>
+              <a:t>18</a:t>
+            </a:fld>
+            <a:endParaRPr lang="en-US"/>
+          </a:p>
+        </p:txBody>
+      </p:sp>
+    </p:spTree>
+    <p:extLst>
+      <p:ext uri="{BB962C8B-B14F-4D97-AF65-F5344CB8AC3E}">
+        <p14:creationId xmlns:p14="http://schemas.microsoft.com/office/powerpoint/2010/main" val="2671221801"/>
+      </p:ext>
+    </p:extLst>
+  </p:cSld>
+  <p:clrMapOvr>
+    <a:masterClrMapping/>
+  </p:clrMapOvr>
+</p:notes>
+</file>
+
+<file path=ppt/notesSlides/notesSlide9.xml><?xml version="1.0" encoding="utf-8"?>
+<p:notes xmlns:a="http://schemas.openxmlformats.org/drawingml/2006/main" xmlns:r="http://schemas.openxmlformats.org/officeDocument/2006/relationships" xmlns:p="http://schemas.openxmlformats.org/presentationml/2006/main">
+  <p:cSld>
+    <p:spTree>
+      <p:nvGrpSpPr>
+        <p:cNvPr id="1" name=""/>
+        <p:cNvGrpSpPr/>
+        <p:nvPr/>
+      </p:nvGrpSpPr>
+      <p:grpSpPr>
+        <a:xfrm>
+          <a:off x="0" y="0"/>
+          <a:ext cx="0" cy="0"/>
+          <a:chOff x="0" y="0"/>
+          <a:chExt cx="0" cy="0"/>
+        </a:xfrm>
+      </p:grpSpPr>
+      <p:sp>
+        <p:nvSpPr>
+          <p:cNvPr id="2" name="Slide Image Placeholder 1"/>
+          <p:cNvSpPr>
+            <a:spLocks noGrp="1" noRot="1" noChangeAspect="1"/>
+          </p:cNvSpPr>
+          <p:nvPr>
+            <p:ph type="sldImg"/>
+          </p:nvPr>
+        </p:nvSpPr>
+        <p:spPr/>
+      </p:sp>
+      <p:sp>
+        <p:nvSpPr>
+          <p:cNvPr id="3" name="Notes Placeholder 2"/>
+          <p:cNvSpPr>
+            <a:spLocks noGrp="1"/>
+          </p:cNvSpPr>
+          <p:nvPr>
+            <p:ph type="body" idx="1"/>
+          </p:nvPr>
+        </p:nvSpPr>
+        <p:spPr/>
+        <p:txBody>
+          <a:bodyPr/>
+          <a:lstStyle/>
+          <a:p>
+            <a:r>
+              <a:rPr lang="en-US" dirty="0">
+                <a:cs typeface="Calibri"/>
+              </a:rPr>
+              <a:t>To test the Raspberry Pi, the machine ran an open source implementation of IP-PBX called Asterisk PBX. While Asterisk PBX was running, two phones were registered on the software using Zoiper, a VoIP implementation available on smartphones.</a:t>
+            </a:r>
+          </a:p>
+          <a:p>
+            <a:r>
+              <a:rPr lang="en-US" dirty="0">
+                <a:cs typeface="Calibri"/>
+              </a:rPr>
+              <a:t>There were two primary methods for testing the functionality of the Raspberry Pi running the IP-PBX software.</a:t>
+            </a:r>
+            <a:endParaRPr lang="en-US" dirty="0"/>
+          </a:p>
+          <a:p>
+            <a:pPr lvl="1"/>
+            <a:r>
+              <a:rPr lang="en-US" dirty="0">
+                <a:cs typeface="Calibri"/>
+              </a:rPr>
+              <a:t>Make calls at a variety of locations of different distance from the Raspberry Pi</a:t>
+            </a:r>
+          </a:p>
+          <a:p>
+            <a:pPr lvl="2"/>
+            <a:r>
+              <a:rPr lang="en-US" dirty="0">
+                <a:cs typeface="Calibri"/>
+              </a:rPr>
+              <a:t>In the same room</a:t>
+            </a:r>
+          </a:p>
+          <a:p>
+            <a:pPr lvl="2"/>
+            <a:r>
+              <a:rPr lang="en-US" dirty="0">
+                <a:cs typeface="Calibri"/>
+              </a:rPr>
+              <a:t>On the same floor</a:t>
+            </a:r>
+          </a:p>
+          <a:p>
+            <a:pPr lvl="2"/>
+            <a:r>
+              <a:rPr lang="en-US" dirty="0">
+                <a:cs typeface="Calibri"/>
+              </a:rPr>
+              <a:t>In the same building</a:t>
+            </a:r>
+          </a:p>
+          <a:p>
+            <a:pPr lvl="2"/>
+            <a:r>
+              <a:rPr lang="en-US" dirty="0">
+                <a:cs typeface="Calibri"/>
+              </a:rPr>
+              <a:t>Outside same building</a:t>
+            </a:r>
+          </a:p>
+          <a:p>
+            <a:pPr lvl="2"/>
+            <a:r>
+              <a:rPr lang="en-US" dirty="0">
+                <a:cs typeface="Calibri"/>
+              </a:rPr>
+              <a:t>In a different building</a:t>
+            </a:r>
+          </a:p>
+          <a:p>
+            <a:pPr lvl="1"/>
+            <a:r>
+              <a:rPr lang="en-US" dirty="0">
+                <a:cs typeface="Calibri"/>
+              </a:rPr>
+              <a:t>Make calls while the Raspberry Pi is emulating stressful network conditions using the </a:t>
+            </a:r>
+            <a:r>
+              <a:rPr lang="en-US" dirty="0" err="1">
+                <a:latin typeface="Linux"/>
+                <a:cs typeface="Calibri"/>
+              </a:rPr>
+              <a:t>tc</a:t>
+            </a:r>
+            <a:r>
+              <a:rPr lang="en-US" dirty="0">
+                <a:latin typeface="Linux"/>
+                <a:cs typeface="Calibri"/>
+              </a:rPr>
+              <a:t> […] </a:t>
+            </a:r>
+            <a:r>
+              <a:rPr lang="en-US" dirty="0" err="1">
+                <a:latin typeface="Linux"/>
+                <a:cs typeface="Calibri"/>
+              </a:rPr>
+              <a:t>netem</a:t>
+            </a:r>
+            <a:r>
+              <a:rPr lang="en-US" dirty="0">
+                <a:latin typeface="Linux"/>
+                <a:cs typeface="Calibri"/>
+              </a:rPr>
+              <a:t> set of commands.</a:t>
+            </a:r>
+          </a:p>
+          <a:p>
+            <a:pPr lvl="2"/>
+            <a:r>
+              <a:rPr lang="en-US" dirty="0">
+                <a:latin typeface="Linux"/>
+                <a:cs typeface="Calibri"/>
+              </a:rPr>
+              <a:t>Add a delay to outgoing packets.</a:t>
+            </a:r>
+          </a:p>
+          <a:p>
+            <a:pPr lvl="2"/>
+            <a:r>
+              <a:rPr lang="en-US" dirty="0">
+                <a:latin typeface="Linux"/>
+                <a:cs typeface="Calibri"/>
+              </a:rPr>
+              <a:t>Add jitter to outgoing packets.</a:t>
+            </a:r>
+          </a:p>
+          <a:p>
+            <a:pPr lvl="2"/>
+            <a:r>
+              <a:rPr lang="en-US" dirty="0">
+                <a:latin typeface="Linux"/>
+                <a:cs typeface="Calibri"/>
+              </a:rPr>
+              <a:t>Add corruption to outgoing packets.</a:t>
+            </a:r>
+          </a:p>
+          <a:p>
+            <a:pPr lvl="2"/>
+            <a:r>
+              <a:rPr lang="en-US" dirty="0">
+                <a:latin typeface="Linux"/>
+                <a:cs typeface="Calibri"/>
+              </a:rPr>
+              <a:t>Add chance of loss to outgoing packets.</a:t>
+            </a:r>
+          </a:p>
+          <a:p>
+            <a:endParaRPr lang="en-US" dirty="0"/>
+          </a:p>
+        </p:txBody>
+      </p:sp>
+      <p:sp>
+        <p:nvSpPr>
+          <p:cNvPr id="4" name="Slide Number Placeholder 3"/>
+          <p:cNvSpPr>
+            <a:spLocks noGrp="1"/>
+          </p:cNvSpPr>
+          <p:nvPr>
+            <p:ph type="sldNum" sz="quarter" idx="5"/>
+          </p:nvPr>
+        </p:nvSpPr>
+        <p:spPr/>
+        <p:txBody>
+          <a:bodyPr/>
+          <a:lstStyle/>
+          <a:p>
+            <a:fld id="{3AD81792-D2DB-45FA-A2B8-332099C9B951}" type="slidenum">
+              <a:rPr lang="en-US" smtClean="0"/>
+              <a:t>19</a:t>
+            </a:fld>
+            <a:endParaRPr lang="en-US"/>
+          </a:p>
+        </p:txBody>
+      </p:sp>
+    </p:spTree>
+    <p:extLst>
+      <p:ext uri="{BB962C8B-B14F-4D97-AF65-F5344CB8AC3E}">
+        <p14:creationId xmlns:p14="http://schemas.microsoft.com/office/powerpoint/2010/main" val="3321108142"/>
       </p:ext>
     </p:extLst>
   </p:cSld>
@@ -6128,7 +6534,7 @@
           <a:lstStyle/>
           <a:p>
             <a:r>
-              <a:rPr lang="en-US">
+              <a:rPr lang="en-US" dirty="0">
                 <a:ea typeface="+mn-lt"/>
                 <a:cs typeface="+mn-lt"/>
               </a:rPr>
@@ -6138,7 +6544,7 @@
           <a:p>
             <a:pPr lvl="1"/>
             <a:r>
-              <a:rPr lang="en-US">
+              <a:rPr lang="en-US" dirty="0">
                 <a:ea typeface="+mn-lt"/>
                 <a:cs typeface="+mn-lt"/>
               </a:rPr>
@@ -6148,19 +6554,19 @@
           <a:p>
             <a:pPr lvl="1"/>
             <a:r>
-              <a:rPr lang="en-US">
+              <a:rPr lang="en-US" dirty="0">
                 <a:cs typeface="Calibri"/>
               </a:rPr>
               <a:t>Much third-party software is involved: Asterisk PBX for the PBX, Zoiper to make calls, Wireshark for packet capture, SIP.US for SIP </a:t>
             </a:r>
             <a:r>
-              <a:rPr lang="en-US" err="1">
+              <a:rPr lang="en-US" dirty="0" err="1">
                 <a:cs typeface="Calibri"/>
               </a:rPr>
               <a:t>trunking</a:t>
             </a:r>
             <a:r>
-              <a:rPr lang="en-US">
+              <a:rPr lang="en-US" dirty="0">
                 <a:cs typeface="Calibri"/>
               </a:rPr>
               <a:t>, etc.</a:t>
@@ -6168,19 +6574,31 @@
           </a:p>
           <a:p>
             <a:r>
-              <a:rPr lang="en-US">
-                <a:cs typeface="Calibri"/>
-              </a:rPr>
-              <a:t>Raspberry Pis could not initially access </a:t>
-            </a:r>
-            <a:r>
-              <a:rPr lang="en-US" err="1">
+              <a:rPr lang="en-US" dirty="0">
+                <a:cs typeface="Calibri"/>
+              </a:rPr>
+              <a:t>Raspberry </a:t>
+            </a:r>
+            <a:r>
+              <a:rPr lang="en-US" dirty="0" err="1">
+                <a:cs typeface="Calibri"/>
+              </a:rPr>
+              <a:t>Pis</a:t>
+            </a:r>
+            <a:r>
+              <a:rPr lang="en-US" dirty="0">
+                <a:cs typeface="Calibri"/>
+              </a:rPr>
+              <a:t> could not initially access </a:t>
+            </a:r>
+            <a:r>
+              <a:rPr lang="en-US" dirty="0" err="1">
                 <a:cs typeface="Calibri"/>
               </a:rPr>
               <a:t>Eduroam</a:t>
             </a:r>
             <a:r>
-              <a:rPr lang="en-US">
+              <a:rPr lang="en-US" dirty="0">
                 <a:cs typeface="Calibri"/>
               </a:rPr>
               <a:t> without a large amount of additional setup</a:t>
@@ -6188,13 +6606,13 @@
           </a:p>
           <a:p>
             <a:pPr lvl="1"/>
-            <a:endParaRPr lang="en-US">
+            <a:endParaRPr lang="en-US" dirty="0">
               <a:cs typeface="Calibri"/>
             </a:endParaRPr>
           </a:p>
           <a:p>
             <a:pPr lvl="1"/>
-            <a:endParaRPr lang="en-US">
+            <a:endParaRPr lang="en-US" dirty="0">
               <a:cs typeface="Calibri"/>
             </a:endParaRPr>
           </a:p>
@@ -6216,17 +6634,45 @@
             <p:ph sz="half" idx="2"/>
           </p:nvPr>
         </p:nvPicPr>
-        <p:blipFill>
-          <a:blip r:embed="rId2"/>
-          <a:stretch>
-            <a:fillRect/>
-          </a:stretch>
+        <p:blipFill rotWithShape="1">
+          <a:blip r:embed="rId3"/>
+          <a:srcRect r="55517" b="20198"/>
+          <a:stretch/>
         </p:blipFill>
         <p:spPr>
           <a:xfrm>
-            <a:off x="6172200" y="3611342"/>
-            <a:ext cx="5181600" cy="779903"/>
+            <a:off x="5935015" y="2178520"/>
+            <a:ext cx="5573332" cy="1504901"/>
           </a:xfrm>
+        </p:spPr>
+      </p:pic>
+      <p:pic>
+        <p:nvPicPr>
+          <p:cNvPr id="6" name="Picture 5">
+            <a:extLst>
+              <a:ext uri="{FF2B5EF4-FFF2-40B4-BE49-F238E27FC236}">
+                <a16:creationId xmlns:a16="http://schemas.microsoft.com/office/drawing/2014/main" id="{9CD9920C-24E7-1A4F-7F28-93CE1BCE31AC}"/>
+              </a:ext>
+            </a:extLst>
+          </p:cNvPr>
+          <p:cNvPicPr>
+            <a:picLocks noChangeAspect="1"/>
+          </p:cNvPicPr>
+          <p:nvPr/>
+        </p:nvPicPr>
+        <p:blipFill rotWithShape="1">
+          <a:blip r:embed="rId3"/>
+          <a:srcRect l="44504" r="4988"/>
+          <a:stretch/>
+        </p:blipFill>
+        <p:spPr>
+          <a:xfrm>
+            <a:off x="5935015" y="3657663"/>
+            <a:ext cx="5573332" cy="1660844"/>
+          </a:xfrm>
+          <a:prstGeom prst="rect">
+            <a:avLst/>
+          </a:prstGeom>
         </p:spPr>
       </p:pic>
     </p:spTree>
@@ -6243,6 +6689,152 @@
 </file>
 
 <file path=ppt/slides/slide12.xml><?xml version="1.0" encoding="utf-8"?>
+<p:sld xmlns:a="http://schemas.openxmlformats.org/drawingml/2006/main" xmlns:r="http://schemas.openxmlformats.org/officeDocument/2006/relationships" xmlns:p="http://schemas.openxmlformats.org/presentationml/2006/main">
+  <p:cSld>
+    <p:spTree>
+      <p:nvGrpSpPr>
+        <p:cNvPr id="1" name=""/>
+        <p:cNvGrpSpPr/>
+        <p:nvPr/>
+      </p:nvGrpSpPr>
+      <p:grpSpPr>
+        <a:xfrm>
+          <a:off x="0" y="0"/>
+          <a:ext cx="0" cy="0"/>
+          <a:chOff x="0" y="0"/>
+          <a:chExt cx="0" cy="0"/>
+        </a:xfrm>
+      </p:grpSpPr>
+      <p:sp>
+        <p:nvSpPr>
+          <p:cNvPr id="2" name="Title 1">
+            <a:extLst>
+              <a:ext uri="{FF2B5EF4-FFF2-40B4-BE49-F238E27FC236}">
+                <a16:creationId xmlns:a16="http://schemas.microsoft.com/office/drawing/2014/main" id="{4F66FDB6-6CF9-8EBC-34FB-655A4BBABDBD}"/>
+              </a:ext>
+            </a:extLst>
+          </p:cNvPr>
+          <p:cNvSpPr>
+            <a:spLocks noGrp="1"/>
+          </p:cNvSpPr>
+          <p:nvPr>
+            <p:ph type="title"/>
+          </p:nvPr>
+        </p:nvSpPr>
+        <p:spPr/>
+        <p:txBody>
+          <a:bodyPr/>
+          <a:lstStyle/>
+          <a:p>
+            <a:r>
+              <a:rPr lang="en-US">
+                <a:cs typeface="Calibri Light"/>
+              </a:rPr>
+              <a:t>Obstacles</a:t>
+            </a:r>
+            <a:endParaRPr lang="en-US"/>
+          </a:p>
+        </p:txBody>
+      </p:sp>
+      <p:sp>
+        <p:nvSpPr>
+          <p:cNvPr id="3" name="Content Placeholder 2">
+            <a:extLst>
+              <a:ext uri="{FF2B5EF4-FFF2-40B4-BE49-F238E27FC236}">
+                <a16:creationId xmlns:a16="http://schemas.microsoft.com/office/drawing/2014/main" id="{FCBA1FF2-4AC2-3039-CEF1-40D7C55EA20D}"/>
+              </a:ext>
+            </a:extLst>
+          </p:cNvPr>
+          <p:cNvSpPr>
+            <a:spLocks noGrp="1"/>
+          </p:cNvSpPr>
+          <p:nvPr>
+            <p:ph sz="half" idx="1"/>
+          </p:nvPr>
+        </p:nvSpPr>
+        <p:spPr/>
+        <p:txBody>
+          <a:bodyPr vert="horz" lIns="91440" tIns="45720" rIns="91440" bIns="45720" rtlCol="0" anchor="t">
+            <a:normAutofit/>
+          </a:bodyPr>
+          <a:lstStyle/>
+          <a:p>
+            <a:r>
+              <a:rPr lang="en-US" dirty="0">
+                <a:cs typeface="Calibri"/>
+              </a:rPr>
+              <a:t>Raspberry </a:t>
+            </a:r>
+            <a:r>
+              <a:rPr lang="en-US" dirty="0" err="1">
+                <a:cs typeface="Calibri"/>
+              </a:rPr>
+              <a:t>Pis</a:t>
+            </a:r>
+            <a:r>
+              <a:rPr lang="en-US" dirty="0">
+                <a:cs typeface="Calibri"/>
+              </a:rPr>
+              <a:t> could not initially access “</a:t>
+            </a:r>
+            <a:r>
+              <a:rPr lang="en-US" b="1" dirty="0" err="1">
+                <a:cs typeface="Calibri"/>
+              </a:rPr>
+              <a:t>eduroam</a:t>
+            </a:r>
+            <a:r>
+              <a:rPr lang="en-US" dirty="0">
+                <a:cs typeface="Calibri"/>
+              </a:rPr>
+              <a:t>” without a large amount of additional setup</a:t>
+            </a:r>
+          </a:p>
+        </p:txBody>
+      </p:sp>
+      <p:pic>
+        <p:nvPicPr>
+          <p:cNvPr id="9" name="Content Placeholder 8" descr="Text&#10;&#10;Description automatically generated">
+            <a:extLst>
+              <a:ext uri="{FF2B5EF4-FFF2-40B4-BE49-F238E27FC236}">
+                <a16:creationId xmlns:a16="http://schemas.microsoft.com/office/drawing/2014/main" id="{7259821A-2AD9-2990-B73B-54FA4E65D381}"/>
+              </a:ext>
+            </a:extLst>
+          </p:cNvPr>
+          <p:cNvPicPr>
+            <a:picLocks noGrp="1" noChangeAspect="1"/>
+          </p:cNvPicPr>
+          <p:nvPr>
+            <p:ph sz="half" idx="2"/>
+          </p:nvPr>
+        </p:nvPicPr>
+        <p:blipFill>
+          <a:blip r:embed="rId3"/>
+          <a:stretch>
+            <a:fillRect/>
+          </a:stretch>
+        </p:blipFill>
+        <p:spPr>
+          <a:xfrm>
+            <a:off x="7199448" y="1274509"/>
+            <a:ext cx="4154352" cy="4902454"/>
+          </a:xfrm>
+        </p:spPr>
+      </p:pic>
+    </p:spTree>
+    <p:extLst>
+      <p:ext uri="{BB962C8B-B14F-4D97-AF65-F5344CB8AC3E}">
+        <p14:creationId xmlns:p14="http://schemas.microsoft.com/office/powerpoint/2010/main" val="3564021131"/>
+      </p:ext>
+    </p:extLst>
+  </p:cSld>
+  <p:clrMapOvr>
+    <a:masterClrMapping/>
+  </p:clrMapOvr>
+</p:sld>
+</file>
+
+<file path=ppt/slides/slide13.xml><?xml version="1.0" encoding="utf-8"?>
 <p:sld xmlns:a="http://schemas.openxmlformats.org/drawingml/2006/main" xmlns:r="http://schemas.openxmlformats.org/officeDocument/2006/relationships" xmlns:p="http://schemas.openxmlformats.org/presentationml/2006/main">
   <p:cSld>
     <p:spTree>
@@ -6673,7 +7265,7 @@
 </p:sld>
 </file>
 
-<file path=ppt/slides/slide13.xml><?xml version="1.0" encoding="utf-8"?>
+<file path=ppt/slides/slide14.xml><?xml version="1.0" encoding="utf-8"?>
 <p:sld xmlns:a="http://schemas.openxmlformats.org/drawingml/2006/main" xmlns:r="http://schemas.openxmlformats.org/officeDocument/2006/relationships" xmlns:p="http://schemas.openxmlformats.org/presentationml/2006/main">
   <p:cSld>
     <p:spTree>
@@ -6744,7 +7336,7 @@
           <a:lstStyle/>
           <a:p>
             <a:r>
-              <a:rPr lang="en-US">
+              <a:rPr lang="en-US" dirty="0">
                 <a:cs typeface="Calibri"/>
               </a:rPr>
               <a:t>Primary metrics to be analyzed are loss and jitter.</a:t>
@@ -6753,27 +7345,43 @@
           <a:p>
             <a:pPr lvl="1"/>
             <a:r>
-              <a:rPr lang="en-US">
-                <a:cs typeface="Calibri"/>
-              </a:rPr>
-              <a:t>The implementation of IP-PBX used, Asterisk PBX, provides a command to view jitter and loss for packets involved in telephony.</a:t>
+              <a:rPr lang="en-US" dirty="0">
+                <a:cs typeface="Calibri"/>
+              </a:rPr>
+              <a:t>The implementation of IP-PBX used, Asterisk PBX, provides a command to view </a:t>
+            </a:r>
+            <a:r>
+              <a:rPr lang="en-US" b="1" dirty="0">
+                <a:cs typeface="Calibri"/>
+              </a:rPr>
+              <a:t>jitter</a:t>
+            </a:r>
+            <a:r>
+              <a:rPr lang="en-US" dirty="0">
+                <a:cs typeface="Calibri"/>
+              </a:rPr>
+              <a:t> and </a:t>
+            </a:r>
+            <a:r>
+              <a:rPr lang="en-US" b="1" dirty="0">
+                <a:cs typeface="Calibri"/>
+              </a:rPr>
+              <a:t>loss</a:t>
+            </a:r>
+            <a:r>
+              <a:rPr lang="en-US" dirty="0">
+                <a:cs typeface="Calibri"/>
+              </a:rPr>
+              <a:t> for packets involved in telephony.</a:t>
             </a:r>
           </a:p>
           <a:p>
             <a:pPr lvl="1"/>
             <a:r>
-              <a:rPr lang="en-US">
+              <a:rPr lang="en-US" dirty="0">
                 <a:cs typeface="Calibri"/>
               </a:rPr>
               <a:t>Wireshark was also used to capture SIP and RTP/RTCP packets involved in telephony.</a:t>
-            </a:r>
-          </a:p>
-          <a:p>
-            <a:r>
-              <a:rPr lang="en-US">
-                <a:cs typeface="Calibri"/>
-              </a:rPr>
-              <a:t>Jitter and loss will be plotted in line graphs, examining the percentage jitter or loss over time. This will be used to visualize trends of the data when VoIP calls are made under different conditions.</a:t>
             </a:r>
           </a:p>
         </p:txBody>
@@ -6791,7 +7399,7 @@
 </p:sld>
 </file>
 
-<file path=ppt/slides/slide14.xml><?xml version="1.0" encoding="utf-8"?>
+<file path=ppt/slides/slide15.xml><?xml version="1.0" encoding="utf-8"?>
 <p:sld xmlns:a="http://schemas.openxmlformats.org/drawingml/2006/main" xmlns:r="http://schemas.openxmlformats.org/officeDocument/2006/relationships" xmlns:p="http://schemas.openxmlformats.org/presentationml/2006/main">
   <p:cSld>
     <p:spTree>
@@ -7216,7 +7824,7 @@
 </p:sld>
 </file>
 
-<file path=ppt/slides/slide15.xml><?xml version="1.0" encoding="utf-8"?>
+<file path=ppt/slides/slide16.xml><?xml version="1.0" encoding="utf-8"?>
 <p:sld xmlns:a="http://schemas.openxmlformats.org/drawingml/2006/main" xmlns:r="http://schemas.openxmlformats.org/officeDocument/2006/relationships" xmlns:p="http://schemas.openxmlformats.org/presentationml/2006/main">
   <p:cSld>
     <p:spTree>
@@ -7335,7 +7943,7 @@
 </p:sld>
 </file>
 
-<file path=ppt/slides/slide16.xml><?xml version="1.0" encoding="utf-8"?>
+<file path=ppt/slides/slide17.xml><?xml version="1.0" encoding="utf-8"?>
 <p:sld xmlns:a="http://schemas.openxmlformats.org/drawingml/2006/main" xmlns:r="http://schemas.openxmlformats.org/officeDocument/2006/relationships" xmlns:p="http://schemas.openxmlformats.org/presentationml/2006/main">
   <p:cSld>
     <p:spTree>
@@ -7453,7 +8061,7 @@
 </p:sld>
 </file>
 
-<file path=ppt/slides/slide17.xml><?xml version="1.0" encoding="utf-8"?>
+<file path=ppt/slides/slide18.xml><?xml version="1.0" encoding="utf-8"?>
 <p:sld xmlns:a="http://schemas.openxmlformats.org/drawingml/2006/main" xmlns:r="http://schemas.openxmlformats.org/officeDocument/2006/relationships" xmlns:p="http://schemas.openxmlformats.org/presentationml/2006/main">
   <p:cSld>
     <p:spTree>
@@ -7571,7 +8179,7 @@
 </p:sld>
 </file>
 
-<file path=ppt/slides/slide18.xml><?xml version="1.0" encoding="utf-8"?>
+<file path=ppt/slides/slide19.xml><?xml version="1.0" encoding="utf-8"?>
 <p:sld xmlns:a="http://schemas.openxmlformats.org/drawingml/2006/main" xmlns:r="http://schemas.openxmlformats.org/officeDocument/2006/relationships" xmlns:p="http://schemas.openxmlformats.org/presentationml/2006/main">
   <p:cSld>
     <p:spTree>
@@ -7689,7 +8297,129 @@
 </p:sld>
 </file>
 
-<file path=ppt/slides/slide19.xml><?xml version="1.0" encoding="utf-8"?>
+<file path=ppt/slides/slide2.xml><?xml version="1.0" encoding="utf-8"?>
+<p:sld xmlns:a="http://schemas.openxmlformats.org/drawingml/2006/main" xmlns:r="http://schemas.openxmlformats.org/officeDocument/2006/relationships" xmlns:p="http://schemas.openxmlformats.org/presentationml/2006/main">
+  <p:cSld>
+    <p:spTree>
+      <p:nvGrpSpPr>
+        <p:cNvPr id="1" name=""/>
+        <p:cNvGrpSpPr/>
+        <p:nvPr/>
+      </p:nvGrpSpPr>
+      <p:grpSpPr>
+        <a:xfrm>
+          <a:off x="0" y="0"/>
+          <a:ext cx="0" cy="0"/>
+          <a:chOff x="0" y="0"/>
+          <a:chExt cx="0" cy="0"/>
+        </a:xfrm>
+      </p:grpSpPr>
+      <p:sp>
+        <p:nvSpPr>
+          <p:cNvPr id="2" name="Title 1">
+            <a:extLst>
+              <a:ext uri="{FF2B5EF4-FFF2-40B4-BE49-F238E27FC236}">
+                <a16:creationId xmlns:a16="http://schemas.microsoft.com/office/drawing/2014/main" id="{349AA337-7646-3D45-2193-74726DEFB031}"/>
+              </a:ext>
+            </a:extLst>
+          </p:cNvPr>
+          <p:cNvSpPr>
+            <a:spLocks noGrp="1"/>
+          </p:cNvSpPr>
+          <p:nvPr>
+            <p:ph type="title"/>
+          </p:nvPr>
+        </p:nvSpPr>
+        <p:spPr/>
+        <p:txBody>
+          <a:bodyPr/>
+          <a:lstStyle/>
+          <a:p>
+            <a:r>
+              <a:rPr lang="en-US"/>
+              <a:t>Content	</a:t>
+            </a:r>
+          </a:p>
+        </p:txBody>
+      </p:sp>
+      <p:sp>
+        <p:nvSpPr>
+          <p:cNvPr id="3" name="Content Placeholder 2">
+            <a:extLst>
+              <a:ext uri="{FF2B5EF4-FFF2-40B4-BE49-F238E27FC236}">
+                <a16:creationId xmlns:a16="http://schemas.microsoft.com/office/drawing/2014/main" id="{FCBD70E3-AB21-9EC2-5862-BBDC37028A32}"/>
+              </a:ext>
+            </a:extLst>
+          </p:cNvPr>
+          <p:cNvSpPr>
+            <a:spLocks noGrp="1"/>
+          </p:cNvSpPr>
+          <p:nvPr>
+            <p:ph idx="1"/>
+          </p:nvPr>
+        </p:nvSpPr>
+        <p:spPr/>
+        <p:txBody>
+          <a:bodyPr/>
+          <a:lstStyle/>
+          <a:p>
+            <a:r>
+              <a:rPr lang="en-US"/>
+              <a:t>Objective</a:t>
+            </a:r>
+          </a:p>
+          <a:p>
+            <a:r>
+              <a:rPr lang="en-US"/>
+              <a:t>Introduction &amp; Background</a:t>
+            </a:r>
+          </a:p>
+          <a:p>
+            <a:r>
+              <a:rPr lang="en-US"/>
+              <a:t>Obstacles</a:t>
+            </a:r>
+          </a:p>
+          <a:p>
+            <a:r>
+              <a:rPr lang="en-US"/>
+              <a:t>Analytical Method</a:t>
+            </a:r>
+          </a:p>
+          <a:p>
+            <a:r>
+              <a:rPr lang="en-US"/>
+              <a:t>Experiments</a:t>
+            </a:r>
+          </a:p>
+          <a:p>
+            <a:r>
+              <a:rPr lang="en-US"/>
+              <a:t>Future Directions</a:t>
+            </a:r>
+          </a:p>
+          <a:p>
+            <a:r>
+              <a:rPr lang="en-US"/>
+              <a:t>Conclusion</a:t>
+            </a:r>
+          </a:p>
+        </p:txBody>
+      </p:sp>
+    </p:spTree>
+    <p:extLst>
+      <p:ext uri="{BB962C8B-B14F-4D97-AF65-F5344CB8AC3E}">
+        <p14:creationId xmlns:p14="http://schemas.microsoft.com/office/powerpoint/2010/main" val="1754954195"/>
+      </p:ext>
+    </p:extLst>
+  </p:cSld>
+  <p:clrMapOvr>
+    <a:masterClrMapping/>
+  </p:clrMapOvr>
+</p:sld>
+</file>
+
+<file path=ppt/slides/slide20.xml><?xml version="1.0" encoding="utf-8"?>
 <p:sld xmlns:a="http://schemas.openxmlformats.org/drawingml/2006/main" xmlns:r="http://schemas.openxmlformats.org/officeDocument/2006/relationships" xmlns:p="http://schemas.openxmlformats.org/presentationml/2006/main">
   <p:cSld>
     <p:spTree>
@@ -7807,129 +8537,7 @@
 </p:sld>
 </file>
 
-<file path=ppt/slides/slide2.xml><?xml version="1.0" encoding="utf-8"?>
-<p:sld xmlns:a="http://schemas.openxmlformats.org/drawingml/2006/main" xmlns:r="http://schemas.openxmlformats.org/officeDocument/2006/relationships" xmlns:p="http://schemas.openxmlformats.org/presentationml/2006/main">
-  <p:cSld>
-    <p:spTree>
-      <p:nvGrpSpPr>
-        <p:cNvPr id="1" name=""/>
-        <p:cNvGrpSpPr/>
-        <p:nvPr/>
-      </p:nvGrpSpPr>
-      <p:grpSpPr>
-        <a:xfrm>
-          <a:off x="0" y="0"/>
-          <a:ext cx="0" cy="0"/>
-          <a:chOff x="0" y="0"/>
-          <a:chExt cx="0" cy="0"/>
-        </a:xfrm>
-      </p:grpSpPr>
-      <p:sp>
-        <p:nvSpPr>
-          <p:cNvPr id="2" name="Title 1">
-            <a:extLst>
-              <a:ext uri="{FF2B5EF4-FFF2-40B4-BE49-F238E27FC236}">
-                <a16:creationId xmlns:a16="http://schemas.microsoft.com/office/drawing/2014/main" id="{349AA337-7646-3D45-2193-74726DEFB031}"/>
-              </a:ext>
-            </a:extLst>
-          </p:cNvPr>
-          <p:cNvSpPr>
-            <a:spLocks noGrp="1"/>
-          </p:cNvSpPr>
-          <p:nvPr>
-            <p:ph type="title"/>
-          </p:nvPr>
-        </p:nvSpPr>
-        <p:spPr/>
-        <p:txBody>
-          <a:bodyPr/>
-          <a:lstStyle/>
-          <a:p>
-            <a:r>
-              <a:rPr lang="en-US"/>
-              <a:t>Content	</a:t>
-            </a:r>
-          </a:p>
-        </p:txBody>
-      </p:sp>
-      <p:sp>
-        <p:nvSpPr>
-          <p:cNvPr id="3" name="Content Placeholder 2">
-            <a:extLst>
-              <a:ext uri="{FF2B5EF4-FFF2-40B4-BE49-F238E27FC236}">
-                <a16:creationId xmlns:a16="http://schemas.microsoft.com/office/drawing/2014/main" id="{FCBD70E3-AB21-9EC2-5862-BBDC37028A32}"/>
-              </a:ext>
-            </a:extLst>
-          </p:cNvPr>
-          <p:cNvSpPr>
-            <a:spLocks noGrp="1"/>
-          </p:cNvSpPr>
-          <p:nvPr>
-            <p:ph idx="1"/>
-          </p:nvPr>
-        </p:nvSpPr>
-        <p:spPr/>
-        <p:txBody>
-          <a:bodyPr/>
-          <a:lstStyle/>
-          <a:p>
-            <a:r>
-              <a:rPr lang="en-US"/>
-              <a:t>Objective</a:t>
-            </a:r>
-          </a:p>
-          <a:p>
-            <a:r>
-              <a:rPr lang="en-US"/>
-              <a:t>Introduction &amp; Background</a:t>
-            </a:r>
-          </a:p>
-          <a:p>
-            <a:r>
-              <a:rPr lang="en-US"/>
-              <a:t>Obstacles</a:t>
-            </a:r>
-          </a:p>
-          <a:p>
-            <a:r>
-              <a:rPr lang="en-US"/>
-              <a:t>Analytical Method</a:t>
-            </a:r>
-          </a:p>
-          <a:p>
-            <a:r>
-              <a:rPr lang="en-US"/>
-              <a:t>Experiments</a:t>
-            </a:r>
-          </a:p>
-          <a:p>
-            <a:r>
-              <a:rPr lang="en-US"/>
-              <a:t>Future Directions</a:t>
-            </a:r>
-          </a:p>
-          <a:p>
-            <a:r>
-              <a:rPr lang="en-US"/>
-              <a:t>Conclusion</a:t>
-            </a:r>
-          </a:p>
-        </p:txBody>
-      </p:sp>
-    </p:spTree>
-    <p:extLst>
-      <p:ext uri="{BB962C8B-B14F-4D97-AF65-F5344CB8AC3E}">
-        <p14:creationId xmlns:p14="http://schemas.microsoft.com/office/powerpoint/2010/main" val="1754954195"/>
-      </p:ext>
-    </p:extLst>
-  </p:cSld>
-  <p:clrMapOvr>
-    <a:masterClrMapping/>
-  </p:clrMapOvr>
-</p:sld>
-</file>
-
-<file path=ppt/slides/slide20.xml><?xml version="1.0" encoding="utf-8"?>
+<file path=ppt/slides/slide21.xml><?xml version="1.0" encoding="utf-8"?>
 <p:sld xmlns:a="http://schemas.openxmlformats.org/drawingml/2006/main" xmlns:r="http://schemas.openxmlformats.org/officeDocument/2006/relationships" xmlns:p="http://schemas.openxmlformats.org/presentationml/2006/main">
   <p:cSld>
     <p:spTree>
@@ -7998,7 +8606,7 @@
           <a:lstStyle/>
           <a:p>
             <a:r>
-              <a:rPr lang="en-US">
+              <a:rPr lang="en-US" dirty="0">
                 <a:cs typeface="Calibri"/>
               </a:rPr>
               <a:t>Currently, the experiment to make calls at different locations has been completed, and the results of which have been recorded.</a:t>
@@ -8035,7 +8643,7 @@
 </p:sld>
 </file>
 
-<file path=ppt/slides/slide21.xml><?xml version="1.0" encoding="utf-8"?>
+<file path=ppt/slides/slide22.xml><?xml version="1.0" encoding="utf-8"?>
 <p:sld xmlns:a="http://schemas.openxmlformats.org/drawingml/2006/main" xmlns:r="http://schemas.openxmlformats.org/officeDocument/2006/relationships" xmlns:p="http://schemas.openxmlformats.org/presentationml/2006/main">
   <p:cSld>
     <p:spTree>
@@ -8466,7 +9074,7 @@
 </p:sld>
 </file>
 
-<file path=ppt/slides/slide22.xml><?xml version="1.0" encoding="utf-8"?>
+<file path=ppt/slides/slide23.xml><?xml version="1.0" encoding="utf-8"?>
 <p:sld xmlns:a="http://schemas.openxmlformats.org/drawingml/2006/main" xmlns:r="http://schemas.openxmlformats.org/officeDocument/2006/relationships" xmlns:p="http://schemas.openxmlformats.org/presentationml/2006/main">
   <p:cSld>
     <p:spTree>
@@ -8620,7 +9228,7 @@
 </p:sld>
 </file>
 
-<file path=ppt/slides/slide23.xml><?xml version="1.0" encoding="utf-8"?>
+<file path=ppt/slides/slide24.xml><?xml version="1.0" encoding="utf-8"?>
 <p:sld xmlns:a="http://schemas.openxmlformats.org/drawingml/2006/main" xmlns:r="http://schemas.openxmlformats.org/officeDocument/2006/relationships" xmlns:p="http://schemas.openxmlformats.org/presentationml/2006/main">
   <p:cSld>
     <p:spTree>
@@ -9051,7 +9659,7 @@
 </p:sld>
 </file>
 
-<file path=ppt/slides/slide24.xml><?xml version="1.0" encoding="utf-8"?>
+<file path=ppt/slides/slide25.xml><?xml version="1.0" encoding="utf-8"?>
 <p:sld xmlns:a="http://schemas.openxmlformats.org/drawingml/2006/main" xmlns:r="http://schemas.openxmlformats.org/officeDocument/2006/relationships" xmlns:p="http://schemas.openxmlformats.org/presentationml/2006/main">
   <p:cSld>
     <p:spTree>
@@ -9185,7 +9793,7 @@
 </p:sld>
 </file>
 
-<file path=ppt/slides/slide25.xml><?xml version="1.0" encoding="utf-8"?>
+<file path=ppt/slides/slide26.xml><?xml version="1.0" encoding="utf-8"?>
 <p:sld xmlns:a="http://schemas.openxmlformats.org/drawingml/2006/main" xmlns:r="http://schemas.openxmlformats.org/officeDocument/2006/relationships" xmlns:p="http://schemas.openxmlformats.org/presentationml/2006/main">
   <p:cSld>
     <p:spTree>
@@ -9262,7 +9870,7 @@
 </p:sld>
 </file>
 
-<file path=ppt/slides/slide26.xml><?xml version="1.0" encoding="utf-8"?>
+<file path=ppt/slides/slide27.xml><?xml version="1.0" encoding="utf-8"?>
 <p:sld xmlns:a="http://schemas.openxmlformats.org/drawingml/2006/main" xmlns:r="http://schemas.openxmlformats.org/officeDocument/2006/relationships" xmlns:p="http://schemas.openxmlformats.org/presentationml/2006/main" showMasterSp="0">
   <p:cSld>
     <p:bg>
@@ -9360,7 +9968,7 @@
           <a:p>
             <a:fld id="{623C9B37-4DCD-A749-BC4A-BD74B376638A}" type="slidenum">
               <a:rPr lang="en-US" smtClean="0"/>
-              <a:t>26</a:t>
+              <a:t>27</a:t>
             </a:fld>
             <a:endParaRPr lang="en-US"/>
           </a:p>
@@ -9452,7 +10060,7 @@
 </p:sld>
 </file>
 
-<file path=ppt/slides/slide27.xml><?xml version="1.0" encoding="utf-8"?>
+<file path=ppt/slides/slide28.xml><?xml version="1.0" encoding="utf-8"?>
 <p:sld xmlns:a="http://schemas.openxmlformats.org/drawingml/2006/main" xmlns:r="http://schemas.openxmlformats.org/officeDocument/2006/relationships" xmlns:p="http://schemas.openxmlformats.org/presentationml/2006/main">
   <p:cSld>
     <p:spTree>
@@ -11349,8 +11957,8 @@
         </p:nvSpPr>
         <p:spPr>
           <a:xfrm>
-            <a:off x="838200" y="1638966"/>
-            <a:ext cx="7637929" cy="4878655"/>
+            <a:off x="838201" y="1638966"/>
+            <a:ext cx="6386848" cy="4878655"/>
           </a:xfrm>
         </p:spPr>
         <p:txBody>
@@ -11360,19 +11968,19 @@
           <a:lstStyle/>
           <a:p>
             <a:r>
-              <a:rPr lang="en-US" sz="2400">
+              <a:rPr lang="en-US" sz="2400" dirty="0">
                 <a:ea typeface="+mn-lt"/>
                 <a:cs typeface="+mn-lt"/>
               </a:rPr>
               <a:t>RTP carries the media streams, while RTCP is used to monitor transmission statistics and quality of service</a:t>
             </a:r>
-            <a:endParaRPr lang="en-US" sz="2400">
+            <a:endParaRPr lang="en-US" sz="2400" dirty="0">
               <a:cs typeface="Calibri"/>
             </a:endParaRPr>
           </a:p>
           <a:p>
             <a:r>
-              <a:rPr lang="en-US" sz="2400">
+              <a:rPr lang="en-US" sz="2400" dirty="0">
                 <a:ea typeface="+mn-lt"/>
                 <a:cs typeface="+mn-lt"/>
               </a:rPr>
@@ -11381,7 +11989,7 @@
           </a:p>
           <a:p>
             <a:r>
-              <a:rPr lang="en-US" sz="2400">
+              <a:rPr lang="en-US" sz="2400" dirty="0">
                 <a:ea typeface="+mn-lt"/>
                 <a:cs typeface="+mn-lt"/>
               </a:rPr>
@@ -11390,7 +11998,7 @@
           </a:p>
           <a:p>
             <a:r>
-              <a:rPr lang="en-US" sz="2400">
+              <a:rPr lang="en-US" sz="2400" dirty="0">
                 <a:ea typeface="+mn-lt"/>
                 <a:cs typeface="+mn-lt"/>
               </a:rPr>
@@ -11421,8 +12029,8 @@
         </p:blipFill>
         <p:spPr>
           <a:xfrm>
-            <a:off x="8785412" y="1338730"/>
-            <a:ext cx="2743200" cy="2082800"/>
+            <a:off x="7804596" y="1274335"/>
+            <a:ext cx="3376285" cy="2563476"/>
           </a:xfrm>
           <a:prstGeom prst="rect">
             <a:avLst/>
@@ -11451,8 +12059,8 @@
         </p:blipFill>
         <p:spPr>
           <a:xfrm>
-            <a:off x="8785412" y="3932321"/>
-            <a:ext cx="2743200" cy="2346158"/>
+            <a:off x="7804596" y="3867926"/>
+            <a:ext cx="3376285" cy="2887612"/>
           </a:xfrm>
           <a:prstGeom prst="rect">
             <a:avLst/>

</xml_diff>

<commit_message>
Update: reploted the same results @initial_stage
</commit_message>
<xml_diff>
--- a/project_presentation/VoIP_final_presentation.pptx
+++ b/project_presentation/VoIP_final_presentation.pptx
@@ -221,12 +221,7 @@
 <file path=ppt/revisionInfo.xml><?xml version="1.0" encoding="utf-8"?>
 <p1510:revInfo xmlns:a="http://schemas.openxmlformats.org/drawingml/2006/main" xmlns:r="http://schemas.openxmlformats.org/officeDocument/2006/relationships" xmlns:p1510="http://schemas.microsoft.com/office/powerpoint/2015/10/main">
   <p1510:revLst>
-    <p1510:client id="{01608A76-BCC8-435D-A7FD-998D591FE69B}" v="1921" dt="2022-04-27T02:58:41.989"/>
-    <p1510:client id="{30B743A9-FCAB-B7E6-CCF6-432FA1F40417}" v="453" dt="2022-04-27T19:46:04.285"/>
-    <p1510:client id="{CEF57F2F-C4BD-07E3-E520-EC11CBA76586}" v="3" dt="2022-04-27T11:24:33.905"/>
-    <p1510:client id="{CFF72AAC-1248-F64C-B090-8BDD8C7CADC1}" v="609" dt="2022-04-27T21:25:42.216"/>
-    <p1510:client id="{DF6E75B9-1B48-4DA7-7F6A-2FFC95E13E83}" v="2274" dt="2022-04-27T19:13:58.205"/>
-    <p1510:client id="{F3749FAE-333C-70EC-2BF1-6FEE8A68231B}" v="4" dt="2022-04-27T00:42:56.871"/>
+    <p1510:client id="{1B32E605-66F2-2E48-B94F-DE67A9ECF775}" v="5" dt="2022-05-04T20:06:32.364"/>
   </p1510:revLst>
 </p1510:revInfo>
 </file>
@@ -561,6 +556,98 @@
             <ac:spMk id="3" creationId="{FCBA1FF2-4AC2-3039-CEF1-40D7C55EA20D}"/>
           </ac:spMkLst>
         </pc:spChg>
+      </pc:sldChg>
+    </pc:docChg>
+  </pc:docChgLst>
+  <pc:docChgLst>
+    <pc:chgData name="Trupesh Patel" userId="b76c5197-b424-428e-a787-d44a01bbf658" providerId="ADAL" clId="{1B32E605-66F2-2E48-B94F-DE67A9ECF775}"/>
+    <pc:docChg chg="modSld">
+      <pc:chgData name="Trupesh Patel" userId="b76c5197-b424-428e-a787-d44a01bbf658" providerId="ADAL" clId="{1B32E605-66F2-2E48-B94F-DE67A9ECF775}" dt="2022-05-04T20:08:11.290" v="18" actId="1076"/>
+      <pc:docMkLst>
+        <pc:docMk/>
+      </pc:docMkLst>
+      <pc:sldChg chg="modSp mod">
+        <pc:chgData name="Trupesh Patel" userId="b76c5197-b424-428e-a787-d44a01bbf658" providerId="ADAL" clId="{1B32E605-66F2-2E48-B94F-DE67A9ECF775}" dt="2022-05-04T20:08:11.290" v="18" actId="1076"/>
+        <pc:sldMkLst>
+          <pc:docMk/>
+          <pc:sldMk cId="2951159625" sldId="314"/>
+        </pc:sldMkLst>
+        <pc:picChg chg="mod">
+          <ac:chgData name="Trupesh Patel" userId="b76c5197-b424-428e-a787-d44a01bbf658" providerId="ADAL" clId="{1B32E605-66F2-2E48-B94F-DE67A9ECF775}" dt="2022-05-04T20:08:11.290" v="18" actId="1076"/>
+          <ac:picMkLst>
+            <pc:docMk/>
+            <pc:sldMk cId="2951159625" sldId="314"/>
+            <ac:picMk id="7" creationId="{90755959-BAC6-237D-34C7-A6519B68398F}"/>
+          </ac:picMkLst>
+        </pc:picChg>
+      </pc:sldChg>
+      <pc:sldChg chg="modSp mod">
+        <pc:chgData name="Trupesh Patel" userId="b76c5197-b424-428e-a787-d44a01bbf658" providerId="ADAL" clId="{1B32E605-66F2-2E48-B94F-DE67A9ECF775}" dt="2022-05-04T20:07:53.985" v="16" actId="1076"/>
+        <pc:sldMkLst>
+          <pc:docMk/>
+          <pc:sldMk cId="1107569565" sldId="315"/>
+        </pc:sldMkLst>
+        <pc:picChg chg="mod">
+          <ac:chgData name="Trupesh Patel" userId="b76c5197-b424-428e-a787-d44a01bbf658" providerId="ADAL" clId="{1B32E605-66F2-2E48-B94F-DE67A9ECF775}" dt="2022-05-04T20:07:53.985" v="16" actId="1076"/>
+          <ac:picMkLst>
+            <pc:docMk/>
+            <pc:sldMk cId="1107569565" sldId="315"/>
+            <ac:picMk id="7" creationId="{90755959-BAC6-237D-34C7-A6519B68398F}"/>
+          </ac:picMkLst>
+        </pc:picChg>
+      </pc:sldChg>
+      <pc:sldChg chg="modSp mod">
+        <pc:chgData name="Trupesh Patel" userId="b76c5197-b424-428e-a787-d44a01bbf658" providerId="ADAL" clId="{1B32E605-66F2-2E48-B94F-DE67A9ECF775}" dt="2022-05-04T20:07:11.066" v="11" actId="1076"/>
+        <pc:sldMkLst>
+          <pc:docMk/>
+          <pc:sldMk cId="2571980282" sldId="316"/>
+        </pc:sldMkLst>
+        <pc:picChg chg="mod">
+          <ac:chgData name="Trupesh Patel" userId="b76c5197-b424-428e-a787-d44a01bbf658" providerId="ADAL" clId="{1B32E605-66F2-2E48-B94F-DE67A9ECF775}" dt="2022-05-04T20:07:11.066" v="11" actId="1076"/>
+          <ac:picMkLst>
+            <pc:docMk/>
+            <pc:sldMk cId="2571980282" sldId="316"/>
+            <ac:picMk id="7" creationId="{90755959-BAC6-237D-34C7-A6519B68398F}"/>
+          </ac:picMkLst>
+        </pc:picChg>
+      </pc:sldChg>
+      <pc:sldChg chg="modSp mod">
+        <pc:chgData name="Trupesh Patel" userId="b76c5197-b424-428e-a787-d44a01bbf658" providerId="ADAL" clId="{1B32E605-66F2-2E48-B94F-DE67A9ECF775}" dt="2022-05-04T20:07:31.386" v="12" actId="14100"/>
+        <pc:sldMkLst>
+          <pc:docMk/>
+          <pc:sldMk cId="480281074" sldId="317"/>
+        </pc:sldMkLst>
+        <pc:picChg chg="mod">
+          <ac:chgData name="Trupesh Patel" userId="b76c5197-b424-428e-a787-d44a01bbf658" providerId="ADAL" clId="{1B32E605-66F2-2E48-B94F-DE67A9ECF775}" dt="2022-05-04T20:07:01.658" v="9" actId="1076"/>
+          <ac:picMkLst>
+            <pc:docMk/>
+            <pc:sldMk cId="480281074" sldId="317"/>
+            <ac:picMk id="5" creationId="{84E8E6BA-1A18-927C-F048-9B02655BB801}"/>
+          </ac:picMkLst>
+        </pc:picChg>
+        <pc:picChg chg="mod">
+          <ac:chgData name="Trupesh Patel" userId="b76c5197-b424-428e-a787-d44a01bbf658" providerId="ADAL" clId="{1B32E605-66F2-2E48-B94F-DE67A9ECF775}" dt="2022-05-04T20:07:31.386" v="12" actId="14100"/>
+          <ac:picMkLst>
+            <pc:docMk/>
+            <pc:sldMk cId="480281074" sldId="317"/>
+            <ac:picMk id="7" creationId="{90755959-BAC6-237D-34C7-A6519B68398F}"/>
+          </ac:picMkLst>
+        </pc:picChg>
+      </pc:sldChg>
+      <pc:sldChg chg="modSp mod">
+        <pc:chgData name="Trupesh Patel" userId="b76c5197-b424-428e-a787-d44a01bbf658" providerId="ADAL" clId="{1B32E605-66F2-2E48-B94F-DE67A9ECF775}" dt="2022-05-04T20:06:39.387" v="6" actId="1076"/>
+        <pc:sldMkLst>
+          <pc:docMk/>
+          <pc:sldMk cId="1341236930" sldId="318"/>
+        </pc:sldMkLst>
+        <pc:picChg chg="mod">
+          <ac:chgData name="Trupesh Patel" userId="b76c5197-b424-428e-a787-d44a01bbf658" providerId="ADAL" clId="{1B32E605-66F2-2E48-B94F-DE67A9ECF775}" dt="2022-05-04T20:06:39.387" v="6" actId="1076"/>
+          <ac:picMkLst>
+            <pc:docMk/>
+            <pc:sldMk cId="1341236930" sldId="318"/>
+            <ac:picMk id="7" creationId="{90755959-BAC6-237D-34C7-A6519B68398F}"/>
+          </ac:picMkLst>
+        </pc:picChg>
       </pc:sldChg>
     </pc:docChg>
   </pc:docChgLst>
@@ -1466,7 +1553,7 @@
           </a:lstStyle>
           <a:p>
             <a:fld id="{8E8B6A06-BD3B-4D82-AB84-EE46617E1784}" type="datetimeFigureOut">
-              <a:t>4/27/22</a:t>
+              <a:t>5/4/22</a:t>
             </a:fld>
             <a:endParaRPr lang="en-US"/>
           </a:p>
@@ -3841,7 +3928,7 @@
           <a:p>
             <a:fld id="{DC023D42-92BB-BB42-8561-E5CD330E7717}" type="datetimeFigureOut">
               <a:rPr lang="en-US" smtClean="0"/>
-              <a:t>4/27/22</a:t>
+              <a:t>5/4/22</a:t>
             </a:fld>
             <a:endParaRPr lang="en-US"/>
           </a:p>
@@ -4055,7 +4142,7 @@
           <a:p>
             <a:fld id="{DC023D42-92BB-BB42-8561-E5CD330E7717}" type="datetimeFigureOut">
               <a:rPr lang="en-US" smtClean="0"/>
-              <a:t>4/27/22</a:t>
+              <a:t>5/4/22</a:t>
             </a:fld>
             <a:endParaRPr lang="en-US"/>
           </a:p>
@@ -4257,7 +4344,7 @@
           <a:p>
             <a:fld id="{DC023D42-92BB-BB42-8561-E5CD330E7717}" type="datetimeFigureOut">
               <a:rPr lang="en-US" smtClean="0"/>
-              <a:t>4/27/22</a:t>
+              <a:t>5/4/22</a:t>
             </a:fld>
             <a:endParaRPr lang="en-US"/>
           </a:p>
@@ -4380,7 +4467,7 @@
           <a:p>
             <a:fld id="{DC023D42-92BB-BB42-8561-E5CD330E7717}" type="datetimeFigureOut">
               <a:rPr lang="en-US" smtClean="0"/>
-              <a:t>4/27/22</a:t>
+              <a:t>5/4/22</a:t>
             </a:fld>
             <a:endParaRPr lang="en-US"/>
           </a:p>
@@ -4952,7 +5039,7 @@
           <a:p>
             <a:fld id="{DC023D42-92BB-BB42-8561-E5CD330E7717}" type="datetimeFigureOut">
               <a:rPr lang="en-US" smtClean="0"/>
-              <a:t>4/27/22</a:t>
+              <a:t>5/4/22</a:t>
             </a:fld>
             <a:endParaRPr lang="en-US"/>
           </a:p>
@@ -7925,7 +8012,7 @@
       </p:pic>
       <p:pic>
         <p:nvPicPr>
-          <p:cNvPr id="7" name="Picture 6" descr="Chart, histogram&#10;&#10;Description automatically generated">
+          <p:cNvPr id="7" name="Picture 6">
             <a:extLst>
               <a:ext uri="{FF2B5EF4-FFF2-40B4-BE49-F238E27FC236}">
                 <a16:creationId xmlns:a16="http://schemas.microsoft.com/office/drawing/2014/main" id="{90755959-BAC6-237D-34C7-A6519B68398F}"/>
@@ -7939,14 +8026,13 @@
         </p:nvPicPr>
         <p:blipFill>
           <a:blip r:embed="rId4"/>
-          <a:stretch>
-            <a:fillRect/>
-          </a:stretch>
+          <a:srcRect/>
+          <a:stretch/>
         </p:blipFill>
         <p:spPr>
           <a:xfrm>
-            <a:off x="7421313" y="1307891"/>
-            <a:ext cx="3850745" cy="5383802"/>
+            <a:off x="6787342" y="1756643"/>
+            <a:ext cx="4566458" cy="4389463"/>
           </a:xfrm>
           <a:prstGeom prst="rect">
             <a:avLst/>
@@ -8063,8 +8149,8 @@
         </p:blipFill>
         <p:spPr>
           <a:xfrm>
-            <a:off x="7421313" y="1307892"/>
-            <a:ext cx="3850745" cy="5383800"/>
+            <a:off x="6773333" y="1735475"/>
+            <a:ext cx="4580467" cy="4402930"/>
           </a:xfrm>
           <a:prstGeom prst="rect">
             <a:avLst/>
@@ -8181,8 +8267,8 @@
         </p:blipFill>
         <p:spPr>
           <a:xfrm>
-            <a:off x="7421313" y="1307892"/>
-            <a:ext cx="3850744" cy="5383800"/>
+            <a:off x="6748013" y="1790816"/>
+            <a:ext cx="4605787" cy="4427268"/>
           </a:xfrm>
           <a:prstGeom prst="rect">
             <a:avLst/>
@@ -8270,7 +8356,7 @@
         </p:blipFill>
         <p:spPr>
           <a:xfrm>
-            <a:off x="887411" y="1853196"/>
+            <a:off x="838200" y="1853195"/>
             <a:ext cx="5729647" cy="4302508"/>
           </a:xfrm>
           <a:prstGeom prst="rect">
@@ -8299,8 +8385,8 @@
         </p:blipFill>
         <p:spPr>
           <a:xfrm>
-            <a:off x="6919441" y="1594502"/>
-            <a:ext cx="4434359" cy="4302508"/>
+            <a:off x="6747430" y="1853195"/>
+            <a:ext cx="4606370" cy="4427828"/>
           </a:xfrm>
           <a:prstGeom prst="rect">
             <a:avLst/>
@@ -8539,8 +8625,8 @@
         </p:blipFill>
         <p:spPr>
           <a:xfrm>
-            <a:off x="7530056" y="1331425"/>
-            <a:ext cx="3823744" cy="5346050"/>
+            <a:off x="6540032" y="1690856"/>
+            <a:ext cx="4813768" cy="4627187"/>
           </a:xfrm>
           <a:prstGeom prst="rect">
             <a:avLst/>

</xml_diff>